<commit_message>
Updating ppt with XGBoost slides
</commit_message>
<xml_diff>
--- a/Project 4 Presentation.pptx
+++ b/Project 4 Presentation.pptx
@@ -5,18 +5,19 @@
     <p:sldMasterId id="2147483648" r:id="rId4"/>
   </p:sldMasterIdLst>
   <p:notesMasterIdLst>
-    <p:notesMasterId r:id="rId11"/>
+    <p:notesMasterId r:id="rId12"/>
   </p:notesMasterIdLst>
   <p:handoutMasterIdLst>
-    <p:handoutMasterId r:id="rId12"/>
+    <p:handoutMasterId r:id="rId13"/>
   </p:handoutMasterIdLst>
   <p:sldIdLst>
     <p:sldId id="256" r:id="rId5"/>
     <p:sldId id="288" r:id="rId6"/>
     <p:sldId id="289" r:id="rId7"/>
     <p:sldId id="290" r:id="rId8"/>
-    <p:sldId id="295" r:id="rId9"/>
-    <p:sldId id="285" r:id="rId10"/>
+    <p:sldId id="296" r:id="rId9"/>
+    <p:sldId id="295" r:id="rId10"/>
+    <p:sldId id="285" r:id="rId11"/>
   </p:sldIdLst>
   <p:sldSz cx="12192000" cy="6858000"/>
   <p:notesSz cx="6858000" cy="9144000"/>
@@ -853,7 +854,7 @@
           <a:p>
             <a:fld id="{BE60DC36-8EFA-4378-9855-E019C55AC472}" type="slidenum">
               <a:rPr lang="en-US" smtClean="0"/>
-              <a:t>6</a:t>
+              <a:t>7</a:t>
             </a:fld>
             <a:endParaRPr lang="en-US" dirty="0"/>
           </a:p>
@@ -6659,6 +6660,10 @@
               <a:rPr lang="en-US" sz="3200" dirty="0" err="1"/>
               <a:t>XGBoost</a:t>
             </a:r>
+            <a:r>
+              <a:rPr lang="en-US" sz="3200" dirty="0"/>
+              <a:t>: 81.18% Accuracy with a RMSE value of 2576.06</a:t>
+            </a:r>
             <a:endParaRPr lang="en-US" sz="3600" dirty="0"/>
           </a:p>
         </p:txBody>
@@ -6845,6 +6850,615 @@
 </file>
 
 <file path=ppt/slides/slide5.xml><?xml version="1.0" encoding="utf-8"?>
+<p:sld xmlns:a="http://schemas.openxmlformats.org/drawingml/2006/main" xmlns:r="http://schemas.openxmlformats.org/officeDocument/2006/relationships" xmlns:p="http://schemas.openxmlformats.org/presentationml/2006/main">
+  <p:cSld>
+    <p:spTree>
+      <p:nvGrpSpPr>
+        <p:cNvPr id="1" name="">
+          <a:extLst>
+            <a:ext uri="{FF2B5EF4-FFF2-40B4-BE49-F238E27FC236}">
+              <a16:creationId xmlns:a16="http://schemas.microsoft.com/office/drawing/2014/main" id="{7E190D27-ADF3-0C76-633C-339005E23DB7}"/>
+            </a:ext>
+          </a:extLst>
+        </p:cNvPr>
+        <p:cNvGrpSpPr/>
+        <p:nvPr/>
+      </p:nvGrpSpPr>
+      <p:grpSpPr>
+        <a:xfrm>
+          <a:off x="0" y="0"/>
+          <a:ext cx="0" cy="0"/>
+          <a:chOff x="0" y="0"/>
+          <a:chExt cx="0" cy="0"/>
+        </a:xfrm>
+      </p:grpSpPr>
+      <p:sp>
+        <p:nvSpPr>
+          <p:cNvPr id="8" name="Content Placeholder 2">
+            <a:extLst>
+              <a:ext uri="{FF2B5EF4-FFF2-40B4-BE49-F238E27FC236}">
+                <a16:creationId xmlns:a16="http://schemas.microsoft.com/office/drawing/2014/main" id="{5F2C6A32-918B-E135-7170-7A66ADB2C81A}"/>
+              </a:ext>
+            </a:extLst>
+          </p:cNvPr>
+          <p:cNvSpPr txBox="1">
+            <a:spLocks/>
+          </p:cNvSpPr>
+          <p:nvPr/>
+        </p:nvSpPr>
+        <p:spPr>
+          <a:xfrm>
+            <a:off x="786962" y="910696"/>
+            <a:ext cx="10618076" cy="5311428"/>
+          </a:xfrm>
+          <a:prstGeom prst="rect">
+            <a:avLst/>
+          </a:prstGeom>
+        </p:spPr>
+        <p:txBody>
+          <a:bodyPr vert="horz" lIns="91440" tIns="45720" rIns="91440" bIns="45720" rtlCol="0">
+            <a:noAutofit/>
+          </a:bodyPr>
+          <a:lstStyle>
+            <a:lvl1pPr marL="228600" indent="-228600" algn="l" defTabSz="914400" rtl="0" eaLnBrk="1" latinLnBrk="0" hangingPunct="1">
+              <a:lnSpc>
+                <a:spcPct val="90000"/>
+              </a:lnSpc>
+              <a:spcBef>
+                <a:spcPts val="1000"/>
+              </a:spcBef>
+              <a:buFont typeface="Arial" panose="020B0604020202020204" pitchFamily="34" charset="0"/>
+              <a:buChar char="•"/>
+              <a:defRPr sz="2800" kern="1200">
+                <a:solidFill>
+                  <a:schemeClr val="tx1"/>
+                </a:solidFill>
+                <a:latin typeface="+mn-lt"/>
+                <a:ea typeface="+mn-ea"/>
+                <a:cs typeface="+mn-cs"/>
+              </a:defRPr>
+            </a:lvl1pPr>
+            <a:lvl2pPr marL="685800" indent="-228600" algn="l" defTabSz="914400" rtl="0" eaLnBrk="1" latinLnBrk="0" hangingPunct="1">
+              <a:lnSpc>
+                <a:spcPct val="90000"/>
+              </a:lnSpc>
+              <a:spcBef>
+                <a:spcPts val="500"/>
+              </a:spcBef>
+              <a:buFont typeface="Arial" panose="020B0604020202020204" pitchFamily="34" charset="0"/>
+              <a:buChar char="•"/>
+              <a:defRPr sz="2400" kern="1200">
+                <a:solidFill>
+                  <a:schemeClr val="tx1"/>
+                </a:solidFill>
+                <a:latin typeface="+mn-lt"/>
+                <a:ea typeface="+mn-ea"/>
+                <a:cs typeface="+mn-cs"/>
+              </a:defRPr>
+            </a:lvl2pPr>
+            <a:lvl3pPr marL="1143000" indent="-228600" algn="l" defTabSz="914400" rtl="0" eaLnBrk="1" latinLnBrk="0" hangingPunct="1">
+              <a:lnSpc>
+                <a:spcPct val="90000"/>
+              </a:lnSpc>
+              <a:spcBef>
+                <a:spcPts val="500"/>
+              </a:spcBef>
+              <a:buFont typeface="Arial" panose="020B0604020202020204" pitchFamily="34" charset="0"/>
+              <a:buChar char="•"/>
+              <a:defRPr sz="2000" kern="1200">
+                <a:solidFill>
+                  <a:schemeClr val="tx1"/>
+                </a:solidFill>
+                <a:latin typeface="+mn-lt"/>
+                <a:ea typeface="+mn-ea"/>
+                <a:cs typeface="+mn-cs"/>
+              </a:defRPr>
+            </a:lvl3pPr>
+            <a:lvl4pPr marL="1600200" indent="-228600" algn="l" defTabSz="914400" rtl="0" eaLnBrk="1" latinLnBrk="0" hangingPunct="1">
+              <a:lnSpc>
+                <a:spcPct val="90000"/>
+              </a:lnSpc>
+              <a:spcBef>
+                <a:spcPts val="500"/>
+              </a:spcBef>
+              <a:buFont typeface="Arial" panose="020B0604020202020204" pitchFamily="34" charset="0"/>
+              <a:buChar char="•"/>
+              <a:defRPr sz="1800" kern="1200">
+                <a:solidFill>
+                  <a:schemeClr val="tx1"/>
+                </a:solidFill>
+                <a:latin typeface="+mn-lt"/>
+                <a:ea typeface="+mn-ea"/>
+                <a:cs typeface="+mn-cs"/>
+              </a:defRPr>
+            </a:lvl4pPr>
+            <a:lvl5pPr marL="2057400" indent="-228600" algn="l" defTabSz="914400" rtl="0" eaLnBrk="1" latinLnBrk="0" hangingPunct="1">
+              <a:lnSpc>
+                <a:spcPct val="90000"/>
+              </a:lnSpc>
+              <a:spcBef>
+                <a:spcPts val="500"/>
+              </a:spcBef>
+              <a:buFont typeface="Arial" panose="020B0604020202020204" pitchFamily="34" charset="0"/>
+              <a:buChar char="•"/>
+              <a:defRPr sz="1800" kern="1200">
+                <a:solidFill>
+                  <a:schemeClr val="tx1"/>
+                </a:solidFill>
+                <a:latin typeface="+mn-lt"/>
+                <a:ea typeface="+mn-ea"/>
+                <a:cs typeface="+mn-cs"/>
+              </a:defRPr>
+            </a:lvl5pPr>
+            <a:lvl6pPr marL="2514600" indent="-228600" algn="l" defTabSz="914400" rtl="0" eaLnBrk="1" latinLnBrk="0" hangingPunct="1">
+              <a:lnSpc>
+                <a:spcPct val="90000"/>
+              </a:lnSpc>
+              <a:spcBef>
+                <a:spcPts val="500"/>
+              </a:spcBef>
+              <a:buFont typeface="Arial" panose="020B0604020202020204" pitchFamily="34" charset="0"/>
+              <a:buChar char="•"/>
+              <a:defRPr sz="1800" kern="1200">
+                <a:solidFill>
+                  <a:schemeClr val="tx1"/>
+                </a:solidFill>
+                <a:latin typeface="+mn-lt"/>
+                <a:ea typeface="+mn-ea"/>
+                <a:cs typeface="+mn-cs"/>
+              </a:defRPr>
+            </a:lvl6pPr>
+            <a:lvl7pPr marL="2971800" indent="-228600" algn="l" defTabSz="914400" rtl="0" eaLnBrk="1" latinLnBrk="0" hangingPunct="1">
+              <a:lnSpc>
+                <a:spcPct val="90000"/>
+              </a:lnSpc>
+              <a:spcBef>
+                <a:spcPts val="500"/>
+              </a:spcBef>
+              <a:buFont typeface="Arial" panose="020B0604020202020204" pitchFamily="34" charset="0"/>
+              <a:buChar char="•"/>
+              <a:defRPr sz="1800" kern="1200">
+                <a:solidFill>
+                  <a:schemeClr val="tx1"/>
+                </a:solidFill>
+                <a:latin typeface="+mn-lt"/>
+                <a:ea typeface="+mn-ea"/>
+                <a:cs typeface="+mn-cs"/>
+              </a:defRPr>
+            </a:lvl7pPr>
+            <a:lvl8pPr marL="3429000" indent="-228600" algn="l" defTabSz="914400" rtl="0" eaLnBrk="1" latinLnBrk="0" hangingPunct="1">
+              <a:lnSpc>
+                <a:spcPct val="90000"/>
+              </a:lnSpc>
+              <a:spcBef>
+                <a:spcPts val="500"/>
+              </a:spcBef>
+              <a:buFont typeface="Arial" panose="020B0604020202020204" pitchFamily="34" charset="0"/>
+              <a:buChar char="•"/>
+              <a:defRPr sz="1800" kern="1200">
+                <a:solidFill>
+                  <a:schemeClr val="tx1"/>
+                </a:solidFill>
+                <a:latin typeface="+mn-lt"/>
+                <a:ea typeface="+mn-ea"/>
+                <a:cs typeface="+mn-cs"/>
+              </a:defRPr>
+            </a:lvl8pPr>
+            <a:lvl9pPr marL="3886200" indent="-228600" algn="l" defTabSz="914400" rtl="0" eaLnBrk="1" latinLnBrk="0" hangingPunct="1">
+              <a:lnSpc>
+                <a:spcPct val="90000"/>
+              </a:lnSpc>
+              <a:spcBef>
+                <a:spcPts val="500"/>
+              </a:spcBef>
+              <a:buFont typeface="Arial" panose="020B0604020202020204" pitchFamily="34" charset="0"/>
+              <a:buChar char="•"/>
+              <a:defRPr sz="1800" kern="1200">
+                <a:solidFill>
+                  <a:schemeClr val="tx1"/>
+                </a:solidFill>
+                <a:latin typeface="+mn-lt"/>
+                <a:ea typeface="+mn-ea"/>
+                <a:cs typeface="+mn-cs"/>
+              </a:defRPr>
+            </a:lvl9pPr>
+          </a:lstStyle>
+          <a:p>
+            <a:r>
+              <a:rPr lang="en-US" sz="2400" dirty="0"/>
+              <a:t>The </a:t>
+            </a:r>
+            <a:r>
+              <a:rPr lang="en-US" sz="2400" dirty="0" err="1"/>
+              <a:t>XGBoost</a:t>
+            </a:r>
+            <a:r>
+              <a:rPr lang="en-US" sz="2400" dirty="0"/>
+              <a:t> model had a predictive accuracy of 81.18% with an average RMSE value of 2576.06. </a:t>
+            </a:r>
+          </a:p>
+          <a:p>
+            <a:r>
+              <a:rPr lang="en-US" sz="2400" dirty="0"/>
+              <a:t>Autotuning was used for dialing the model in. The best parameters were: {'subsample': 1.0, '</a:t>
+            </a:r>
+            <a:r>
+              <a:rPr lang="en-US" sz="2400" dirty="0" err="1"/>
+              <a:t>n_estimators</a:t>
+            </a:r>
+            <a:r>
+              <a:rPr lang="en-US" sz="2400" dirty="0"/>
+              <a:t>': 2000, '</a:t>
+            </a:r>
+            <a:r>
+              <a:rPr lang="en-US" sz="2400" dirty="0" err="1"/>
+              <a:t>min_child_weight</a:t>
+            </a:r>
+            <a:r>
+              <a:rPr lang="en-US" sz="2400" dirty="0"/>
+              <a:t>': 5, '</a:t>
+            </a:r>
+            <a:r>
+              <a:rPr lang="en-US" sz="2400" dirty="0" err="1"/>
+              <a:t>max_depth</a:t>
+            </a:r>
+            <a:r>
+              <a:rPr lang="en-US" sz="2400" dirty="0"/>
+              <a:t>': 5, '</a:t>
+            </a:r>
+            <a:r>
+              <a:rPr lang="en-US" sz="2400" dirty="0" err="1"/>
+              <a:t>learning_rate</a:t>
+            </a:r>
+            <a:r>
+              <a:rPr lang="en-US" sz="2400" dirty="0"/>
+              <a:t>': 0.3, '</a:t>
+            </a:r>
+            <a:r>
+              <a:rPr lang="en-US" sz="2400" dirty="0" err="1"/>
+              <a:t>colsample_bytree</a:t>
+            </a:r>
+            <a:r>
+              <a:rPr lang="en-US" sz="2400" dirty="0"/>
+              <a:t>': 1.0}</a:t>
+            </a:r>
+          </a:p>
+          <a:p>
+            <a:r>
+              <a:rPr lang="en-US" sz="2400" dirty="0"/>
+              <a:t>Given values for Texas in December 2023 for the various features:</a:t>
+            </a:r>
+          </a:p>
+          <a:p>
+            <a:pPr lvl="1"/>
+            <a:r>
+              <a:rPr lang="en-US" sz="1800" dirty="0"/>
+              <a:t>'year': [2025], '</a:t>
+            </a:r>
+            <a:r>
+              <a:rPr lang="en-US" sz="1800" dirty="0" err="1"/>
+              <a:t>month_num</a:t>
+            </a:r>
+            <a:r>
+              <a:rPr lang="en-US" sz="1800" dirty="0"/>
+              <a:t>': [12], '</a:t>
+            </a:r>
+            <a:r>
+              <a:rPr lang="en-US" sz="1800" dirty="0" err="1"/>
+              <a:t>tmin</a:t>
+            </a:r>
+            <a:r>
+              <a:rPr lang="en-US" sz="1800" dirty="0"/>
+              <a:t>': [2.652], '</a:t>
+            </a:r>
+            <a:r>
+              <a:rPr lang="en-US" sz="1800" dirty="0" err="1"/>
+              <a:t>tmax</a:t>
+            </a:r>
+            <a:r>
+              <a:rPr lang="en-US" sz="1800" dirty="0"/>
+              <a:t>': [15.471], '</a:t>
+            </a:r>
+            <a:r>
+              <a:rPr lang="en-US" sz="1800" dirty="0" err="1"/>
+              <a:t>tavg</a:t>
+            </a:r>
+            <a:r>
+              <a:rPr lang="en-US" sz="1800" dirty="0"/>
+              <a:t>': [9.062], 'ppt': [94.212]</a:t>
+            </a:r>
+          </a:p>
+          <a:p>
+            <a:pPr marL="0" indent="0">
+              <a:spcBef>
+                <a:spcPts val="0"/>
+              </a:spcBef>
+              <a:buNone/>
+            </a:pPr>
+            <a:r>
+              <a:rPr lang="en-US" sz="2400" dirty="0"/>
+              <a:t>The model was asked to predict coal consumption for Texas in December 2025. The model predicted a value of 2871</a:t>
+            </a:r>
+          </a:p>
+          <a:p>
+            <a:pPr marL="0" indent="0">
+              <a:spcBef>
+                <a:spcPts val="0"/>
+              </a:spcBef>
+              <a:buNone/>
+            </a:pPr>
+            <a:r>
+              <a:rPr lang="en-US" sz="2400" dirty="0"/>
+              <a:t>thousand tons. The actual coal </a:t>
+            </a:r>
+          </a:p>
+          <a:p>
+            <a:pPr marL="0" indent="0">
+              <a:spcBef>
+                <a:spcPts val="0"/>
+              </a:spcBef>
+              <a:buNone/>
+            </a:pPr>
+            <a:r>
+              <a:rPr lang="en-US" sz="2400" dirty="0"/>
+              <a:t>consumption for Texas in December </a:t>
+            </a:r>
+          </a:p>
+          <a:p>
+            <a:pPr marL="0" indent="0">
+              <a:spcBef>
+                <a:spcPts val="0"/>
+              </a:spcBef>
+              <a:buNone/>
+            </a:pPr>
+            <a:r>
+              <a:rPr lang="en-US" sz="2400" dirty="0"/>
+              <a:t>2023 was 3736. A difference of 865 </a:t>
+            </a:r>
+          </a:p>
+          <a:p>
+            <a:pPr marL="0" indent="0">
+              <a:spcBef>
+                <a:spcPts val="0"/>
+              </a:spcBef>
+              <a:buNone/>
+            </a:pPr>
+            <a:r>
+              <a:rPr lang="en-US" sz="2400" dirty="0"/>
+              <a:t>thousand tons.  </a:t>
+            </a:r>
+          </a:p>
+          <a:p>
+            <a:pPr marL="0" indent="0">
+              <a:buNone/>
+            </a:pPr>
+            <a:endParaRPr lang="en-US" sz="2400" dirty="0"/>
+          </a:p>
+        </p:txBody>
+      </p:sp>
+      <p:cxnSp>
+        <p:nvCxnSpPr>
+          <p:cNvPr id="6" name="Straight Connector 5">
+            <a:extLst>
+              <a:ext uri="{FF2B5EF4-FFF2-40B4-BE49-F238E27FC236}">
+                <a16:creationId xmlns:a16="http://schemas.microsoft.com/office/drawing/2014/main" id="{4F1A1EDC-039F-185C-B91A-A73A68E955BD}"/>
+              </a:ext>
+              <a:ext uri="{C183D7F6-B498-43B3-948B-1728B52AA6E4}">
+                <adec:decorative xmlns:adec="http://schemas.microsoft.com/office/drawing/2017/decorative" val="1"/>
+              </a:ext>
+            </a:extLst>
+          </p:cNvPr>
+          <p:cNvCxnSpPr>
+            <a:cxnSpLocks/>
+          </p:cNvCxnSpPr>
+          <p:nvPr/>
+        </p:nvCxnSpPr>
+        <p:spPr>
+          <a:xfrm>
+            <a:off x="0" y="522898"/>
+            <a:ext cx="4086225" cy="0"/>
+          </a:xfrm>
+          <a:prstGeom prst="line">
+            <a:avLst/>
+          </a:prstGeom>
+          <a:ln>
+            <a:solidFill>
+              <a:schemeClr val="accent3">
+                <a:lumMod val="50000"/>
+              </a:schemeClr>
+            </a:solidFill>
+            <a:tailEnd type="oval"/>
+          </a:ln>
+        </p:spPr>
+        <p:style>
+          <a:lnRef idx="1">
+            <a:schemeClr val="accent1"/>
+          </a:lnRef>
+          <a:fillRef idx="0">
+            <a:schemeClr val="accent1"/>
+          </a:fillRef>
+          <a:effectRef idx="0">
+            <a:schemeClr val="accent1"/>
+          </a:effectRef>
+          <a:fontRef idx="minor">
+            <a:schemeClr val="tx1"/>
+          </a:fontRef>
+        </p:style>
+      </p:cxnSp>
+      <p:cxnSp>
+        <p:nvCxnSpPr>
+          <p:cNvPr id="7" name="Straight Connector 6">
+            <a:extLst>
+              <a:ext uri="{FF2B5EF4-FFF2-40B4-BE49-F238E27FC236}">
+                <a16:creationId xmlns:a16="http://schemas.microsoft.com/office/drawing/2014/main" id="{6076C865-45DE-E5BE-20B7-1DEE098E456F}"/>
+              </a:ext>
+              <a:ext uri="{C183D7F6-B498-43B3-948B-1728B52AA6E4}">
+                <adec:decorative xmlns:adec="http://schemas.microsoft.com/office/drawing/2017/decorative" val="1"/>
+              </a:ext>
+            </a:extLst>
+          </p:cNvPr>
+          <p:cNvCxnSpPr>
+            <a:cxnSpLocks/>
+          </p:cNvCxnSpPr>
+          <p:nvPr/>
+        </p:nvCxnSpPr>
+        <p:spPr>
+          <a:xfrm>
+            <a:off x="8105775" y="522898"/>
+            <a:ext cx="4086225" cy="0"/>
+          </a:xfrm>
+          <a:prstGeom prst="line">
+            <a:avLst/>
+          </a:prstGeom>
+          <a:ln>
+            <a:solidFill>
+              <a:schemeClr val="accent3">
+                <a:lumMod val="50000"/>
+              </a:schemeClr>
+            </a:solidFill>
+            <a:headEnd type="oval"/>
+          </a:ln>
+        </p:spPr>
+        <p:style>
+          <a:lnRef idx="1">
+            <a:schemeClr val="accent1"/>
+          </a:lnRef>
+          <a:fillRef idx="0">
+            <a:schemeClr val="accent1"/>
+          </a:fillRef>
+          <a:effectRef idx="0">
+            <a:schemeClr val="accent1"/>
+          </a:effectRef>
+          <a:fontRef idx="minor">
+            <a:schemeClr val="tx1"/>
+          </a:fontRef>
+        </p:style>
+      </p:cxnSp>
+      <p:sp>
+        <p:nvSpPr>
+          <p:cNvPr id="9" name="Title 1">
+            <a:extLst>
+              <a:ext uri="{FF2B5EF4-FFF2-40B4-BE49-F238E27FC236}">
+                <a16:creationId xmlns:a16="http://schemas.microsoft.com/office/drawing/2014/main" id="{6EBD9AD6-EEA9-B141-CE4F-451CFE668FD9}"/>
+              </a:ext>
+            </a:extLst>
+          </p:cNvPr>
+          <p:cNvSpPr txBox="1">
+            <a:spLocks/>
+          </p:cNvSpPr>
+          <p:nvPr/>
+        </p:nvSpPr>
+        <p:spPr>
+          <a:xfrm>
+            <a:off x="228600" y="328999"/>
+            <a:ext cx="11734800" cy="387798"/>
+          </a:xfrm>
+          <a:prstGeom prst="rect">
+            <a:avLst/>
+          </a:prstGeom>
+        </p:spPr>
+        <p:txBody>
+          <a:bodyPr vert="horz" wrap="square" lIns="0" tIns="0" rIns="0" bIns="0" rtlCol="0" anchor="t">
+            <a:spAutoFit/>
+          </a:bodyPr>
+          <a:lstStyle>
+            <a:lvl1pPr algn="l" defTabSz="914400" rtl="0" eaLnBrk="1" latinLnBrk="0" hangingPunct="1">
+              <a:lnSpc>
+                <a:spcPct val="90000"/>
+              </a:lnSpc>
+              <a:spcBef>
+                <a:spcPct val="0"/>
+              </a:spcBef>
+              <a:buNone/>
+              <a:defRPr sz="4400" kern="1200">
+                <a:solidFill>
+                  <a:schemeClr val="tx1"/>
+                </a:solidFill>
+                <a:latin typeface="+mj-lt"/>
+                <a:ea typeface="+mj-ea"/>
+                <a:cs typeface="+mj-cs"/>
+              </a:defRPr>
+            </a:lvl1pPr>
+          </a:lstStyle>
+          <a:p>
+            <a:pPr algn="ctr"/>
+            <a:r>
+              <a:rPr lang="en-US" sz="2800" b="1" dirty="0">
+                <a:solidFill>
+                  <a:schemeClr val="tx1">
+                    <a:lumMod val="75000"/>
+                    <a:lumOff val="25000"/>
+                  </a:schemeClr>
+                </a:solidFill>
+              </a:rPr>
+              <a:t>Model: </a:t>
+            </a:r>
+            <a:r>
+              <a:rPr lang="en-US" sz="2800" b="1" dirty="0" err="1">
+                <a:solidFill>
+                  <a:schemeClr val="tx1">
+                    <a:lumMod val="75000"/>
+                    <a:lumOff val="25000"/>
+                  </a:schemeClr>
+                </a:solidFill>
+              </a:rPr>
+              <a:t>XGBoost</a:t>
+            </a:r>
+            <a:endParaRPr lang="en-US" sz="2800" dirty="0">
+              <a:solidFill>
+                <a:schemeClr val="tx1">
+                  <a:lumMod val="75000"/>
+                  <a:lumOff val="25000"/>
+                </a:schemeClr>
+              </a:solidFill>
+            </a:endParaRPr>
+          </a:p>
+        </p:txBody>
+      </p:sp>
+      <p:pic>
+        <p:nvPicPr>
+          <p:cNvPr id="3" name="Picture 2">
+            <a:extLst>
+              <a:ext uri="{FF2B5EF4-FFF2-40B4-BE49-F238E27FC236}">
+                <a16:creationId xmlns:a16="http://schemas.microsoft.com/office/drawing/2014/main" id="{600F682C-3E68-BE43-05F3-21885C3915DD}"/>
+              </a:ext>
+            </a:extLst>
+          </p:cNvPr>
+          <p:cNvPicPr>
+            <a:picLocks noChangeAspect="1"/>
+          </p:cNvPicPr>
+          <p:nvPr/>
+        </p:nvPicPr>
+        <p:blipFill>
+          <a:blip r:embed="rId2"/>
+          <a:stretch>
+            <a:fillRect/>
+          </a:stretch>
+        </p:blipFill>
+        <p:spPr>
+          <a:xfrm>
+            <a:off x="5687410" y="3883302"/>
+            <a:ext cx="5717628" cy="2645699"/>
+          </a:xfrm>
+          <a:prstGeom prst="rect">
+            <a:avLst/>
+          </a:prstGeom>
+        </p:spPr>
+      </p:pic>
+    </p:spTree>
+    <p:extLst>
+      <p:ext uri="{BB962C8B-B14F-4D97-AF65-F5344CB8AC3E}">
+        <p14:creationId xmlns:p14="http://schemas.microsoft.com/office/powerpoint/2010/main" val="3713118383"/>
+      </p:ext>
+    </p:extLst>
+  </p:cSld>
+  <p:clrMapOvr>
+    <a:masterClrMapping/>
+  </p:clrMapOvr>
+</p:sld>
+</file>
+
+<file path=ppt/slides/slide6.xml><?xml version="1.0" encoding="utf-8"?>
 <p:sld xmlns:a="http://schemas.openxmlformats.org/drawingml/2006/main" xmlns:r="http://schemas.openxmlformats.org/officeDocument/2006/relationships" xmlns:p="http://schemas.openxmlformats.org/presentationml/2006/main">
   <p:cSld>
     <p:spTree>
@@ -7083,7 +7697,7 @@
 </p:sld>
 </file>
 
-<file path=ppt/slides/slide6.xml><?xml version="1.0" encoding="utf-8"?>
+<file path=ppt/slides/slide7.xml><?xml version="1.0" encoding="utf-8"?>
 <p:sld xmlns:a="http://schemas.openxmlformats.org/drawingml/2006/main" xmlns:r="http://schemas.openxmlformats.org/officeDocument/2006/relationships" xmlns:p="http://schemas.openxmlformats.org/presentationml/2006/main">
   <p:cSld>
     <p:bg>
@@ -8129,14 +8743,6 @@
 </file>
 
 <file path=customXml/item1.xml><?xml version="1.0" encoding="utf-8"?>
-<p:properties xmlns:p="http://schemas.microsoft.com/office/2006/metadata/properties" xmlns:xsi="http://www.w3.org/2001/XMLSchema-instance" xmlns:pc="http://schemas.microsoft.com/office/infopath/2007/PartnerControls">
-  <documentManagement>
-    <MediaServiceKeyPoints xmlns="71af3243-3dd4-4a8d-8c0d-dd76da1f02a5" xsi:nil="true"/>
-  </documentManagement>
-</p:properties>
-</file>
-
-<file path=customXml/item2.xml><?xml version="1.0" encoding="utf-8"?>
 <ct:contentTypeSchema xmlns:ct="http://schemas.microsoft.com/office/2006/metadata/contentType" xmlns:ma="http://schemas.microsoft.com/office/2006/metadata/properties/metaAttributes" ct:_="" ma:_="" ma:contentTypeName="Document" ma:contentTypeID="0x01010079F111ED35F8CC479449609E8A0923A6" ma:contentTypeVersion="11" ma:contentTypeDescription="Create a new document." ma:contentTypeScope="" ma:versionID="9677210f24a1be23c92c90fd886aa0aa">
   <xsd:schema xmlns:xsd="http://www.w3.org/2001/XMLSchema" xmlns:xs="http://www.w3.org/2001/XMLSchema" xmlns:p="http://schemas.microsoft.com/office/2006/metadata/properties" xmlns:ns2="71af3243-3dd4-4a8d-8c0d-dd76da1f02a5" xmlns:ns3="16c05727-aa75-4e4a-9b5f-8a80a1165891" targetNamespace="http://schemas.microsoft.com/office/2006/metadata/properties" ma:root="true" ma:fieldsID="60e05723c5c1908df1a1a4ebf11d344e" ns2:_="" ns3:_="">
     <xsd:import namespace="71af3243-3dd4-4a8d-8c0d-dd76da1f02a5"/>
@@ -8347,6 +8953,14 @@
 </ct:contentTypeSchema>
 </file>
 
+<file path=customXml/item2.xml><?xml version="1.0" encoding="utf-8"?>
+<p:properties xmlns:p="http://schemas.microsoft.com/office/2006/metadata/properties" xmlns:xsi="http://www.w3.org/2001/XMLSchema-instance" xmlns:pc="http://schemas.microsoft.com/office/infopath/2007/PartnerControls">
+  <documentManagement>
+    <MediaServiceKeyPoints xmlns="71af3243-3dd4-4a8d-8c0d-dd76da1f02a5" xsi:nil="true"/>
+  </documentManagement>
+</p:properties>
+</file>
+
 <file path=customXml/item3.xml><?xml version="1.0" encoding="utf-8"?>
 <?mso-contentType ?>
 <FormTemplates xmlns="http://schemas.microsoft.com/sharepoint/v3/contenttype/forms">
@@ -8357,16 +8971,6 @@
 </file>
 
 <file path=customXml/itemProps1.xml><?xml version="1.0" encoding="utf-8"?>
-<ds:datastoreItem xmlns:ds="http://schemas.openxmlformats.org/officeDocument/2006/customXml" ds:itemID="{EF609EDA-869E-4BE5-AE5D-B898C584B6FF}">
-  <ds:schemaRefs>
-    <ds:schemaRef ds:uri="http://schemas.microsoft.com/office/2006/metadata/properties"/>
-    <ds:schemaRef ds:uri="http://schemas.microsoft.com/office/infopath/2007/PartnerControls"/>
-    <ds:schemaRef ds:uri="71af3243-3dd4-4a8d-8c0d-dd76da1f02a5"/>
-  </ds:schemaRefs>
-</ds:datastoreItem>
-</file>
-
-<file path=customXml/itemProps2.xml><?xml version="1.0" encoding="utf-8"?>
 <ds:datastoreItem xmlns:ds="http://schemas.openxmlformats.org/officeDocument/2006/customXml" ds:itemID="{61A00BBF-EEBB-4E18-B8CB-F926EAAC48F7}">
   <ds:schemaRefs>
     <ds:schemaRef ds:uri="http://schemas.microsoft.com/office/2006/metadata/contentType"/>
@@ -8385,6 +8989,16 @@
 </ds:datastoreItem>
 </file>
 
+<file path=customXml/itemProps2.xml><?xml version="1.0" encoding="utf-8"?>
+<ds:datastoreItem xmlns:ds="http://schemas.openxmlformats.org/officeDocument/2006/customXml" ds:itemID="{EF609EDA-869E-4BE5-AE5D-B898C584B6FF}">
+  <ds:schemaRefs>
+    <ds:schemaRef ds:uri="http://schemas.microsoft.com/office/2006/metadata/properties"/>
+    <ds:schemaRef ds:uri="http://schemas.microsoft.com/office/infopath/2007/PartnerControls"/>
+    <ds:schemaRef ds:uri="71af3243-3dd4-4a8d-8c0d-dd76da1f02a5"/>
+  </ds:schemaRefs>
+</ds:datastoreItem>
+</file>
+
 <file path=customXml/itemProps3.xml><?xml version="1.0" encoding="utf-8"?>
 <ds:datastoreItem xmlns:ds="http://schemas.openxmlformats.org/officeDocument/2006/customXml" ds:itemID="{2FD05317-60D6-4B3A-8545-888496D1A8EC}">
   <ds:schemaRefs>

</xml_diff>

<commit_message>
updating presentation with ARIMA model slide
</commit_message>
<xml_diff>
--- a/Project 4 Presentation.pptx
+++ b/Project 4 Presentation.pptx
@@ -5,19 +5,20 @@
     <p:sldMasterId id="2147483648" r:id="rId4"/>
   </p:sldMasterIdLst>
   <p:notesMasterIdLst>
-    <p:notesMasterId r:id="rId12"/>
+    <p:notesMasterId r:id="rId13"/>
   </p:notesMasterIdLst>
   <p:handoutMasterIdLst>
-    <p:handoutMasterId r:id="rId13"/>
+    <p:handoutMasterId r:id="rId14"/>
   </p:handoutMasterIdLst>
   <p:sldIdLst>
     <p:sldId id="256" r:id="rId5"/>
     <p:sldId id="288" r:id="rId6"/>
     <p:sldId id="289" r:id="rId7"/>
     <p:sldId id="290" r:id="rId8"/>
-    <p:sldId id="296" r:id="rId9"/>
-    <p:sldId id="295" r:id="rId10"/>
-    <p:sldId id="285" r:id="rId11"/>
+    <p:sldId id="297" r:id="rId9"/>
+    <p:sldId id="296" r:id="rId10"/>
+    <p:sldId id="295" r:id="rId11"/>
+    <p:sldId id="285" r:id="rId12"/>
   </p:sldIdLst>
   <p:sldSz cx="12192000" cy="6858000"/>
   <p:notesSz cx="6858000" cy="9144000"/>
@@ -161,10 +162,93 @@
 <file path=ppt/revisionInfo.xml><?xml version="1.0" encoding="utf-8"?>
 <p1510:revInfo xmlns:a="http://schemas.openxmlformats.org/drawingml/2006/main" xmlns:r="http://schemas.openxmlformats.org/officeDocument/2006/relationships" xmlns:p1510="http://schemas.microsoft.com/office/powerpoint/2015/10/main">
   <p1510:revLst>
-    <p1510:client id="{84FABC45-4695-4BE8-873B-6692B9A9150C}" v="2" dt="2024-10-15T04:44:10.322"/>
-    <p1510:client id="{DB2806FC-3737-4B44-BA66-E01A5296CF05}" v="1" dt="2024-10-16T02:01:10.473"/>
+    <p1510:client id="{F5FE3D1E-67D5-4676-B8E5-B176EB981F41}" v="13" dt="2024-12-06T07:20:33.207"/>
   </p1510:revLst>
 </p1510:revInfo>
+</file>
+
+<file path=ppt/changesInfos/changesInfo1.xml><?xml version="1.0" encoding="utf-8"?>
+<pc:chgInfo xmlns:a="http://schemas.openxmlformats.org/drawingml/2006/main" xmlns:r="http://schemas.openxmlformats.org/officeDocument/2006/relationships" xmlns:ac="http://schemas.microsoft.com/office/drawing/2013/main/command" xmlns:pc="http://schemas.microsoft.com/office/powerpoint/2013/main/command">
+  <pc:docChgLst>
+    <pc:chgData name="Matthew Smith" userId="a1dbe5e423188b17" providerId="LiveId" clId="{F5FE3D1E-67D5-4676-B8E5-B176EB981F41}"/>
+    <pc:docChg chg="undo custSel addSld delSld modSld">
+      <pc:chgData name="Matthew Smith" userId="a1dbe5e423188b17" providerId="LiveId" clId="{F5FE3D1E-67D5-4676-B8E5-B176EB981F41}" dt="2024-12-06T07:21:54.593" v="688" actId="20577"/>
+      <pc:docMkLst>
+        <pc:docMk/>
+      </pc:docMkLst>
+      <pc:sldChg chg="new del">
+        <pc:chgData name="Matthew Smith" userId="a1dbe5e423188b17" providerId="LiveId" clId="{F5FE3D1E-67D5-4676-B8E5-B176EB981F41}" dt="2024-12-06T06:45:25.469" v="1" actId="47"/>
+        <pc:sldMkLst>
+          <pc:docMk/>
+          <pc:sldMk cId="1322645427" sldId="297"/>
+        </pc:sldMkLst>
+      </pc:sldChg>
+      <pc:sldChg chg="addSp delSp modSp mod">
+        <pc:chgData name="Matthew Smith" userId="a1dbe5e423188b17" providerId="LiveId" clId="{F5FE3D1E-67D5-4676-B8E5-B176EB981F41}" dt="2024-12-06T07:21:54.593" v="688" actId="20577"/>
+        <pc:sldMkLst>
+          <pc:docMk/>
+          <pc:sldMk cId="1657733589" sldId="297"/>
+        </pc:sldMkLst>
+        <pc:spChg chg="mod">
+          <ac:chgData name="Matthew Smith" userId="a1dbe5e423188b17" providerId="LiveId" clId="{F5FE3D1E-67D5-4676-B8E5-B176EB981F41}" dt="2024-12-06T07:21:54.593" v="688" actId="20577"/>
+          <ac:spMkLst>
+            <pc:docMk/>
+            <pc:sldMk cId="1657733589" sldId="297"/>
+            <ac:spMk id="8" creationId="{0A4A0003-AA42-C314-712F-65F34E562C2D}"/>
+          </ac:spMkLst>
+        </pc:spChg>
+        <pc:spChg chg="mod">
+          <ac:chgData name="Matthew Smith" userId="a1dbe5e423188b17" providerId="LiveId" clId="{F5FE3D1E-67D5-4676-B8E5-B176EB981F41}" dt="2024-12-06T06:45:45.207" v="7" actId="6549"/>
+          <ac:spMkLst>
+            <pc:docMk/>
+            <pc:sldMk cId="1657733589" sldId="297"/>
+            <ac:spMk id="9" creationId="{A62E3EDA-E41D-A9C8-3329-926AF2199C01}"/>
+          </ac:spMkLst>
+        </pc:spChg>
+        <pc:spChg chg="add mod">
+          <ac:chgData name="Matthew Smith" userId="a1dbe5e423188b17" providerId="LiveId" clId="{F5FE3D1E-67D5-4676-B8E5-B176EB981F41}" dt="2024-12-06T07:20:55.720" v="684" actId="255"/>
+          <ac:spMkLst>
+            <pc:docMk/>
+            <pc:sldMk cId="1657733589" sldId="297"/>
+            <ac:spMk id="12" creationId="{06129F7F-D4D8-1B2F-79E4-6400A35C86FB}"/>
+          </ac:spMkLst>
+        </pc:spChg>
+        <pc:graphicFrameChg chg="add mod modGraphic">
+          <ac:chgData name="Matthew Smith" userId="a1dbe5e423188b17" providerId="LiveId" clId="{F5FE3D1E-67D5-4676-B8E5-B176EB981F41}" dt="2024-12-06T07:21:00.719" v="685" actId="1076"/>
+          <ac:graphicFrameMkLst>
+            <pc:docMk/>
+            <pc:sldMk cId="1657733589" sldId="297"/>
+            <ac:graphicFrameMk id="5" creationId="{1255034B-E79C-84EC-2578-2D95566CC9A7}"/>
+          </ac:graphicFrameMkLst>
+        </pc:graphicFrameChg>
+        <pc:picChg chg="del">
+          <ac:chgData name="Matthew Smith" userId="a1dbe5e423188b17" providerId="LiveId" clId="{F5FE3D1E-67D5-4676-B8E5-B176EB981F41}" dt="2024-12-06T06:45:51.477" v="8" actId="478"/>
+          <ac:picMkLst>
+            <pc:docMk/>
+            <pc:sldMk cId="1657733589" sldId="297"/>
+            <ac:picMk id="3" creationId="{F5FBEAA9-E8E8-B900-A599-9C74A00221A9}"/>
+          </ac:picMkLst>
+        </pc:picChg>
+        <pc:picChg chg="add mod">
+          <ac:chgData name="Matthew Smith" userId="a1dbe5e423188b17" providerId="LiveId" clId="{F5FE3D1E-67D5-4676-B8E5-B176EB981F41}" dt="2024-12-06T07:21:12.400" v="687" actId="1076"/>
+          <ac:picMkLst>
+            <pc:docMk/>
+            <pc:sldMk cId="1657733589" sldId="297"/>
+            <ac:picMk id="4" creationId="{3D524C53-60A0-FCBE-ACEA-F80887ADFCCF}"/>
+          </ac:picMkLst>
+        </pc:picChg>
+        <pc:picChg chg="add mod">
+          <ac:chgData name="Matthew Smith" userId="a1dbe5e423188b17" providerId="LiveId" clId="{F5FE3D1E-67D5-4676-B8E5-B176EB981F41}" dt="2024-12-06T07:21:07.693" v="686" actId="14100"/>
+          <ac:picMkLst>
+            <pc:docMk/>
+            <pc:sldMk cId="1657733589" sldId="297"/>
+            <ac:picMk id="11" creationId="{1FFB338C-478D-FC0E-A6C8-2E14AFB33F6A}"/>
+          </ac:picMkLst>
+        </pc:picChg>
+      </pc:sldChg>
+    </pc:docChg>
+  </pc:docChgLst>
+</pc:chgInfo>
 </file>
 
 <file path=ppt/handoutMasters/handoutMaster1.xml><?xml version="1.0" encoding="utf-8"?>
@@ -854,7 +938,7 @@
           <a:p>
             <a:fld id="{BE60DC36-8EFA-4378-9855-E019C55AC472}" type="slidenum">
               <a:rPr lang="en-US" smtClean="0"/>
-              <a:t>7</a:t>
+              <a:t>8</a:t>
             </a:fld>
             <a:endParaRPr lang="en-US" dirty="0"/>
           </a:p>
@@ -6857,6 +6941,1137 @@
         <p:cNvPr id="1" name="">
           <a:extLst>
             <a:ext uri="{FF2B5EF4-FFF2-40B4-BE49-F238E27FC236}">
+              <a16:creationId xmlns:a16="http://schemas.microsoft.com/office/drawing/2014/main" id="{51F75B1B-2E30-919C-B825-78D60E2CDAB5}"/>
+            </a:ext>
+          </a:extLst>
+        </p:cNvPr>
+        <p:cNvGrpSpPr/>
+        <p:nvPr/>
+      </p:nvGrpSpPr>
+      <p:grpSpPr>
+        <a:xfrm>
+          <a:off x="0" y="0"/>
+          <a:ext cx="0" cy="0"/>
+          <a:chOff x="0" y="0"/>
+          <a:chExt cx="0" cy="0"/>
+        </a:xfrm>
+      </p:grpSpPr>
+      <p:sp>
+        <p:nvSpPr>
+          <p:cNvPr id="8" name="Content Placeholder 2">
+            <a:extLst>
+              <a:ext uri="{FF2B5EF4-FFF2-40B4-BE49-F238E27FC236}">
+                <a16:creationId xmlns:a16="http://schemas.microsoft.com/office/drawing/2014/main" id="{0A4A0003-AA42-C314-712F-65F34E562C2D}"/>
+              </a:ext>
+            </a:extLst>
+          </p:cNvPr>
+          <p:cNvSpPr txBox="1">
+            <a:spLocks/>
+          </p:cNvSpPr>
+          <p:nvPr/>
+        </p:nvSpPr>
+        <p:spPr>
+          <a:xfrm>
+            <a:off x="786962" y="910696"/>
+            <a:ext cx="10618076" cy="2039333"/>
+          </a:xfrm>
+          <a:prstGeom prst="rect">
+            <a:avLst/>
+          </a:prstGeom>
+        </p:spPr>
+        <p:txBody>
+          <a:bodyPr vert="horz" lIns="91440" tIns="45720" rIns="91440" bIns="45720" rtlCol="0">
+            <a:noAutofit/>
+          </a:bodyPr>
+          <a:lstStyle>
+            <a:lvl1pPr marL="228600" indent="-228600" algn="l" defTabSz="914400" rtl="0" eaLnBrk="1" latinLnBrk="0" hangingPunct="1">
+              <a:lnSpc>
+                <a:spcPct val="90000"/>
+              </a:lnSpc>
+              <a:spcBef>
+                <a:spcPts val="1000"/>
+              </a:spcBef>
+              <a:buFont typeface="Arial" panose="020B0604020202020204" pitchFamily="34" charset="0"/>
+              <a:buChar char="•"/>
+              <a:defRPr sz="2800" kern="1200">
+                <a:solidFill>
+                  <a:schemeClr val="tx1"/>
+                </a:solidFill>
+                <a:latin typeface="+mn-lt"/>
+                <a:ea typeface="+mn-ea"/>
+                <a:cs typeface="+mn-cs"/>
+              </a:defRPr>
+            </a:lvl1pPr>
+            <a:lvl2pPr marL="685800" indent="-228600" algn="l" defTabSz="914400" rtl="0" eaLnBrk="1" latinLnBrk="0" hangingPunct="1">
+              <a:lnSpc>
+                <a:spcPct val="90000"/>
+              </a:lnSpc>
+              <a:spcBef>
+                <a:spcPts val="500"/>
+              </a:spcBef>
+              <a:buFont typeface="Arial" panose="020B0604020202020204" pitchFamily="34" charset="0"/>
+              <a:buChar char="•"/>
+              <a:defRPr sz="2400" kern="1200">
+                <a:solidFill>
+                  <a:schemeClr val="tx1"/>
+                </a:solidFill>
+                <a:latin typeface="+mn-lt"/>
+                <a:ea typeface="+mn-ea"/>
+                <a:cs typeface="+mn-cs"/>
+              </a:defRPr>
+            </a:lvl2pPr>
+            <a:lvl3pPr marL="1143000" indent="-228600" algn="l" defTabSz="914400" rtl="0" eaLnBrk="1" latinLnBrk="0" hangingPunct="1">
+              <a:lnSpc>
+                <a:spcPct val="90000"/>
+              </a:lnSpc>
+              <a:spcBef>
+                <a:spcPts val="500"/>
+              </a:spcBef>
+              <a:buFont typeface="Arial" panose="020B0604020202020204" pitchFamily="34" charset="0"/>
+              <a:buChar char="•"/>
+              <a:defRPr sz="2000" kern="1200">
+                <a:solidFill>
+                  <a:schemeClr val="tx1"/>
+                </a:solidFill>
+                <a:latin typeface="+mn-lt"/>
+                <a:ea typeface="+mn-ea"/>
+                <a:cs typeface="+mn-cs"/>
+              </a:defRPr>
+            </a:lvl3pPr>
+            <a:lvl4pPr marL="1600200" indent="-228600" algn="l" defTabSz="914400" rtl="0" eaLnBrk="1" latinLnBrk="0" hangingPunct="1">
+              <a:lnSpc>
+                <a:spcPct val="90000"/>
+              </a:lnSpc>
+              <a:spcBef>
+                <a:spcPts val="500"/>
+              </a:spcBef>
+              <a:buFont typeface="Arial" panose="020B0604020202020204" pitchFamily="34" charset="0"/>
+              <a:buChar char="•"/>
+              <a:defRPr sz="1800" kern="1200">
+                <a:solidFill>
+                  <a:schemeClr val="tx1"/>
+                </a:solidFill>
+                <a:latin typeface="+mn-lt"/>
+                <a:ea typeface="+mn-ea"/>
+                <a:cs typeface="+mn-cs"/>
+              </a:defRPr>
+            </a:lvl4pPr>
+            <a:lvl5pPr marL="2057400" indent="-228600" algn="l" defTabSz="914400" rtl="0" eaLnBrk="1" latinLnBrk="0" hangingPunct="1">
+              <a:lnSpc>
+                <a:spcPct val="90000"/>
+              </a:lnSpc>
+              <a:spcBef>
+                <a:spcPts val="500"/>
+              </a:spcBef>
+              <a:buFont typeface="Arial" panose="020B0604020202020204" pitchFamily="34" charset="0"/>
+              <a:buChar char="•"/>
+              <a:defRPr sz="1800" kern="1200">
+                <a:solidFill>
+                  <a:schemeClr val="tx1"/>
+                </a:solidFill>
+                <a:latin typeface="+mn-lt"/>
+                <a:ea typeface="+mn-ea"/>
+                <a:cs typeface="+mn-cs"/>
+              </a:defRPr>
+            </a:lvl5pPr>
+            <a:lvl6pPr marL="2514600" indent="-228600" algn="l" defTabSz="914400" rtl="0" eaLnBrk="1" latinLnBrk="0" hangingPunct="1">
+              <a:lnSpc>
+                <a:spcPct val="90000"/>
+              </a:lnSpc>
+              <a:spcBef>
+                <a:spcPts val="500"/>
+              </a:spcBef>
+              <a:buFont typeface="Arial" panose="020B0604020202020204" pitchFamily="34" charset="0"/>
+              <a:buChar char="•"/>
+              <a:defRPr sz="1800" kern="1200">
+                <a:solidFill>
+                  <a:schemeClr val="tx1"/>
+                </a:solidFill>
+                <a:latin typeface="+mn-lt"/>
+                <a:ea typeface="+mn-ea"/>
+                <a:cs typeface="+mn-cs"/>
+              </a:defRPr>
+            </a:lvl6pPr>
+            <a:lvl7pPr marL="2971800" indent="-228600" algn="l" defTabSz="914400" rtl="0" eaLnBrk="1" latinLnBrk="0" hangingPunct="1">
+              <a:lnSpc>
+                <a:spcPct val="90000"/>
+              </a:lnSpc>
+              <a:spcBef>
+                <a:spcPts val="500"/>
+              </a:spcBef>
+              <a:buFont typeface="Arial" panose="020B0604020202020204" pitchFamily="34" charset="0"/>
+              <a:buChar char="•"/>
+              <a:defRPr sz="1800" kern="1200">
+                <a:solidFill>
+                  <a:schemeClr val="tx1"/>
+                </a:solidFill>
+                <a:latin typeface="+mn-lt"/>
+                <a:ea typeface="+mn-ea"/>
+                <a:cs typeface="+mn-cs"/>
+              </a:defRPr>
+            </a:lvl7pPr>
+            <a:lvl8pPr marL="3429000" indent="-228600" algn="l" defTabSz="914400" rtl="0" eaLnBrk="1" latinLnBrk="0" hangingPunct="1">
+              <a:lnSpc>
+                <a:spcPct val="90000"/>
+              </a:lnSpc>
+              <a:spcBef>
+                <a:spcPts val="500"/>
+              </a:spcBef>
+              <a:buFont typeface="Arial" panose="020B0604020202020204" pitchFamily="34" charset="0"/>
+              <a:buChar char="•"/>
+              <a:defRPr sz="1800" kern="1200">
+                <a:solidFill>
+                  <a:schemeClr val="tx1"/>
+                </a:solidFill>
+                <a:latin typeface="+mn-lt"/>
+                <a:ea typeface="+mn-ea"/>
+                <a:cs typeface="+mn-cs"/>
+              </a:defRPr>
+            </a:lvl8pPr>
+            <a:lvl9pPr marL="3886200" indent="-228600" algn="l" defTabSz="914400" rtl="0" eaLnBrk="1" latinLnBrk="0" hangingPunct="1">
+              <a:lnSpc>
+                <a:spcPct val="90000"/>
+              </a:lnSpc>
+              <a:spcBef>
+                <a:spcPts val="500"/>
+              </a:spcBef>
+              <a:buFont typeface="Arial" panose="020B0604020202020204" pitchFamily="34" charset="0"/>
+              <a:buChar char="•"/>
+              <a:defRPr sz="1800" kern="1200">
+                <a:solidFill>
+                  <a:schemeClr val="tx1"/>
+                </a:solidFill>
+                <a:latin typeface="+mn-lt"/>
+                <a:ea typeface="+mn-ea"/>
+                <a:cs typeface="+mn-cs"/>
+              </a:defRPr>
+            </a:lvl9pPr>
+          </a:lstStyle>
+          <a:p>
+            <a:pPr marL="228600" marR="0" lvl="0" indent="-228600" algn="l" defTabSz="914400" rtl="0" eaLnBrk="1" fontAlgn="auto" latinLnBrk="0" hangingPunct="1">
+              <a:lnSpc>
+                <a:spcPct val="90000"/>
+              </a:lnSpc>
+              <a:spcBef>
+                <a:spcPts val="1000"/>
+              </a:spcBef>
+              <a:spcAft>
+                <a:spcPts val="0"/>
+              </a:spcAft>
+              <a:buClrTx/>
+              <a:buSzTx/>
+              <a:buFont typeface="Arial" panose="020B0604020202020204" pitchFamily="34" charset="0"/>
+              <a:buChar char="•"/>
+              <a:tabLst/>
+              <a:defRPr/>
+            </a:pPr>
+            <a:r>
+              <a:rPr kumimoji="0" lang="en-US" sz="2400" b="0" i="0" u="none" strike="noStrike" kern="1200" cap="none" spc="0" normalizeH="0" baseline="0" noProof="0" dirty="0">
+                <a:ln>
+                  <a:noFill/>
+                </a:ln>
+                <a:solidFill>
+                  <a:srgbClr val="000000"/>
+                </a:solidFill>
+                <a:effectLst/>
+                <a:uLnTx/>
+                <a:uFillTx/>
+                <a:latin typeface="Segoe UI Light"/>
+                <a:ea typeface="+mn-ea"/>
+                <a:cs typeface="+mn-cs"/>
+              </a:rPr>
+              <a:t>The </a:t>
+            </a:r>
+            <a:r>
+              <a:rPr lang="en-US" sz="2400" dirty="0">
+                <a:solidFill>
+                  <a:srgbClr val="000000"/>
+                </a:solidFill>
+                <a:latin typeface="Segoe UI Light"/>
+              </a:rPr>
+              <a:t>ARIMA</a:t>
+            </a:r>
+            <a:r>
+              <a:rPr kumimoji="0" lang="en-US" sz="2400" b="0" i="0" u="none" strike="noStrike" kern="1200" cap="none" spc="0" normalizeH="0" baseline="0" noProof="0" dirty="0">
+                <a:ln>
+                  <a:noFill/>
+                </a:ln>
+                <a:solidFill>
+                  <a:srgbClr val="000000"/>
+                </a:solidFill>
+                <a:effectLst/>
+                <a:uLnTx/>
+                <a:uFillTx/>
+                <a:latin typeface="Segoe UI Light"/>
+                <a:ea typeface="+mn-ea"/>
+                <a:cs typeface="+mn-cs"/>
+              </a:rPr>
+              <a:t> model had an average RMSE value of 1771.17, </a:t>
+            </a:r>
+            <a:r>
+              <a:rPr kumimoji="0" lang="en-US" sz="2400" b="0" i="0" u="none" strike="noStrike" kern="1200" cap="none" spc="0" normalizeH="0" baseline="0" noProof="0">
+                <a:ln>
+                  <a:noFill/>
+                </a:ln>
+                <a:solidFill>
+                  <a:srgbClr val="000000"/>
+                </a:solidFill>
+                <a:effectLst/>
+                <a:uLnTx/>
+                <a:uFillTx/>
+                <a:latin typeface="Segoe UI Light"/>
+                <a:ea typeface="+mn-ea"/>
+                <a:cs typeface="+mn-cs"/>
+              </a:rPr>
+              <a:t>Mean Absolute </a:t>
+            </a:r>
+            <a:r>
+              <a:rPr kumimoji="0" lang="en-US" sz="2400" b="0" i="0" u="none" strike="noStrike" kern="1200" cap="none" spc="0" normalizeH="0" baseline="0" noProof="0" dirty="0">
+                <a:ln>
+                  <a:noFill/>
+                </a:ln>
+                <a:solidFill>
+                  <a:srgbClr val="000000"/>
+                </a:solidFill>
+                <a:effectLst/>
+                <a:uLnTx/>
+                <a:uFillTx/>
+                <a:latin typeface="Segoe UI Light"/>
+                <a:ea typeface="+mn-ea"/>
+                <a:cs typeface="+mn-cs"/>
+              </a:rPr>
+              <a:t>Error of 1494.48, and R-squared value of 0.06 (indicating the model explains only about 6.32% of the variability in coal consumption). </a:t>
+            </a:r>
+          </a:p>
+          <a:p>
+            <a:pPr marL="228600" marR="0" lvl="0" indent="-228600" algn="l" defTabSz="914400" rtl="0" eaLnBrk="1" fontAlgn="auto" latinLnBrk="0" hangingPunct="1">
+              <a:lnSpc>
+                <a:spcPct val="90000"/>
+              </a:lnSpc>
+              <a:spcBef>
+                <a:spcPts val="1000"/>
+              </a:spcBef>
+              <a:spcAft>
+                <a:spcPts val="0"/>
+              </a:spcAft>
+              <a:buClrTx/>
+              <a:buSzTx/>
+              <a:buFont typeface="Arial" panose="020B0604020202020204" pitchFamily="34" charset="0"/>
+              <a:buChar char="•"/>
+              <a:tabLst/>
+              <a:defRPr/>
+            </a:pPr>
+            <a:r>
+              <a:rPr kumimoji="0" lang="en-US" sz="2400" b="0" i="0" u="none" strike="noStrike" kern="1200" cap="none" spc="0" normalizeH="0" baseline="0" noProof="0" dirty="0">
+                <a:ln>
+                  <a:noFill/>
+                </a:ln>
+                <a:solidFill>
+                  <a:srgbClr val="000000"/>
+                </a:solidFill>
+                <a:effectLst/>
+                <a:uLnTx/>
+                <a:uFillTx/>
+                <a:latin typeface="Segoe UI Light"/>
+                <a:ea typeface="+mn-ea"/>
+                <a:cs typeface="+mn-cs"/>
+              </a:rPr>
+              <a:t>Auto-ARIMA was used to find the best parameters. “ARIMA(2,1,1)(0,0,0)[0]” was identified to be the best model.</a:t>
+            </a:r>
+          </a:p>
+        </p:txBody>
+      </p:sp>
+      <p:cxnSp>
+        <p:nvCxnSpPr>
+          <p:cNvPr id="6" name="Straight Connector 5">
+            <a:extLst>
+              <a:ext uri="{FF2B5EF4-FFF2-40B4-BE49-F238E27FC236}">
+                <a16:creationId xmlns:a16="http://schemas.microsoft.com/office/drawing/2014/main" id="{1021C110-38BD-AC34-1A9F-6BA362D96B29}"/>
+              </a:ext>
+              <a:ext uri="{C183D7F6-B498-43B3-948B-1728B52AA6E4}">
+                <adec:decorative xmlns:adec="http://schemas.microsoft.com/office/drawing/2017/decorative" val="1"/>
+              </a:ext>
+            </a:extLst>
+          </p:cNvPr>
+          <p:cNvCxnSpPr>
+            <a:cxnSpLocks/>
+          </p:cNvCxnSpPr>
+          <p:nvPr/>
+        </p:nvCxnSpPr>
+        <p:spPr>
+          <a:xfrm>
+            <a:off x="0" y="522898"/>
+            <a:ext cx="4086225" cy="0"/>
+          </a:xfrm>
+          <a:prstGeom prst="line">
+            <a:avLst/>
+          </a:prstGeom>
+          <a:ln>
+            <a:solidFill>
+              <a:schemeClr val="accent3">
+                <a:lumMod val="50000"/>
+              </a:schemeClr>
+            </a:solidFill>
+            <a:tailEnd type="oval"/>
+          </a:ln>
+        </p:spPr>
+        <p:style>
+          <a:lnRef idx="1">
+            <a:schemeClr val="accent1"/>
+          </a:lnRef>
+          <a:fillRef idx="0">
+            <a:schemeClr val="accent1"/>
+          </a:fillRef>
+          <a:effectRef idx="0">
+            <a:schemeClr val="accent1"/>
+          </a:effectRef>
+          <a:fontRef idx="minor">
+            <a:schemeClr val="tx1"/>
+          </a:fontRef>
+        </p:style>
+      </p:cxnSp>
+      <p:cxnSp>
+        <p:nvCxnSpPr>
+          <p:cNvPr id="7" name="Straight Connector 6">
+            <a:extLst>
+              <a:ext uri="{FF2B5EF4-FFF2-40B4-BE49-F238E27FC236}">
+                <a16:creationId xmlns:a16="http://schemas.microsoft.com/office/drawing/2014/main" id="{81922A0C-0360-E497-25FD-B3EDB03A0349}"/>
+              </a:ext>
+              <a:ext uri="{C183D7F6-B498-43B3-948B-1728B52AA6E4}">
+                <adec:decorative xmlns:adec="http://schemas.microsoft.com/office/drawing/2017/decorative" val="1"/>
+              </a:ext>
+            </a:extLst>
+          </p:cNvPr>
+          <p:cNvCxnSpPr>
+            <a:cxnSpLocks/>
+          </p:cNvCxnSpPr>
+          <p:nvPr/>
+        </p:nvCxnSpPr>
+        <p:spPr>
+          <a:xfrm>
+            <a:off x="8105775" y="522898"/>
+            <a:ext cx="4086225" cy="0"/>
+          </a:xfrm>
+          <a:prstGeom prst="line">
+            <a:avLst/>
+          </a:prstGeom>
+          <a:ln>
+            <a:solidFill>
+              <a:schemeClr val="accent3">
+                <a:lumMod val="50000"/>
+              </a:schemeClr>
+            </a:solidFill>
+            <a:headEnd type="oval"/>
+          </a:ln>
+        </p:spPr>
+        <p:style>
+          <a:lnRef idx="1">
+            <a:schemeClr val="accent1"/>
+          </a:lnRef>
+          <a:fillRef idx="0">
+            <a:schemeClr val="accent1"/>
+          </a:fillRef>
+          <a:effectRef idx="0">
+            <a:schemeClr val="accent1"/>
+          </a:effectRef>
+          <a:fontRef idx="minor">
+            <a:schemeClr val="tx1"/>
+          </a:fontRef>
+        </p:style>
+      </p:cxnSp>
+      <p:sp>
+        <p:nvSpPr>
+          <p:cNvPr id="9" name="Title 1">
+            <a:extLst>
+              <a:ext uri="{FF2B5EF4-FFF2-40B4-BE49-F238E27FC236}">
+                <a16:creationId xmlns:a16="http://schemas.microsoft.com/office/drawing/2014/main" id="{A62E3EDA-E41D-A9C8-3329-926AF2199C01}"/>
+              </a:ext>
+            </a:extLst>
+          </p:cNvPr>
+          <p:cNvSpPr txBox="1">
+            <a:spLocks/>
+          </p:cNvSpPr>
+          <p:nvPr/>
+        </p:nvSpPr>
+        <p:spPr>
+          <a:xfrm>
+            <a:off x="228600" y="328999"/>
+            <a:ext cx="11734800" cy="387798"/>
+          </a:xfrm>
+          <a:prstGeom prst="rect">
+            <a:avLst/>
+          </a:prstGeom>
+        </p:spPr>
+        <p:txBody>
+          <a:bodyPr vert="horz" wrap="square" lIns="0" tIns="0" rIns="0" bIns="0" rtlCol="0" anchor="t">
+            <a:spAutoFit/>
+          </a:bodyPr>
+          <a:lstStyle>
+            <a:lvl1pPr algn="l" defTabSz="914400" rtl="0" eaLnBrk="1" latinLnBrk="0" hangingPunct="1">
+              <a:lnSpc>
+                <a:spcPct val="90000"/>
+              </a:lnSpc>
+              <a:spcBef>
+                <a:spcPct val="0"/>
+              </a:spcBef>
+              <a:buNone/>
+              <a:defRPr sz="4400" kern="1200">
+                <a:solidFill>
+                  <a:schemeClr val="tx1"/>
+                </a:solidFill>
+                <a:latin typeface="+mj-lt"/>
+                <a:ea typeface="+mj-ea"/>
+                <a:cs typeface="+mj-cs"/>
+              </a:defRPr>
+            </a:lvl1pPr>
+          </a:lstStyle>
+          <a:p>
+            <a:pPr marL="0" marR="0" lvl="0" indent="0" algn="ctr" defTabSz="914400" rtl="0" eaLnBrk="1" fontAlgn="auto" latinLnBrk="0" hangingPunct="1">
+              <a:lnSpc>
+                <a:spcPct val="90000"/>
+              </a:lnSpc>
+              <a:spcBef>
+                <a:spcPct val="0"/>
+              </a:spcBef>
+              <a:spcAft>
+                <a:spcPts val="0"/>
+              </a:spcAft>
+              <a:buClrTx/>
+              <a:buSzTx/>
+              <a:buFontTx/>
+              <a:buNone/>
+              <a:tabLst/>
+              <a:defRPr/>
+            </a:pPr>
+            <a:r>
+              <a:rPr kumimoji="0" lang="en-US" sz="2800" b="1" i="0" u="none" strike="noStrike" kern="1200" cap="none" spc="0" normalizeH="0" baseline="0" noProof="0" dirty="0">
+                <a:ln>
+                  <a:noFill/>
+                </a:ln>
+                <a:solidFill>
+                  <a:srgbClr val="000000">
+                    <a:lumMod val="75000"/>
+                    <a:lumOff val="25000"/>
+                  </a:srgbClr>
+                </a:solidFill>
+                <a:effectLst/>
+                <a:uLnTx/>
+                <a:uFillTx/>
+                <a:latin typeface="Century Gothic"/>
+                <a:ea typeface="+mj-ea"/>
+                <a:cs typeface="+mj-cs"/>
+              </a:rPr>
+              <a:t>Model: ARIMA</a:t>
+            </a:r>
+            <a:endParaRPr kumimoji="0" lang="en-US" sz="2800" b="0" i="0" u="none" strike="noStrike" kern="1200" cap="none" spc="0" normalizeH="0" baseline="0" noProof="0" dirty="0">
+              <a:ln>
+                <a:noFill/>
+              </a:ln>
+              <a:solidFill>
+                <a:srgbClr val="000000">
+                  <a:lumMod val="75000"/>
+                  <a:lumOff val="25000"/>
+                </a:srgbClr>
+              </a:solidFill>
+              <a:effectLst/>
+              <a:uLnTx/>
+              <a:uFillTx/>
+              <a:latin typeface="Century Gothic"/>
+              <a:ea typeface="+mj-ea"/>
+              <a:cs typeface="+mj-cs"/>
+            </a:endParaRPr>
+          </a:p>
+        </p:txBody>
+      </p:sp>
+      <p:pic>
+        <p:nvPicPr>
+          <p:cNvPr id="4" name="Picture 3">
+            <a:extLst>
+              <a:ext uri="{FF2B5EF4-FFF2-40B4-BE49-F238E27FC236}">
+                <a16:creationId xmlns:a16="http://schemas.microsoft.com/office/drawing/2014/main" id="{3D524C53-60A0-FCBE-ACEA-F80887ADFCCF}"/>
+              </a:ext>
+            </a:extLst>
+          </p:cNvPr>
+          <p:cNvPicPr>
+            <a:picLocks noChangeAspect="1"/>
+          </p:cNvPicPr>
+          <p:nvPr/>
+        </p:nvPicPr>
+        <p:blipFill>
+          <a:blip r:embed="rId2"/>
+          <a:stretch>
+            <a:fillRect/>
+          </a:stretch>
+        </p:blipFill>
+        <p:spPr>
+          <a:xfrm>
+            <a:off x="5591409" y="2477180"/>
+            <a:ext cx="5537638" cy="2512948"/>
+          </a:xfrm>
+          <a:prstGeom prst="rect">
+            <a:avLst/>
+          </a:prstGeom>
+        </p:spPr>
+      </p:pic>
+      <p:graphicFrame>
+        <p:nvGraphicFramePr>
+          <p:cNvPr id="5" name="Table 4">
+            <a:extLst>
+              <a:ext uri="{FF2B5EF4-FFF2-40B4-BE49-F238E27FC236}">
+                <a16:creationId xmlns:a16="http://schemas.microsoft.com/office/drawing/2014/main" id="{1255034B-E79C-84EC-2578-2D95566CC9A7}"/>
+              </a:ext>
+            </a:extLst>
+          </p:cNvPr>
+          <p:cNvGraphicFramePr>
+            <a:graphicFrameLocks noGrp="1"/>
+          </p:cNvGraphicFramePr>
+          <p:nvPr>
+            <p:extLst>
+              <p:ext uri="{D42A27DB-BD31-4B8C-83A1-F6EECF244321}">
+                <p14:modId xmlns:p14="http://schemas.microsoft.com/office/powerpoint/2010/main" val="4267873594"/>
+              </p:ext>
+            </p:extLst>
+          </p:nvPr>
+        </p:nvGraphicFramePr>
+        <p:xfrm>
+          <a:off x="2043112" y="4334441"/>
+          <a:ext cx="3033924" cy="2194560"/>
+        </p:xfrm>
+        <a:graphic>
+          <a:graphicData uri="http://schemas.openxmlformats.org/drawingml/2006/table">
+            <a:tbl>
+              <a:tblPr firstRow="1" bandRow="1">
+                <a:tableStyleId>{5C22544A-7EE6-4342-B048-85BDC9FD1C3A}</a:tableStyleId>
+              </a:tblPr>
+              <a:tblGrid>
+                <a:gridCol w="1927096">
+                  <a:extLst>
+                    <a:ext uri="{9D8B030D-6E8A-4147-A177-3AD203B41FA5}">
+                      <a16:colId xmlns:a16="http://schemas.microsoft.com/office/drawing/2014/main" val="1742975427"/>
+                    </a:ext>
+                  </a:extLst>
+                </a:gridCol>
+                <a:gridCol w="1106828">
+                  <a:extLst>
+                    <a:ext uri="{9D8B030D-6E8A-4147-A177-3AD203B41FA5}">
+                      <a16:colId xmlns:a16="http://schemas.microsoft.com/office/drawing/2014/main" val="134308574"/>
+                    </a:ext>
+                  </a:extLst>
+                </a:gridCol>
+              </a:tblGrid>
+              <a:tr h="349069">
+                <a:tc gridSpan="2">
+                  <a:txBody>
+                    <a:bodyPr/>
+                    <a:lstStyle/>
+                    <a:p>
+                      <a:pPr marL="0" marR="0" lvl="0" indent="0" algn="ctr" defTabSz="914400" rtl="0" eaLnBrk="1" fontAlgn="auto" latinLnBrk="0" hangingPunct="1">
+                        <a:lnSpc>
+                          <a:spcPct val="100000"/>
+                        </a:lnSpc>
+                        <a:spcBef>
+                          <a:spcPts val="0"/>
+                        </a:spcBef>
+                        <a:spcAft>
+                          <a:spcPts val="0"/>
+                        </a:spcAft>
+                        <a:buClrTx/>
+                        <a:buSzTx/>
+                        <a:buFontTx/>
+                        <a:buNone/>
+                        <a:tabLst/>
+                        <a:defRPr/>
+                      </a:pPr>
+                      <a:r>
+                        <a:rPr kumimoji="0" lang="en-US" sz="1800" b="1" i="0" u="none" strike="noStrike" kern="1200" cap="none" spc="0" normalizeH="0" baseline="0" noProof="0" dirty="0">
+                          <a:ln>
+                            <a:noFill/>
+                          </a:ln>
+                          <a:solidFill>
+                            <a:srgbClr val="000000"/>
+                          </a:solidFill>
+                          <a:effectLst/>
+                          <a:uLnTx/>
+                          <a:uFillTx/>
+                          <a:latin typeface="+mn-lt"/>
+                          <a:ea typeface="+mn-ea"/>
+                          <a:cs typeface="+mn-cs"/>
+                        </a:rPr>
+                        <a:t>Predicted coal consumption</a:t>
+                      </a:r>
+                    </a:p>
+                  </a:txBody>
+                  <a:tcPr/>
+                </a:tc>
+                <a:tc hMerge="1">
+                  <a:txBody>
+                    <a:bodyPr/>
+                    <a:lstStyle/>
+                    <a:p>
+                      <a:endParaRPr lang="en-US" dirty="0"/>
+                    </a:p>
+                  </a:txBody>
+                  <a:tcPr/>
+                </a:tc>
+                <a:extLst>
+                  <a:ext uri="{0D108BD9-81ED-4DB2-BD59-A6C34878D82A}">
+                    <a16:rowId xmlns:a16="http://schemas.microsoft.com/office/drawing/2014/main" val="4082509038"/>
+                  </a:ext>
+                </a:extLst>
+              </a:tr>
+              <a:tr h="349069">
+                <a:tc>
+                  <a:txBody>
+                    <a:bodyPr/>
+                    <a:lstStyle/>
+                    <a:p>
+                      <a:r>
+                        <a:rPr lang="en-US" sz="1800" dirty="0">
+                          <a:solidFill>
+                            <a:srgbClr val="000000"/>
+                          </a:solidFill>
+                          <a:latin typeface="+mn-lt"/>
+                        </a:rPr>
+                        <a:t>January 2024</a:t>
+                      </a:r>
+                      <a:endParaRPr lang="en-US" dirty="0"/>
+                    </a:p>
+                  </a:txBody>
+                  <a:tcPr/>
+                </a:tc>
+                <a:tc>
+                  <a:txBody>
+                    <a:bodyPr/>
+                    <a:lstStyle/>
+                    <a:p>
+                      <a:pPr marL="0" marR="0" lvl="0" indent="0" algn="l" defTabSz="914400" rtl="0" eaLnBrk="1" fontAlgn="auto" latinLnBrk="0" hangingPunct="1">
+                        <a:lnSpc>
+                          <a:spcPct val="100000"/>
+                        </a:lnSpc>
+                        <a:spcBef>
+                          <a:spcPts val="0"/>
+                        </a:spcBef>
+                        <a:spcAft>
+                          <a:spcPts val="0"/>
+                        </a:spcAft>
+                        <a:buClrTx/>
+                        <a:buSzTx/>
+                        <a:buFontTx/>
+                        <a:buNone/>
+                        <a:tabLst/>
+                        <a:defRPr/>
+                      </a:pPr>
+                      <a:r>
+                        <a:rPr lang="en-US" sz="1800" dirty="0">
+                          <a:solidFill>
+                            <a:srgbClr val="000000"/>
+                          </a:solidFill>
+                          <a:latin typeface="+mn-lt"/>
+                        </a:rPr>
+                        <a:t>4193</a:t>
+                      </a:r>
+                    </a:p>
+                  </a:txBody>
+                  <a:tcPr/>
+                </a:tc>
+                <a:extLst>
+                  <a:ext uri="{0D108BD9-81ED-4DB2-BD59-A6C34878D82A}">
+                    <a16:rowId xmlns:a16="http://schemas.microsoft.com/office/drawing/2014/main" val="2653684665"/>
+                  </a:ext>
+                </a:extLst>
+              </a:tr>
+              <a:tr h="349069">
+                <a:tc>
+                  <a:txBody>
+                    <a:bodyPr/>
+                    <a:lstStyle/>
+                    <a:p>
+                      <a:r>
+                        <a:rPr kumimoji="0" lang="en-US" sz="1800" b="0" i="0" u="none" strike="noStrike" kern="1200" cap="none" spc="0" normalizeH="0" baseline="0" noProof="0" dirty="0">
+                          <a:ln>
+                            <a:noFill/>
+                          </a:ln>
+                          <a:solidFill>
+                            <a:srgbClr val="000000"/>
+                          </a:solidFill>
+                          <a:effectLst/>
+                          <a:uLnTx/>
+                          <a:uFillTx/>
+                          <a:latin typeface="+mn-lt"/>
+                          <a:ea typeface="+mn-ea"/>
+                          <a:cs typeface="+mn-cs"/>
+                        </a:rPr>
+                        <a:t>February 2024</a:t>
+                      </a:r>
+                      <a:endParaRPr lang="en-US" dirty="0"/>
+                    </a:p>
+                  </a:txBody>
+                  <a:tcPr/>
+                </a:tc>
+                <a:tc>
+                  <a:txBody>
+                    <a:bodyPr/>
+                    <a:lstStyle/>
+                    <a:p>
+                      <a:pPr marL="0" marR="0" lvl="0" indent="0" algn="l" defTabSz="914400" rtl="0" eaLnBrk="1" fontAlgn="auto" latinLnBrk="0" hangingPunct="1">
+                        <a:lnSpc>
+                          <a:spcPct val="100000"/>
+                        </a:lnSpc>
+                        <a:spcBef>
+                          <a:spcPts val="0"/>
+                        </a:spcBef>
+                        <a:spcAft>
+                          <a:spcPts val="0"/>
+                        </a:spcAft>
+                        <a:buClrTx/>
+                        <a:buSzTx/>
+                        <a:buFontTx/>
+                        <a:buNone/>
+                        <a:tabLst/>
+                        <a:defRPr/>
+                      </a:pPr>
+                      <a:r>
+                        <a:rPr kumimoji="0" lang="en-US" sz="1800" b="0" i="0" u="none" strike="noStrike" kern="1200" cap="none" spc="0" normalizeH="0" baseline="0" noProof="0" dirty="0">
+                          <a:ln>
+                            <a:noFill/>
+                          </a:ln>
+                          <a:solidFill>
+                            <a:srgbClr val="000000"/>
+                          </a:solidFill>
+                          <a:effectLst/>
+                          <a:uLnTx/>
+                          <a:uFillTx/>
+                          <a:latin typeface="+mn-lt"/>
+                          <a:ea typeface="+mn-ea"/>
+                          <a:cs typeface="+mn-cs"/>
+                        </a:rPr>
+                        <a:t>4789</a:t>
+                      </a:r>
+                    </a:p>
+                  </a:txBody>
+                  <a:tcPr/>
+                </a:tc>
+                <a:extLst>
+                  <a:ext uri="{0D108BD9-81ED-4DB2-BD59-A6C34878D82A}">
+                    <a16:rowId xmlns:a16="http://schemas.microsoft.com/office/drawing/2014/main" val="3957239976"/>
+                  </a:ext>
+                </a:extLst>
+              </a:tr>
+              <a:tr h="349069">
+                <a:tc>
+                  <a:txBody>
+                    <a:bodyPr/>
+                    <a:lstStyle/>
+                    <a:p>
+                      <a:r>
+                        <a:rPr lang="en-US" sz="1800" dirty="0">
+                          <a:solidFill>
+                            <a:srgbClr val="000000"/>
+                          </a:solidFill>
+                          <a:latin typeface="+mn-lt"/>
+                        </a:rPr>
+                        <a:t>March 2024</a:t>
+                      </a:r>
+                      <a:endParaRPr lang="en-US" dirty="0"/>
+                    </a:p>
+                  </a:txBody>
+                  <a:tcPr/>
+                </a:tc>
+                <a:tc>
+                  <a:txBody>
+                    <a:bodyPr/>
+                    <a:lstStyle/>
+                    <a:p>
+                      <a:pPr marL="0" marR="0" lvl="0" indent="0" algn="l" defTabSz="914400" rtl="0" eaLnBrk="1" fontAlgn="auto" latinLnBrk="0" hangingPunct="1">
+                        <a:lnSpc>
+                          <a:spcPct val="100000"/>
+                        </a:lnSpc>
+                        <a:spcBef>
+                          <a:spcPts val="0"/>
+                        </a:spcBef>
+                        <a:spcAft>
+                          <a:spcPts val="0"/>
+                        </a:spcAft>
+                        <a:buClrTx/>
+                        <a:buSzTx/>
+                        <a:buFontTx/>
+                        <a:buNone/>
+                        <a:tabLst/>
+                        <a:defRPr/>
+                      </a:pPr>
+                      <a:r>
+                        <a:rPr lang="en-US" sz="1800" dirty="0">
+                          <a:solidFill>
+                            <a:srgbClr val="000000"/>
+                          </a:solidFill>
+                          <a:latin typeface="+mn-lt"/>
+                        </a:rPr>
+                        <a:t>5276</a:t>
+                      </a:r>
+                    </a:p>
+                  </a:txBody>
+                  <a:tcPr/>
+                </a:tc>
+                <a:extLst>
+                  <a:ext uri="{0D108BD9-81ED-4DB2-BD59-A6C34878D82A}">
+                    <a16:rowId xmlns:a16="http://schemas.microsoft.com/office/drawing/2014/main" val="4173608989"/>
+                  </a:ext>
+                </a:extLst>
+              </a:tr>
+              <a:tr h="349069">
+                <a:tc>
+                  <a:txBody>
+                    <a:bodyPr/>
+                    <a:lstStyle/>
+                    <a:p>
+                      <a:r>
+                        <a:rPr kumimoji="0" lang="en-US" sz="1800" b="0" i="0" u="none" strike="noStrike" kern="1200" cap="none" spc="0" normalizeH="0" baseline="0" noProof="0" dirty="0">
+                          <a:ln>
+                            <a:noFill/>
+                          </a:ln>
+                          <a:solidFill>
+                            <a:srgbClr val="000000"/>
+                          </a:solidFill>
+                          <a:effectLst/>
+                          <a:uLnTx/>
+                          <a:uFillTx/>
+                          <a:latin typeface="+mn-lt"/>
+                          <a:ea typeface="+mn-ea"/>
+                          <a:cs typeface="+mn-cs"/>
+                        </a:rPr>
+                        <a:t>April 2024</a:t>
+                      </a:r>
+                      <a:endParaRPr lang="en-US" dirty="0"/>
+                    </a:p>
+                  </a:txBody>
+                  <a:tcPr/>
+                </a:tc>
+                <a:tc>
+                  <a:txBody>
+                    <a:bodyPr/>
+                    <a:lstStyle/>
+                    <a:p>
+                      <a:pPr marL="0" marR="0" lvl="0" indent="0" algn="l" defTabSz="914400" rtl="0" eaLnBrk="1" fontAlgn="auto" latinLnBrk="0" hangingPunct="1">
+                        <a:lnSpc>
+                          <a:spcPct val="100000"/>
+                        </a:lnSpc>
+                        <a:spcBef>
+                          <a:spcPts val="0"/>
+                        </a:spcBef>
+                        <a:spcAft>
+                          <a:spcPts val="0"/>
+                        </a:spcAft>
+                        <a:buClrTx/>
+                        <a:buSzTx/>
+                        <a:buFontTx/>
+                        <a:buNone/>
+                        <a:tabLst/>
+                        <a:defRPr/>
+                      </a:pPr>
+                      <a:r>
+                        <a:rPr kumimoji="0" lang="en-US" sz="1800" b="0" i="0" u="none" strike="noStrike" kern="1200" cap="none" spc="0" normalizeH="0" baseline="0" noProof="0" dirty="0">
+                          <a:ln>
+                            <a:noFill/>
+                          </a:ln>
+                          <a:solidFill>
+                            <a:srgbClr val="000000"/>
+                          </a:solidFill>
+                          <a:effectLst/>
+                          <a:uLnTx/>
+                          <a:uFillTx/>
+                          <a:latin typeface="+mn-lt"/>
+                          <a:ea typeface="+mn-ea"/>
+                          <a:cs typeface="+mn-cs"/>
+                        </a:rPr>
+                        <a:t>5673</a:t>
+                      </a:r>
+                    </a:p>
+                  </a:txBody>
+                  <a:tcPr/>
+                </a:tc>
+                <a:extLst>
+                  <a:ext uri="{0D108BD9-81ED-4DB2-BD59-A6C34878D82A}">
+                    <a16:rowId xmlns:a16="http://schemas.microsoft.com/office/drawing/2014/main" val="1336981244"/>
+                  </a:ext>
+                </a:extLst>
+              </a:tr>
+              <a:tr h="349069">
+                <a:tc>
+                  <a:txBody>
+                    <a:bodyPr/>
+                    <a:lstStyle/>
+                    <a:p>
+                      <a:r>
+                        <a:rPr lang="en-US" sz="1800" dirty="0">
+                          <a:solidFill>
+                            <a:srgbClr val="000000"/>
+                          </a:solidFill>
+                          <a:latin typeface="+mn-lt"/>
+                        </a:rPr>
+                        <a:t>May 2024</a:t>
+                      </a:r>
+                      <a:endParaRPr lang="en-US" dirty="0"/>
+                    </a:p>
+                  </a:txBody>
+                  <a:tcPr/>
+                </a:tc>
+                <a:tc>
+                  <a:txBody>
+                    <a:bodyPr/>
+                    <a:lstStyle/>
+                    <a:p>
+                      <a:r>
+                        <a:rPr lang="en-US" sz="1800" dirty="0">
+                          <a:solidFill>
+                            <a:srgbClr val="000000"/>
+                          </a:solidFill>
+                          <a:latin typeface="+mn-lt"/>
+                        </a:rPr>
+                        <a:t>5998</a:t>
+                      </a:r>
+                      <a:endParaRPr lang="en-US" dirty="0"/>
+                    </a:p>
+                  </a:txBody>
+                  <a:tcPr/>
+                </a:tc>
+                <a:extLst>
+                  <a:ext uri="{0D108BD9-81ED-4DB2-BD59-A6C34878D82A}">
+                    <a16:rowId xmlns:a16="http://schemas.microsoft.com/office/drawing/2014/main" val="4057797141"/>
+                  </a:ext>
+                </a:extLst>
+              </a:tr>
+            </a:tbl>
+          </a:graphicData>
+        </a:graphic>
+      </p:graphicFrame>
+      <p:pic>
+        <p:nvPicPr>
+          <p:cNvPr id="11" name="Picture 10">
+            <a:extLst>
+              <a:ext uri="{FF2B5EF4-FFF2-40B4-BE49-F238E27FC236}">
+                <a16:creationId xmlns:a16="http://schemas.microsoft.com/office/drawing/2014/main" id="{1FFB338C-478D-FC0E-A6C8-2E14AFB33F6A}"/>
+              </a:ext>
+            </a:extLst>
+          </p:cNvPr>
+          <p:cNvPicPr>
+            <a:picLocks noChangeAspect="1"/>
+          </p:cNvPicPr>
+          <p:nvPr/>
+        </p:nvPicPr>
+        <p:blipFill>
+          <a:blip r:embed="rId3"/>
+          <a:stretch>
+            <a:fillRect/>
+          </a:stretch>
+        </p:blipFill>
+        <p:spPr>
+          <a:xfrm>
+            <a:off x="5486400" y="5075170"/>
+            <a:ext cx="6040954" cy="1509087"/>
+          </a:xfrm>
+          <a:prstGeom prst="rect">
+            <a:avLst/>
+          </a:prstGeom>
+        </p:spPr>
+      </p:pic>
+      <p:sp>
+        <p:nvSpPr>
+          <p:cNvPr id="12" name="TextBox 11">
+            <a:extLst>
+              <a:ext uri="{FF2B5EF4-FFF2-40B4-BE49-F238E27FC236}">
+                <a16:creationId xmlns:a16="http://schemas.microsoft.com/office/drawing/2014/main" id="{06129F7F-D4D8-1B2F-79E4-6400A35C86FB}"/>
+              </a:ext>
+            </a:extLst>
+          </p:cNvPr>
+          <p:cNvSpPr txBox="1"/>
+          <p:nvPr/>
+        </p:nvSpPr>
+        <p:spPr>
+          <a:xfrm>
+            <a:off x="786962" y="2880828"/>
+            <a:ext cx="4528457" cy="2031325"/>
+          </a:xfrm>
+          <a:prstGeom prst="rect">
+            <a:avLst/>
+          </a:prstGeom>
+          <a:noFill/>
+        </p:spPr>
+        <p:txBody>
+          <a:bodyPr wrap="square" rtlCol="0">
+            <a:spAutoFit/>
+          </a:bodyPr>
+          <a:lstStyle/>
+          <a:p>
+            <a:pPr marL="228600" marR="0" lvl="0" indent="-228600" algn="l" defTabSz="914400" rtl="0" eaLnBrk="1" fontAlgn="auto" latinLnBrk="0" hangingPunct="1">
+              <a:lnSpc>
+                <a:spcPct val="90000"/>
+              </a:lnSpc>
+              <a:spcBef>
+                <a:spcPts val="1000"/>
+              </a:spcBef>
+              <a:spcAft>
+                <a:spcPts val="0"/>
+              </a:spcAft>
+              <a:buClrTx/>
+              <a:buSzTx/>
+              <a:buFont typeface="Arial" panose="020B0604020202020204" pitchFamily="34" charset="0"/>
+              <a:buChar char="•"/>
+              <a:tabLst/>
+              <a:defRPr/>
+            </a:pPr>
+            <a:r>
+              <a:rPr lang="en-US" sz="2400" dirty="0">
+                <a:solidFill>
+                  <a:srgbClr val="000000"/>
+                </a:solidFill>
+                <a:latin typeface="Segoe UI Light"/>
+              </a:rPr>
+              <a:t>The model was asked to predict coal consumption for January to May 2024 based off of data from January 2001 to December 2023</a:t>
+            </a:r>
+            <a:r>
+              <a:rPr kumimoji="0" lang="en-US" sz="2400" b="0" i="0" u="none" strike="noStrike" kern="1200" cap="none" spc="0" normalizeH="0" baseline="0" noProof="0" dirty="0">
+                <a:ln>
+                  <a:noFill/>
+                </a:ln>
+                <a:solidFill>
+                  <a:srgbClr val="000000"/>
+                </a:solidFill>
+                <a:effectLst/>
+                <a:uLnTx/>
+                <a:uFillTx/>
+                <a:latin typeface="Segoe UI Light"/>
+                <a:ea typeface="+mn-ea"/>
+                <a:cs typeface="+mn-cs"/>
+              </a:rPr>
+              <a:t>:</a:t>
+            </a:r>
+          </a:p>
+          <a:p>
+            <a:endParaRPr lang="en-US" dirty="0"/>
+          </a:p>
+        </p:txBody>
+      </p:sp>
+    </p:spTree>
+    <p:extLst>
+      <p:ext uri="{BB962C8B-B14F-4D97-AF65-F5344CB8AC3E}">
+        <p14:creationId xmlns:p14="http://schemas.microsoft.com/office/powerpoint/2010/main" val="1657733589"/>
+      </p:ext>
+    </p:extLst>
+  </p:cSld>
+  <p:clrMapOvr>
+    <a:masterClrMapping/>
+  </p:clrMapOvr>
+</p:sld>
+</file>
+
+<file path=ppt/slides/slide6.xml><?xml version="1.0" encoding="utf-8"?>
+<p:sld xmlns:a="http://schemas.openxmlformats.org/drawingml/2006/main" xmlns:r="http://schemas.openxmlformats.org/officeDocument/2006/relationships" xmlns:p="http://schemas.openxmlformats.org/presentationml/2006/main">
+  <p:cSld>
+    <p:spTree>
+      <p:nvGrpSpPr>
+        <p:cNvPr id="1" name="">
+          <a:extLst>
+            <a:ext uri="{FF2B5EF4-FFF2-40B4-BE49-F238E27FC236}">
               <a16:creationId xmlns:a16="http://schemas.microsoft.com/office/drawing/2014/main" id="{7E190D27-ADF3-0C76-633C-339005E23DB7}"/>
             </a:ext>
           </a:extLst>
@@ -7458,7 +8673,7 @@
 </p:sld>
 </file>
 
-<file path=ppt/slides/slide6.xml><?xml version="1.0" encoding="utf-8"?>
+<file path=ppt/slides/slide7.xml><?xml version="1.0" encoding="utf-8"?>
 <p:sld xmlns:a="http://schemas.openxmlformats.org/drawingml/2006/main" xmlns:r="http://schemas.openxmlformats.org/officeDocument/2006/relationships" xmlns:p="http://schemas.openxmlformats.org/presentationml/2006/main">
   <p:cSld>
     <p:spTree>
@@ -7697,7 +8912,7 @@
 </p:sld>
 </file>
 
-<file path=ppt/slides/slide7.xml><?xml version="1.0" encoding="utf-8"?>
+<file path=ppt/slides/slide8.xml><?xml version="1.0" encoding="utf-8"?>
 <p:sld xmlns:a="http://schemas.openxmlformats.org/drawingml/2006/main" xmlns:r="http://schemas.openxmlformats.org/officeDocument/2006/relationships" xmlns:p="http://schemas.openxmlformats.org/presentationml/2006/main">
   <p:cSld>
     <p:bg>
@@ -8743,6 +9958,23 @@
 </file>
 
 <file path=customXml/item1.xml><?xml version="1.0" encoding="utf-8"?>
+<?mso-contentType ?>
+<FormTemplates xmlns="http://schemas.microsoft.com/sharepoint/v3/contenttype/forms">
+  <Display>DocumentLibraryForm</Display>
+  <Edit>DocumentLibraryForm</Edit>
+  <New>DocumentLibraryForm</New>
+</FormTemplates>
+</file>
+
+<file path=customXml/item2.xml><?xml version="1.0" encoding="utf-8"?>
+<p:properties xmlns:p="http://schemas.microsoft.com/office/2006/metadata/properties" xmlns:xsi="http://www.w3.org/2001/XMLSchema-instance" xmlns:pc="http://schemas.microsoft.com/office/infopath/2007/PartnerControls">
+  <documentManagement>
+    <MediaServiceKeyPoints xmlns="71af3243-3dd4-4a8d-8c0d-dd76da1f02a5" xsi:nil="true"/>
+  </documentManagement>
+</p:properties>
+</file>
+
+<file path=customXml/item3.xml><?xml version="1.0" encoding="utf-8"?>
 <ct:contentTypeSchema xmlns:ct="http://schemas.microsoft.com/office/2006/metadata/contentType" xmlns:ma="http://schemas.microsoft.com/office/2006/metadata/properties/metaAttributes" ct:_="" ma:_="" ma:contentTypeName="Document" ma:contentTypeID="0x01010079F111ED35F8CC479449609E8A0923A6" ma:contentTypeVersion="11" ma:contentTypeDescription="Create a new document." ma:contentTypeScope="" ma:versionID="9677210f24a1be23c92c90fd886aa0aa">
   <xsd:schema xmlns:xsd="http://www.w3.org/2001/XMLSchema" xmlns:xs="http://www.w3.org/2001/XMLSchema" xmlns:p="http://schemas.microsoft.com/office/2006/metadata/properties" xmlns:ns2="71af3243-3dd4-4a8d-8c0d-dd76da1f02a5" xmlns:ns3="16c05727-aa75-4e4a-9b5f-8a80a1165891" targetNamespace="http://schemas.microsoft.com/office/2006/metadata/properties" ma:root="true" ma:fieldsID="60e05723c5c1908df1a1a4ebf11d344e" ns2:_="" ns3:_="">
     <xsd:import namespace="71af3243-3dd4-4a8d-8c0d-dd76da1f02a5"/>
@@ -8953,24 +10185,25 @@
 </ct:contentTypeSchema>
 </file>
 
-<file path=customXml/item2.xml><?xml version="1.0" encoding="utf-8"?>
-<p:properties xmlns:p="http://schemas.microsoft.com/office/2006/metadata/properties" xmlns:xsi="http://www.w3.org/2001/XMLSchema-instance" xmlns:pc="http://schemas.microsoft.com/office/infopath/2007/PartnerControls">
-  <documentManagement>
-    <MediaServiceKeyPoints xmlns="71af3243-3dd4-4a8d-8c0d-dd76da1f02a5" xsi:nil="true"/>
-  </documentManagement>
-</p:properties>
+<file path=customXml/itemProps1.xml><?xml version="1.0" encoding="utf-8"?>
+<ds:datastoreItem xmlns:ds="http://schemas.openxmlformats.org/officeDocument/2006/customXml" ds:itemID="{2FD05317-60D6-4B3A-8545-888496D1A8EC}">
+  <ds:schemaRefs>
+    <ds:schemaRef ds:uri="http://schemas.microsoft.com/sharepoint/v3/contenttype/forms"/>
+  </ds:schemaRefs>
+</ds:datastoreItem>
 </file>
 
-<file path=customXml/item3.xml><?xml version="1.0" encoding="utf-8"?>
-<?mso-contentType ?>
-<FormTemplates xmlns="http://schemas.microsoft.com/sharepoint/v3/contenttype/forms">
-  <Display>DocumentLibraryForm</Display>
-  <Edit>DocumentLibraryForm</Edit>
-  <New>DocumentLibraryForm</New>
-</FormTemplates>
+<file path=customXml/itemProps2.xml><?xml version="1.0" encoding="utf-8"?>
+<ds:datastoreItem xmlns:ds="http://schemas.openxmlformats.org/officeDocument/2006/customXml" ds:itemID="{EF609EDA-869E-4BE5-AE5D-B898C584B6FF}">
+  <ds:schemaRefs>
+    <ds:schemaRef ds:uri="http://schemas.microsoft.com/office/2006/metadata/properties"/>
+    <ds:schemaRef ds:uri="http://schemas.microsoft.com/office/infopath/2007/PartnerControls"/>
+    <ds:schemaRef ds:uri="71af3243-3dd4-4a8d-8c0d-dd76da1f02a5"/>
+  </ds:schemaRefs>
+</ds:datastoreItem>
 </file>
 
-<file path=customXml/itemProps1.xml><?xml version="1.0" encoding="utf-8"?>
+<file path=customXml/itemProps3.xml><?xml version="1.0" encoding="utf-8"?>
 <ds:datastoreItem xmlns:ds="http://schemas.openxmlformats.org/officeDocument/2006/customXml" ds:itemID="{61A00BBF-EEBB-4E18-B8CB-F926EAAC48F7}">
   <ds:schemaRefs>
     <ds:schemaRef ds:uri="http://schemas.microsoft.com/office/2006/metadata/contentType"/>
@@ -8987,22 +10220,4 @@
     <ds:schemaRef ds:uri="http://schemas.microsoft.com/internal/obd"/>
   </ds:schemaRefs>
 </ds:datastoreItem>
-</file>
-
-<file path=customXml/itemProps2.xml><?xml version="1.0" encoding="utf-8"?>
-<ds:datastoreItem xmlns:ds="http://schemas.openxmlformats.org/officeDocument/2006/customXml" ds:itemID="{EF609EDA-869E-4BE5-AE5D-B898C584B6FF}">
-  <ds:schemaRefs>
-    <ds:schemaRef ds:uri="http://schemas.microsoft.com/office/2006/metadata/properties"/>
-    <ds:schemaRef ds:uri="http://schemas.microsoft.com/office/infopath/2007/PartnerControls"/>
-    <ds:schemaRef ds:uri="71af3243-3dd4-4a8d-8c0d-dd76da1f02a5"/>
-  </ds:schemaRefs>
-</ds:datastoreItem>
-</file>
-
-<file path=customXml/itemProps3.xml><?xml version="1.0" encoding="utf-8"?>
-<ds:datastoreItem xmlns:ds="http://schemas.openxmlformats.org/officeDocument/2006/customXml" ds:itemID="{2FD05317-60D6-4B3A-8545-888496D1A8EC}">
-  <ds:schemaRefs>
-    <ds:schemaRef ds:uri="http://schemas.microsoft.com/sharepoint/v3/contenttype/forms"/>
-  </ds:schemaRefs>
-</ds:datastoreItem>
 </file>
</xml_diff>

<commit_message>
updated slides with LSTM model info
</commit_message>
<xml_diff>
--- a/Project 4 Presentation.pptx
+++ b/Project 4 Presentation.pptx
@@ -5,20 +5,24 @@
     <p:sldMasterId id="2147483648" r:id="rId4"/>
   </p:sldMasterIdLst>
   <p:notesMasterIdLst>
-    <p:notesMasterId r:id="rId13"/>
+    <p:notesMasterId r:id="rId17"/>
   </p:notesMasterIdLst>
   <p:handoutMasterIdLst>
-    <p:handoutMasterId r:id="rId14"/>
+    <p:handoutMasterId r:id="rId18"/>
   </p:handoutMasterIdLst>
   <p:sldIdLst>
     <p:sldId id="256" r:id="rId5"/>
-    <p:sldId id="288" r:id="rId6"/>
+    <p:sldId id="298" r:id="rId6"/>
     <p:sldId id="289" r:id="rId7"/>
-    <p:sldId id="290" r:id="rId8"/>
-    <p:sldId id="297" r:id="rId9"/>
-    <p:sldId id="296" r:id="rId10"/>
-    <p:sldId id="295" r:id="rId11"/>
-    <p:sldId id="285" r:id="rId12"/>
+    <p:sldId id="299" r:id="rId8"/>
+    <p:sldId id="300" r:id="rId9"/>
+    <p:sldId id="297" r:id="rId10"/>
+    <p:sldId id="296" r:id="rId11"/>
+    <p:sldId id="301" r:id="rId12"/>
+    <p:sldId id="302" r:id="rId13"/>
+    <p:sldId id="303" r:id="rId14"/>
+    <p:sldId id="304" r:id="rId15"/>
+    <p:sldId id="285" r:id="rId16"/>
   </p:sldIdLst>
   <p:sldSz cx="12192000" cy="6858000"/>
   <p:notesSz cx="6858000" cy="9144000"/>
@@ -345,7 +349,7 @@
           <a:p>
             <a:fld id="{6E5C0719-993D-42E1-80ED-8F01056F36C2}" type="datetimeFigureOut">
               <a:rPr lang="en-US" smtClean="0"/>
-              <a:t>12/5/2024</a:t>
+              <a:t>12/9/2024</a:t>
             </a:fld>
             <a:endParaRPr lang="en-US" dirty="0"/>
           </a:p>
@@ -522,7 +526,7 @@
           <a:p>
             <a:fld id="{21D3BC9C-6C58-464F-B94E-FD73C5FB016E}" type="datetimeFigureOut">
               <a:rPr lang="en-US" smtClean="0"/>
-              <a:t>12/5/2024</a:t>
+              <a:t>12/9/2024</a:t>
             </a:fld>
             <a:endParaRPr lang="en-US" dirty="0"/>
           </a:p>
@@ -938,7 +942,7 @@
           <a:p>
             <a:fld id="{BE60DC36-8EFA-4378-9855-E019C55AC472}" type="slidenum">
               <a:rPr lang="en-US" smtClean="0"/>
-              <a:t>8</a:t>
+              <a:t>12</a:t>
             </a:fld>
             <a:endParaRPr lang="en-US" dirty="0"/>
           </a:p>
@@ -1104,7 +1108,7 @@
           <a:p>
             <a:fld id="{40DA1498-92C7-4E4B-8045-C9195F453964}" type="datetimeFigureOut">
               <a:rPr lang="en-US" smtClean="0"/>
-              <a:t>12/5/2024</a:t>
+              <a:t>12/9/2024</a:t>
             </a:fld>
             <a:endParaRPr lang="en-US" dirty="0"/>
           </a:p>
@@ -1302,7 +1306,7 @@
           <a:p>
             <a:fld id="{40DA1498-92C7-4E4B-8045-C9195F453964}" type="datetimeFigureOut">
               <a:rPr lang="en-US" smtClean="0"/>
-              <a:t>12/5/2024</a:t>
+              <a:t>12/9/2024</a:t>
             </a:fld>
             <a:endParaRPr lang="en-US" dirty="0"/>
           </a:p>
@@ -1510,7 +1514,7 @@
           <a:p>
             <a:fld id="{40DA1498-92C7-4E4B-8045-C9195F453964}" type="datetimeFigureOut">
               <a:rPr lang="en-US" smtClean="0"/>
-              <a:t>12/5/2024</a:t>
+              <a:t>12/9/2024</a:t>
             </a:fld>
             <a:endParaRPr lang="en-US" dirty="0"/>
           </a:p>
@@ -1708,7 +1712,7 @@
           <a:p>
             <a:fld id="{40DA1498-92C7-4E4B-8045-C9195F453964}" type="datetimeFigureOut">
               <a:rPr lang="en-US" smtClean="0"/>
-              <a:t>12/5/2024</a:t>
+              <a:t>12/9/2024</a:t>
             </a:fld>
             <a:endParaRPr lang="en-US" dirty="0"/>
           </a:p>
@@ -1983,7 +1987,7 @@
           <a:p>
             <a:fld id="{40DA1498-92C7-4E4B-8045-C9195F453964}" type="datetimeFigureOut">
               <a:rPr lang="en-US" smtClean="0"/>
-              <a:t>12/5/2024</a:t>
+              <a:t>12/9/2024</a:t>
             </a:fld>
             <a:endParaRPr lang="en-US" dirty="0"/>
           </a:p>
@@ -2248,7 +2252,7 @@
           <a:p>
             <a:fld id="{40DA1498-92C7-4E4B-8045-C9195F453964}" type="datetimeFigureOut">
               <a:rPr lang="en-US" smtClean="0"/>
-              <a:t>12/5/2024</a:t>
+              <a:t>12/9/2024</a:t>
             </a:fld>
             <a:endParaRPr lang="en-US" dirty="0"/>
           </a:p>
@@ -2660,7 +2664,7 @@
           <a:p>
             <a:fld id="{40DA1498-92C7-4E4B-8045-C9195F453964}" type="datetimeFigureOut">
               <a:rPr lang="en-US" smtClean="0"/>
-              <a:t>12/5/2024</a:t>
+              <a:t>12/9/2024</a:t>
             </a:fld>
             <a:endParaRPr lang="en-US" dirty="0"/>
           </a:p>
@@ -2801,7 +2805,7 @@
           <a:p>
             <a:fld id="{40DA1498-92C7-4E4B-8045-C9195F453964}" type="datetimeFigureOut">
               <a:rPr lang="en-US" smtClean="0"/>
-              <a:t>12/5/2024</a:t>
+              <a:t>12/9/2024</a:t>
             </a:fld>
             <a:endParaRPr lang="en-US" dirty="0"/>
           </a:p>
@@ -2914,7 +2918,7 @@
           <a:p>
             <a:fld id="{40DA1498-92C7-4E4B-8045-C9195F453964}" type="datetimeFigureOut">
               <a:rPr lang="en-US" smtClean="0"/>
-              <a:t>12/5/2024</a:t>
+              <a:t>12/9/2024</a:t>
             </a:fld>
             <a:endParaRPr lang="en-US" dirty="0"/>
           </a:p>
@@ -3225,7 +3229,7 @@
           <a:p>
             <a:fld id="{40DA1498-92C7-4E4B-8045-C9195F453964}" type="datetimeFigureOut">
               <a:rPr lang="en-US" smtClean="0"/>
-              <a:t>12/5/2024</a:t>
+              <a:t>12/9/2024</a:t>
             </a:fld>
             <a:endParaRPr lang="en-US" dirty="0"/>
           </a:p>
@@ -3517,7 +3521,7 @@
           <a:p>
             <a:fld id="{40DA1498-92C7-4E4B-8045-C9195F453964}" type="datetimeFigureOut">
               <a:rPr lang="en-US" smtClean="0"/>
-              <a:t>12/5/2024</a:t>
+              <a:t>12/9/2024</a:t>
             </a:fld>
             <a:endParaRPr lang="en-US" dirty="0"/>
           </a:p>
@@ -3758,7 +3762,7 @@
           <a:p>
             <a:fld id="{40DA1498-92C7-4E4B-8045-C9195F453964}" type="datetimeFigureOut">
               <a:rPr lang="en-US" smtClean="0"/>
-              <a:t>12/5/2024</a:t>
+              <a:t>12/9/2024</a:t>
             </a:fld>
             <a:endParaRPr lang="en-US" dirty="0"/>
           </a:p>
@@ -5706,6 +5710,1060 @@
 </p:sld>
 </file>
 
+<file path=ppt/slides/slide10.xml><?xml version="1.0" encoding="utf-8"?>
+<p:sld xmlns:a="http://schemas.openxmlformats.org/drawingml/2006/main" xmlns:r="http://schemas.openxmlformats.org/officeDocument/2006/relationships" xmlns:p="http://schemas.openxmlformats.org/presentationml/2006/main">
+  <p:cSld>
+    <p:spTree>
+      <p:nvGrpSpPr>
+        <p:cNvPr id="1" name="">
+          <a:extLst>
+            <a:ext uri="{FF2B5EF4-FFF2-40B4-BE49-F238E27FC236}">
+              <a16:creationId xmlns:a16="http://schemas.microsoft.com/office/drawing/2014/main" id="{97F6FC3B-A95F-871C-2241-671C22EC01EF}"/>
+            </a:ext>
+          </a:extLst>
+        </p:cNvPr>
+        <p:cNvGrpSpPr/>
+        <p:nvPr/>
+      </p:nvGrpSpPr>
+      <p:grpSpPr>
+        <a:xfrm>
+          <a:off x="0" y="0"/>
+          <a:ext cx="0" cy="0"/>
+          <a:chOff x="0" y="0"/>
+          <a:chExt cx="0" cy="0"/>
+        </a:xfrm>
+      </p:grpSpPr>
+      <p:sp>
+        <p:nvSpPr>
+          <p:cNvPr id="8" name="Content Placeholder 2">
+            <a:extLst>
+              <a:ext uri="{FF2B5EF4-FFF2-40B4-BE49-F238E27FC236}">
+                <a16:creationId xmlns:a16="http://schemas.microsoft.com/office/drawing/2014/main" id="{6557113D-FBC1-F16E-2BC8-E0E3A8BD5A7F}"/>
+              </a:ext>
+            </a:extLst>
+          </p:cNvPr>
+          <p:cNvSpPr txBox="1">
+            <a:spLocks/>
+          </p:cNvSpPr>
+          <p:nvPr/>
+        </p:nvSpPr>
+        <p:spPr>
+          <a:xfrm>
+            <a:off x="786962" y="910696"/>
+            <a:ext cx="10618076" cy="5311428"/>
+          </a:xfrm>
+          <a:prstGeom prst="rect">
+            <a:avLst/>
+          </a:prstGeom>
+        </p:spPr>
+        <p:txBody>
+          <a:bodyPr vert="horz" lIns="91440" tIns="45720" rIns="91440" bIns="45720" rtlCol="0">
+            <a:noAutofit/>
+          </a:bodyPr>
+          <a:lstStyle>
+            <a:lvl1pPr marL="228600" indent="-228600" algn="l" defTabSz="914400" rtl="0" eaLnBrk="1" latinLnBrk="0" hangingPunct="1">
+              <a:lnSpc>
+                <a:spcPct val="90000"/>
+              </a:lnSpc>
+              <a:spcBef>
+                <a:spcPts val="1000"/>
+              </a:spcBef>
+              <a:buFont typeface="Arial" panose="020B0604020202020204" pitchFamily="34" charset="0"/>
+              <a:buChar char="•"/>
+              <a:defRPr sz="2800" kern="1200">
+                <a:solidFill>
+                  <a:schemeClr val="tx1"/>
+                </a:solidFill>
+                <a:latin typeface="+mn-lt"/>
+                <a:ea typeface="+mn-ea"/>
+                <a:cs typeface="+mn-cs"/>
+              </a:defRPr>
+            </a:lvl1pPr>
+            <a:lvl2pPr marL="685800" indent="-228600" algn="l" defTabSz="914400" rtl="0" eaLnBrk="1" latinLnBrk="0" hangingPunct="1">
+              <a:lnSpc>
+                <a:spcPct val="90000"/>
+              </a:lnSpc>
+              <a:spcBef>
+                <a:spcPts val="500"/>
+              </a:spcBef>
+              <a:buFont typeface="Arial" panose="020B0604020202020204" pitchFamily="34" charset="0"/>
+              <a:buChar char="•"/>
+              <a:defRPr sz="2400" kern="1200">
+                <a:solidFill>
+                  <a:schemeClr val="tx1"/>
+                </a:solidFill>
+                <a:latin typeface="+mn-lt"/>
+                <a:ea typeface="+mn-ea"/>
+                <a:cs typeface="+mn-cs"/>
+              </a:defRPr>
+            </a:lvl2pPr>
+            <a:lvl3pPr marL="1143000" indent="-228600" algn="l" defTabSz="914400" rtl="0" eaLnBrk="1" latinLnBrk="0" hangingPunct="1">
+              <a:lnSpc>
+                <a:spcPct val="90000"/>
+              </a:lnSpc>
+              <a:spcBef>
+                <a:spcPts val="500"/>
+              </a:spcBef>
+              <a:buFont typeface="Arial" panose="020B0604020202020204" pitchFamily="34" charset="0"/>
+              <a:buChar char="•"/>
+              <a:defRPr sz="2000" kern="1200">
+                <a:solidFill>
+                  <a:schemeClr val="tx1"/>
+                </a:solidFill>
+                <a:latin typeface="+mn-lt"/>
+                <a:ea typeface="+mn-ea"/>
+                <a:cs typeface="+mn-cs"/>
+              </a:defRPr>
+            </a:lvl3pPr>
+            <a:lvl4pPr marL="1600200" indent="-228600" algn="l" defTabSz="914400" rtl="0" eaLnBrk="1" latinLnBrk="0" hangingPunct="1">
+              <a:lnSpc>
+                <a:spcPct val="90000"/>
+              </a:lnSpc>
+              <a:spcBef>
+                <a:spcPts val="500"/>
+              </a:spcBef>
+              <a:buFont typeface="Arial" panose="020B0604020202020204" pitchFamily="34" charset="0"/>
+              <a:buChar char="•"/>
+              <a:defRPr sz="1800" kern="1200">
+                <a:solidFill>
+                  <a:schemeClr val="tx1"/>
+                </a:solidFill>
+                <a:latin typeface="+mn-lt"/>
+                <a:ea typeface="+mn-ea"/>
+                <a:cs typeface="+mn-cs"/>
+              </a:defRPr>
+            </a:lvl4pPr>
+            <a:lvl5pPr marL="2057400" indent="-228600" algn="l" defTabSz="914400" rtl="0" eaLnBrk="1" latinLnBrk="0" hangingPunct="1">
+              <a:lnSpc>
+                <a:spcPct val="90000"/>
+              </a:lnSpc>
+              <a:spcBef>
+                <a:spcPts val="500"/>
+              </a:spcBef>
+              <a:buFont typeface="Arial" panose="020B0604020202020204" pitchFamily="34" charset="0"/>
+              <a:buChar char="•"/>
+              <a:defRPr sz="1800" kern="1200">
+                <a:solidFill>
+                  <a:schemeClr val="tx1"/>
+                </a:solidFill>
+                <a:latin typeface="+mn-lt"/>
+                <a:ea typeface="+mn-ea"/>
+                <a:cs typeface="+mn-cs"/>
+              </a:defRPr>
+            </a:lvl5pPr>
+            <a:lvl6pPr marL="2514600" indent="-228600" algn="l" defTabSz="914400" rtl="0" eaLnBrk="1" latinLnBrk="0" hangingPunct="1">
+              <a:lnSpc>
+                <a:spcPct val="90000"/>
+              </a:lnSpc>
+              <a:spcBef>
+                <a:spcPts val="500"/>
+              </a:spcBef>
+              <a:buFont typeface="Arial" panose="020B0604020202020204" pitchFamily="34" charset="0"/>
+              <a:buChar char="•"/>
+              <a:defRPr sz="1800" kern="1200">
+                <a:solidFill>
+                  <a:schemeClr val="tx1"/>
+                </a:solidFill>
+                <a:latin typeface="+mn-lt"/>
+                <a:ea typeface="+mn-ea"/>
+                <a:cs typeface="+mn-cs"/>
+              </a:defRPr>
+            </a:lvl6pPr>
+            <a:lvl7pPr marL="2971800" indent="-228600" algn="l" defTabSz="914400" rtl="0" eaLnBrk="1" latinLnBrk="0" hangingPunct="1">
+              <a:lnSpc>
+                <a:spcPct val="90000"/>
+              </a:lnSpc>
+              <a:spcBef>
+                <a:spcPts val="500"/>
+              </a:spcBef>
+              <a:buFont typeface="Arial" panose="020B0604020202020204" pitchFamily="34" charset="0"/>
+              <a:buChar char="•"/>
+              <a:defRPr sz="1800" kern="1200">
+                <a:solidFill>
+                  <a:schemeClr val="tx1"/>
+                </a:solidFill>
+                <a:latin typeface="+mn-lt"/>
+                <a:ea typeface="+mn-ea"/>
+                <a:cs typeface="+mn-cs"/>
+              </a:defRPr>
+            </a:lvl7pPr>
+            <a:lvl8pPr marL="3429000" indent="-228600" algn="l" defTabSz="914400" rtl="0" eaLnBrk="1" latinLnBrk="0" hangingPunct="1">
+              <a:lnSpc>
+                <a:spcPct val="90000"/>
+              </a:lnSpc>
+              <a:spcBef>
+                <a:spcPts val="500"/>
+              </a:spcBef>
+              <a:buFont typeface="Arial" panose="020B0604020202020204" pitchFamily="34" charset="0"/>
+              <a:buChar char="•"/>
+              <a:defRPr sz="1800" kern="1200">
+                <a:solidFill>
+                  <a:schemeClr val="tx1"/>
+                </a:solidFill>
+                <a:latin typeface="+mn-lt"/>
+                <a:ea typeface="+mn-ea"/>
+                <a:cs typeface="+mn-cs"/>
+              </a:defRPr>
+            </a:lvl8pPr>
+            <a:lvl9pPr marL="3886200" indent="-228600" algn="l" defTabSz="914400" rtl="0" eaLnBrk="1" latinLnBrk="0" hangingPunct="1">
+              <a:lnSpc>
+                <a:spcPct val="90000"/>
+              </a:lnSpc>
+              <a:spcBef>
+                <a:spcPts val="500"/>
+              </a:spcBef>
+              <a:buFont typeface="Arial" panose="020B0604020202020204" pitchFamily="34" charset="0"/>
+              <a:buChar char="•"/>
+              <a:defRPr sz="1800" kern="1200">
+                <a:solidFill>
+                  <a:schemeClr val="tx1"/>
+                </a:solidFill>
+                <a:latin typeface="+mn-lt"/>
+                <a:ea typeface="+mn-ea"/>
+                <a:cs typeface="+mn-cs"/>
+              </a:defRPr>
+            </a:lvl9pPr>
+          </a:lstStyle>
+          <a:p>
+            <a:r>
+              <a:rPr lang="en-US" sz="2400" dirty="0"/>
+              <a:t>The best results were a </a:t>
+            </a:r>
+            <a:r>
+              <a:rPr lang="en-US" sz="2400" b="1" dirty="0"/>
+              <a:t>MAE of 729.74</a:t>
+            </a:r>
+            <a:r>
+              <a:rPr lang="en-US" sz="2400" dirty="0"/>
+              <a:t>, </a:t>
+            </a:r>
+            <a:r>
+              <a:rPr lang="en-US" sz="2400" b="1" dirty="0"/>
+              <a:t>RMSE of 864.43</a:t>
+            </a:r>
+            <a:r>
+              <a:rPr lang="en-US" sz="2400" dirty="0"/>
+              <a:t>, and </a:t>
+            </a:r>
+            <a:r>
+              <a:rPr lang="en-US" sz="2400" b="1" dirty="0"/>
+              <a:t>R² score</a:t>
+            </a:r>
+            <a:r>
+              <a:rPr lang="en-US" sz="2400" dirty="0"/>
+              <a:t> of 0.10%. </a:t>
+            </a:r>
+          </a:p>
+          <a:p>
+            <a:r>
+              <a:rPr lang="en-US" sz="2400" dirty="0"/>
+              <a:t>The parameters used for this model were: sequence length: 15, 1 hidden layer, 50 units/layer, 50 epochs. </a:t>
+            </a:r>
+          </a:p>
+          <a:p>
+            <a:r>
+              <a:rPr lang="en-US" sz="2400" dirty="0"/>
+              <a:t>I tried using an optimization function to find the best parameters for this model, but it was unable to find anything that performed better than what used for the above model.</a:t>
+            </a:r>
+          </a:p>
+        </p:txBody>
+      </p:sp>
+      <p:cxnSp>
+        <p:nvCxnSpPr>
+          <p:cNvPr id="6" name="Straight Connector 5">
+            <a:extLst>
+              <a:ext uri="{FF2B5EF4-FFF2-40B4-BE49-F238E27FC236}">
+                <a16:creationId xmlns:a16="http://schemas.microsoft.com/office/drawing/2014/main" id="{FFF14E8B-41AD-DA76-40B5-28546EF8D8B6}"/>
+              </a:ext>
+              <a:ext uri="{C183D7F6-B498-43B3-948B-1728B52AA6E4}">
+                <adec:decorative xmlns:adec="http://schemas.microsoft.com/office/drawing/2017/decorative" val="1"/>
+              </a:ext>
+            </a:extLst>
+          </p:cNvPr>
+          <p:cNvCxnSpPr>
+            <a:cxnSpLocks/>
+          </p:cNvCxnSpPr>
+          <p:nvPr/>
+        </p:nvCxnSpPr>
+        <p:spPr>
+          <a:xfrm>
+            <a:off x="0" y="522898"/>
+            <a:ext cx="4086225" cy="0"/>
+          </a:xfrm>
+          <a:prstGeom prst="line">
+            <a:avLst/>
+          </a:prstGeom>
+          <a:ln>
+            <a:solidFill>
+              <a:schemeClr val="accent3">
+                <a:lumMod val="50000"/>
+              </a:schemeClr>
+            </a:solidFill>
+            <a:tailEnd type="oval"/>
+          </a:ln>
+        </p:spPr>
+        <p:style>
+          <a:lnRef idx="1">
+            <a:schemeClr val="accent1"/>
+          </a:lnRef>
+          <a:fillRef idx="0">
+            <a:schemeClr val="accent1"/>
+          </a:fillRef>
+          <a:effectRef idx="0">
+            <a:schemeClr val="accent1"/>
+          </a:effectRef>
+          <a:fontRef idx="minor">
+            <a:schemeClr val="tx1"/>
+          </a:fontRef>
+        </p:style>
+      </p:cxnSp>
+      <p:cxnSp>
+        <p:nvCxnSpPr>
+          <p:cNvPr id="7" name="Straight Connector 6">
+            <a:extLst>
+              <a:ext uri="{FF2B5EF4-FFF2-40B4-BE49-F238E27FC236}">
+                <a16:creationId xmlns:a16="http://schemas.microsoft.com/office/drawing/2014/main" id="{B067A7A5-0379-E0D9-5ACF-E3B6790286BC}"/>
+              </a:ext>
+              <a:ext uri="{C183D7F6-B498-43B3-948B-1728B52AA6E4}">
+                <adec:decorative xmlns:adec="http://schemas.microsoft.com/office/drawing/2017/decorative" val="1"/>
+              </a:ext>
+            </a:extLst>
+          </p:cNvPr>
+          <p:cNvCxnSpPr>
+            <a:cxnSpLocks/>
+          </p:cNvCxnSpPr>
+          <p:nvPr/>
+        </p:nvCxnSpPr>
+        <p:spPr>
+          <a:xfrm>
+            <a:off x="8105775" y="522898"/>
+            <a:ext cx="4086225" cy="0"/>
+          </a:xfrm>
+          <a:prstGeom prst="line">
+            <a:avLst/>
+          </a:prstGeom>
+          <a:ln>
+            <a:solidFill>
+              <a:schemeClr val="accent3">
+                <a:lumMod val="50000"/>
+              </a:schemeClr>
+            </a:solidFill>
+            <a:headEnd type="oval"/>
+          </a:ln>
+        </p:spPr>
+        <p:style>
+          <a:lnRef idx="1">
+            <a:schemeClr val="accent1"/>
+          </a:lnRef>
+          <a:fillRef idx="0">
+            <a:schemeClr val="accent1"/>
+          </a:fillRef>
+          <a:effectRef idx="0">
+            <a:schemeClr val="accent1"/>
+          </a:effectRef>
+          <a:fontRef idx="minor">
+            <a:schemeClr val="tx1"/>
+          </a:fontRef>
+        </p:style>
+      </p:cxnSp>
+      <p:sp>
+        <p:nvSpPr>
+          <p:cNvPr id="9" name="Title 1">
+            <a:extLst>
+              <a:ext uri="{FF2B5EF4-FFF2-40B4-BE49-F238E27FC236}">
+                <a16:creationId xmlns:a16="http://schemas.microsoft.com/office/drawing/2014/main" id="{815FF36E-2128-0AA8-2114-6B30F803CB1F}"/>
+              </a:ext>
+            </a:extLst>
+          </p:cNvPr>
+          <p:cNvSpPr txBox="1">
+            <a:spLocks/>
+          </p:cNvSpPr>
+          <p:nvPr/>
+        </p:nvSpPr>
+        <p:spPr>
+          <a:xfrm>
+            <a:off x="228600" y="328999"/>
+            <a:ext cx="11734800" cy="387798"/>
+          </a:xfrm>
+          <a:prstGeom prst="rect">
+            <a:avLst/>
+          </a:prstGeom>
+        </p:spPr>
+        <p:txBody>
+          <a:bodyPr vert="horz" wrap="square" lIns="0" tIns="0" rIns="0" bIns="0" rtlCol="0" anchor="t">
+            <a:spAutoFit/>
+          </a:bodyPr>
+          <a:lstStyle>
+            <a:lvl1pPr algn="l" defTabSz="914400" rtl="0" eaLnBrk="1" latinLnBrk="0" hangingPunct="1">
+              <a:lnSpc>
+                <a:spcPct val="90000"/>
+              </a:lnSpc>
+              <a:spcBef>
+                <a:spcPct val="0"/>
+              </a:spcBef>
+              <a:buNone/>
+              <a:defRPr sz="4400" kern="1200">
+                <a:solidFill>
+                  <a:schemeClr val="tx1"/>
+                </a:solidFill>
+                <a:latin typeface="+mj-lt"/>
+                <a:ea typeface="+mj-ea"/>
+                <a:cs typeface="+mj-cs"/>
+              </a:defRPr>
+            </a:lvl1pPr>
+          </a:lstStyle>
+          <a:p>
+            <a:pPr algn="ctr"/>
+            <a:r>
+              <a:rPr lang="en-US" sz="2800" b="1" dirty="0">
+                <a:solidFill>
+                  <a:schemeClr val="tx1">
+                    <a:lumMod val="75000"/>
+                    <a:lumOff val="25000"/>
+                  </a:schemeClr>
+                </a:solidFill>
+              </a:rPr>
+              <a:t>Model: LSTM</a:t>
+            </a:r>
+            <a:endParaRPr lang="en-US" sz="2800" dirty="0">
+              <a:solidFill>
+                <a:schemeClr val="tx1">
+                  <a:lumMod val="75000"/>
+                  <a:lumOff val="25000"/>
+                </a:schemeClr>
+              </a:solidFill>
+            </a:endParaRPr>
+          </a:p>
+        </p:txBody>
+      </p:sp>
+      <p:pic>
+        <p:nvPicPr>
+          <p:cNvPr id="3" name="Picture 2" descr="A graph showing a graph of coal consumption&#10;&#10;Description automatically generated">
+            <a:extLst>
+              <a:ext uri="{FF2B5EF4-FFF2-40B4-BE49-F238E27FC236}">
+                <a16:creationId xmlns:a16="http://schemas.microsoft.com/office/drawing/2014/main" id="{B62C04BB-E7B8-D1EE-61BA-8DA0CF161016}"/>
+              </a:ext>
+            </a:extLst>
+          </p:cNvPr>
+          <p:cNvPicPr>
+            <a:picLocks noChangeAspect="1"/>
+          </p:cNvPicPr>
+          <p:nvPr/>
+        </p:nvPicPr>
+        <p:blipFill>
+          <a:blip r:embed="rId2">
+            <a:extLst>
+              <a:ext uri="{28A0092B-C50C-407E-A947-70E740481C1C}">
+                <a14:useLocalDpi xmlns:a14="http://schemas.microsoft.com/office/drawing/2010/main" val="0"/>
+              </a:ext>
+            </a:extLst>
+          </a:blip>
+          <a:stretch>
+            <a:fillRect/>
+          </a:stretch>
+        </p:blipFill>
+        <p:spPr>
+          <a:xfrm>
+            <a:off x="469899" y="3429000"/>
+            <a:ext cx="5626100" cy="2990850"/>
+          </a:xfrm>
+          <a:prstGeom prst="rect">
+            <a:avLst/>
+          </a:prstGeom>
+        </p:spPr>
+      </p:pic>
+      <p:pic>
+        <p:nvPicPr>
+          <p:cNvPr id="5" name="Picture 4" descr="A graph showing a graph of a coal consumption&#10;&#10;Description automatically generated">
+            <a:extLst>
+              <a:ext uri="{FF2B5EF4-FFF2-40B4-BE49-F238E27FC236}">
+                <a16:creationId xmlns:a16="http://schemas.microsoft.com/office/drawing/2014/main" id="{F0C407C8-3965-9888-B7B6-F1C63EBCD86C}"/>
+              </a:ext>
+            </a:extLst>
+          </p:cNvPr>
+          <p:cNvPicPr>
+            <a:picLocks noChangeAspect="1"/>
+          </p:cNvPicPr>
+          <p:nvPr/>
+        </p:nvPicPr>
+        <p:blipFill>
+          <a:blip r:embed="rId3">
+            <a:extLst>
+              <a:ext uri="{28A0092B-C50C-407E-A947-70E740481C1C}">
+                <a14:useLocalDpi xmlns:a14="http://schemas.microsoft.com/office/drawing/2010/main" val="0"/>
+              </a:ext>
+            </a:extLst>
+          </a:blip>
+          <a:srcRect l="622" r="1101"/>
+          <a:stretch/>
+        </p:blipFill>
+        <p:spPr>
+          <a:xfrm>
+            <a:off x="6143625" y="3435758"/>
+            <a:ext cx="5529263" cy="2993617"/>
+          </a:xfrm>
+          <a:prstGeom prst="rect">
+            <a:avLst/>
+          </a:prstGeom>
+        </p:spPr>
+      </p:pic>
+    </p:spTree>
+    <p:extLst>
+      <p:ext uri="{BB962C8B-B14F-4D97-AF65-F5344CB8AC3E}">
+        <p14:creationId xmlns:p14="http://schemas.microsoft.com/office/powerpoint/2010/main" val="125690452"/>
+      </p:ext>
+    </p:extLst>
+  </p:cSld>
+  <p:clrMapOvr>
+    <a:masterClrMapping/>
+  </p:clrMapOvr>
+</p:sld>
+</file>
+
+<file path=ppt/slides/slide11.xml><?xml version="1.0" encoding="utf-8"?>
+<p:sld xmlns:a="http://schemas.openxmlformats.org/drawingml/2006/main" xmlns:r="http://schemas.openxmlformats.org/officeDocument/2006/relationships" xmlns:p="http://schemas.openxmlformats.org/presentationml/2006/main">
+  <p:cSld>
+    <p:spTree>
+      <p:nvGrpSpPr>
+        <p:cNvPr id="1" name="">
+          <a:extLst>
+            <a:ext uri="{FF2B5EF4-FFF2-40B4-BE49-F238E27FC236}">
+              <a16:creationId xmlns:a16="http://schemas.microsoft.com/office/drawing/2014/main" id="{7CBE612A-E4AC-015A-13E2-D13553C86378}"/>
+            </a:ext>
+          </a:extLst>
+        </p:cNvPr>
+        <p:cNvGrpSpPr/>
+        <p:nvPr/>
+      </p:nvGrpSpPr>
+      <p:grpSpPr>
+        <a:xfrm>
+          <a:off x="0" y="0"/>
+          <a:ext cx="0" cy="0"/>
+          <a:chOff x="0" y="0"/>
+          <a:chExt cx="0" cy="0"/>
+        </a:xfrm>
+      </p:grpSpPr>
+      <p:sp>
+        <p:nvSpPr>
+          <p:cNvPr id="3" name="Content Placeholder 2">
+            <a:extLst>
+              <a:ext uri="{FF2B5EF4-FFF2-40B4-BE49-F238E27FC236}">
+                <a16:creationId xmlns:a16="http://schemas.microsoft.com/office/drawing/2014/main" id="{470DBC21-91AE-5F3D-1186-D11C8F117506}"/>
+              </a:ext>
+            </a:extLst>
+          </p:cNvPr>
+          <p:cNvSpPr>
+            <a:spLocks noGrp="1"/>
+          </p:cNvSpPr>
+          <p:nvPr>
+            <p:ph sz="half" idx="1"/>
+          </p:nvPr>
+        </p:nvSpPr>
+        <p:spPr>
+          <a:xfrm>
+            <a:off x="838200" y="1152939"/>
+            <a:ext cx="10515600" cy="5024024"/>
+          </a:xfrm>
+        </p:spPr>
+        <p:txBody>
+          <a:bodyPr>
+            <a:normAutofit/>
+          </a:bodyPr>
+          <a:lstStyle/>
+          <a:p>
+            <a:r>
+              <a:rPr lang="en-US" sz="2800" dirty="0"/>
+              <a:t>Weather data serves as a </a:t>
+            </a:r>
+            <a:r>
+              <a:rPr lang="en-US" sz="2800" b="1" dirty="0"/>
+              <a:t>decent predictor </a:t>
+            </a:r>
+            <a:r>
+              <a:rPr lang="en-US" sz="2800" dirty="0"/>
+              <a:t>of energy consumption, as indicated by the models' predictive capabilities.</a:t>
+            </a:r>
+          </a:p>
+          <a:p>
+            <a:r>
+              <a:rPr lang="en-US" sz="2800" dirty="0"/>
+              <a:t>Monthly weather trends reveal that </a:t>
+            </a:r>
+            <a:r>
+              <a:rPr lang="en-US" sz="2800" b="1" dirty="0"/>
+              <a:t>average temperature patterns </a:t>
+            </a:r>
+            <a:r>
+              <a:rPr lang="en-US" sz="2800" dirty="0"/>
+              <a:t>correlate with energy consumption, highlighting the influence of seasonal changes.</a:t>
+            </a:r>
+          </a:p>
+          <a:p>
+            <a:r>
+              <a:rPr lang="en-US" sz="2800" b="1" dirty="0"/>
+              <a:t>Weather temperatures</a:t>
+            </a:r>
+            <a:r>
+              <a:rPr lang="en-US" sz="2800" dirty="0"/>
+              <a:t>—both hot and cold—are likely to impact on future energy consumption, necessitating further analysis to understand their effects.</a:t>
+            </a:r>
+          </a:p>
+          <a:p>
+            <a:pPr marL="0" indent="0">
+              <a:buNone/>
+            </a:pPr>
+            <a:endParaRPr lang="en-US" dirty="0"/>
+          </a:p>
+          <a:p>
+            <a:pPr marL="0" indent="0">
+              <a:buNone/>
+            </a:pPr>
+            <a:r>
+              <a:rPr lang="en-US" sz="2800" dirty="0"/>
+              <a:t>And the winner is…</a:t>
+            </a:r>
+            <a:r>
+              <a:rPr lang="en-US" sz="2800" b="1" dirty="0"/>
+              <a:t>[insert model here]!</a:t>
+            </a:r>
+          </a:p>
+        </p:txBody>
+      </p:sp>
+      <p:sp>
+        <p:nvSpPr>
+          <p:cNvPr id="5" name="Title 1">
+            <a:extLst>
+              <a:ext uri="{FF2B5EF4-FFF2-40B4-BE49-F238E27FC236}">
+                <a16:creationId xmlns:a16="http://schemas.microsoft.com/office/drawing/2014/main" id="{90D7DA9A-9C09-0206-BCEF-47963D865FE1}"/>
+              </a:ext>
+            </a:extLst>
+          </p:cNvPr>
+          <p:cNvSpPr txBox="1">
+            <a:spLocks/>
+          </p:cNvSpPr>
+          <p:nvPr/>
+        </p:nvSpPr>
+        <p:spPr>
+          <a:xfrm>
+            <a:off x="228600" y="328999"/>
+            <a:ext cx="11734800" cy="387798"/>
+          </a:xfrm>
+          <a:prstGeom prst="rect">
+            <a:avLst/>
+          </a:prstGeom>
+        </p:spPr>
+        <p:txBody>
+          <a:bodyPr vert="horz" wrap="square" lIns="0" tIns="0" rIns="0" bIns="0" rtlCol="0" anchor="t">
+            <a:spAutoFit/>
+          </a:bodyPr>
+          <a:lstStyle>
+            <a:lvl1pPr algn="l" defTabSz="914400" rtl="0" eaLnBrk="1" latinLnBrk="0" hangingPunct="1">
+              <a:lnSpc>
+                <a:spcPct val="90000"/>
+              </a:lnSpc>
+              <a:spcBef>
+                <a:spcPct val="0"/>
+              </a:spcBef>
+              <a:buNone/>
+              <a:defRPr sz="4400" kern="1200">
+                <a:solidFill>
+                  <a:schemeClr val="tx1"/>
+                </a:solidFill>
+                <a:latin typeface="+mj-lt"/>
+                <a:ea typeface="+mj-ea"/>
+                <a:cs typeface="+mj-cs"/>
+              </a:defRPr>
+            </a:lvl1pPr>
+          </a:lstStyle>
+          <a:p>
+            <a:pPr algn="ctr"/>
+            <a:r>
+              <a:rPr lang="en-US" sz="2800" b="1" dirty="0">
+                <a:solidFill>
+                  <a:schemeClr val="tx1">
+                    <a:lumMod val="75000"/>
+                    <a:lumOff val="25000"/>
+                  </a:schemeClr>
+                </a:solidFill>
+              </a:rPr>
+              <a:t>Key Observations</a:t>
+            </a:r>
+            <a:endParaRPr lang="en-US" sz="2800" dirty="0">
+              <a:solidFill>
+                <a:schemeClr val="tx1">
+                  <a:lumMod val="75000"/>
+                  <a:lumOff val="25000"/>
+                </a:schemeClr>
+              </a:solidFill>
+            </a:endParaRPr>
+          </a:p>
+        </p:txBody>
+      </p:sp>
+      <p:cxnSp>
+        <p:nvCxnSpPr>
+          <p:cNvPr id="6" name="Straight Connector 5">
+            <a:extLst>
+              <a:ext uri="{FF2B5EF4-FFF2-40B4-BE49-F238E27FC236}">
+                <a16:creationId xmlns:a16="http://schemas.microsoft.com/office/drawing/2014/main" id="{EC617CF1-9E0F-B4F7-3E56-96E4B43D7643}"/>
+              </a:ext>
+              <a:ext uri="{C183D7F6-B498-43B3-948B-1728B52AA6E4}">
+                <adec:decorative xmlns:adec="http://schemas.microsoft.com/office/drawing/2017/decorative" val="1"/>
+              </a:ext>
+            </a:extLst>
+          </p:cNvPr>
+          <p:cNvCxnSpPr>
+            <a:cxnSpLocks/>
+          </p:cNvCxnSpPr>
+          <p:nvPr/>
+        </p:nvCxnSpPr>
+        <p:spPr>
+          <a:xfrm>
+            <a:off x="0" y="522898"/>
+            <a:ext cx="4086225" cy="0"/>
+          </a:xfrm>
+          <a:prstGeom prst="line">
+            <a:avLst/>
+          </a:prstGeom>
+          <a:ln>
+            <a:solidFill>
+              <a:schemeClr val="accent3">
+                <a:lumMod val="50000"/>
+              </a:schemeClr>
+            </a:solidFill>
+            <a:tailEnd type="oval"/>
+          </a:ln>
+        </p:spPr>
+        <p:style>
+          <a:lnRef idx="1">
+            <a:schemeClr val="accent1"/>
+          </a:lnRef>
+          <a:fillRef idx="0">
+            <a:schemeClr val="accent1"/>
+          </a:fillRef>
+          <a:effectRef idx="0">
+            <a:schemeClr val="accent1"/>
+          </a:effectRef>
+          <a:fontRef idx="minor">
+            <a:schemeClr val="tx1"/>
+          </a:fontRef>
+        </p:style>
+      </p:cxnSp>
+      <p:cxnSp>
+        <p:nvCxnSpPr>
+          <p:cNvPr id="7" name="Straight Connector 6">
+            <a:extLst>
+              <a:ext uri="{FF2B5EF4-FFF2-40B4-BE49-F238E27FC236}">
+                <a16:creationId xmlns:a16="http://schemas.microsoft.com/office/drawing/2014/main" id="{9CEC58E1-F5EB-93B5-D3DF-DE399906FBC7}"/>
+              </a:ext>
+              <a:ext uri="{C183D7F6-B498-43B3-948B-1728B52AA6E4}">
+                <adec:decorative xmlns:adec="http://schemas.microsoft.com/office/drawing/2017/decorative" val="1"/>
+              </a:ext>
+            </a:extLst>
+          </p:cNvPr>
+          <p:cNvCxnSpPr>
+            <a:cxnSpLocks/>
+          </p:cNvCxnSpPr>
+          <p:nvPr/>
+        </p:nvCxnSpPr>
+        <p:spPr>
+          <a:xfrm>
+            <a:off x="8105775" y="522898"/>
+            <a:ext cx="4086225" cy="0"/>
+          </a:xfrm>
+          <a:prstGeom prst="line">
+            <a:avLst/>
+          </a:prstGeom>
+          <a:ln>
+            <a:solidFill>
+              <a:schemeClr val="accent3">
+                <a:lumMod val="50000"/>
+              </a:schemeClr>
+            </a:solidFill>
+            <a:headEnd type="oval"/>
+          </a:ln>
+        </p:spPr>
+        <p:style>
+          <a:lnRef idx="1">
+            <a:schemeClr val="accent1"/>
+          </a:lnRef>
+          <a:fillRef idx="0">
+            <a:schemeClr val="accent1"/>
+          </a:fillRef>
+          <a:effectRef idx="0">
+            <a:schemeClr val="accent1"/>
+          </a:effectRef>
+          <a:fontRef idx="minor">
+            <a:schemeClr val="tx1"/>
+          </a:fontRef>
+        </p:style>
+      </p:cxnSp>
+    </p:spTree>
+    <p:extLst>
+      <p:ext uri="{BB962C8B-B14F-4D97-AF65-F5344CB8AC3E}">
+        <p14:creationId xmlns:p14="http://schemas.microsoft.com/office/powerpoint/2010/main" val="2924643057"/>
+      </p:ext>
+    </p:extLst>
+  </p:cSld>
+  <p:clrMapOvr>
+    <a:masterClrMapping/>
+  </p:clrMapOvr>
+</p:sld>
+</file>
+
+<file path=ppt/slides/slide12.xml><?xml version="1.0" encoding="utf-8"?>
+<p:sld xmlns:a="http://schemas.openxmlformats.org/drawingml/2006/main" xmlns:r="http://schemas.openxmlformats.org/officeDocument/2006/relationships" xmlns:p="http://schemas.openxmlformats.org/presentationml/2006/main">
+  <p:cSld>
+    <p:bg>
+      <p:bgPr>
+        <a:pattFill prst="zigZag">
+          <a:fgClr>
+            <a:schemeClr val="accent3">
+              <a:lumMod val="75000"/>
+            </a:schemeClr>
+          </a:fgClr>
+          <a:bgClr>
+            <a:schemeClr val="accent3">
+              <a:lumMod val="50000"/>
+            </a:schemeClr>
+          </a:bgClr>
+        </a:pattFill>
+        <a:effectLst/>
+      </p:bgPr>
+    </p:bg>
+    <p:spTree>
+      <p:nvGrpSpPr>
+        <p:cNvPr id="1" name=""/>
+        <p:cNvGrpSpPr/>
+        <p:nvPr/>
+      </p:nvGrpSpPr>
+      <p:grpSpPr>
+        <a:xfrm>
+          <a:off x="0" y="0"/>
+          <a:ext cx="0" cy="0"/>
+          <a:chOff x="0" y="0"/>
+          <a:chExt cx="0" cy="0"/>
+        </a:xfrm>
+      </p:grpSpPr>
+      <p:grpSp>
+        <p:nvGrpSpPr>
+          <p:cNvPr id="11" name="Group 10">
+            <a:extLst>
+              <a:ext uri="{FF2B5EF4-FFF2-40B4-BE49-F238E27FC236}">
+                <a16:creationId xmlns:a16="http://schemas.microsoft.com/office/drawing/2014/main" id="{62A21665-C64F-4BDA-B2DE-442D70605718}"/>
+              </a:ext>
+              <a:ext uri="{C183D7F6-B498-43B3-948B-1728B52AA6E4}">
+                <adec:decorative xmlns:adec="http://schemas.microsoft.com/office/drawing/2017/decorative" val="1"/>
+              </a:ext>
+            </a:extLst>
+          </p:cNvPr>
+          <p:cNvGrpSpPr/>
+          <p:nvPr/>
+        </p:nvGrpSpPr>
+        <p:grpSpPr>
+          <a:xfrm>
+            <a:off x="4325258" y="1544068"/>
+            <a:ext cx="3541486" cy="3769865"/>
+            <a:chOff x="4325258" y="1229517"/>
+            <a:chExt cx="3541486" cy="3769865"/>
+          </a:xfrm>
+        </p:grpSpPr>
+        <p:sp>
+          <p:nvSpPr>
+            <p:cNvPr id="12" name="Diamond 11">
+              <a:extLst>
+                <a:ext uri="{FF2B5EF4-FFF2-40B4-BE49-F238E27FC236}">
+                  <a16:creationId xmlns:a16="http://schemas.microsoft.com/office/drawing/2014/main" id="{7DC8B409-5FAC-4539-B25A-26BE925A48AF}"/>
+                </a:ext>
+              </a:extLst>
+            </p:cNvPr>
+            <p:cNvSpPr/>
+            <p:nvPr/>
+          </p:nvSpPr>
+          <p:spPr>
+            <a:xfrm>
+              <a:off x="4792319" y="2392018"/>
+              <a:ext cx="2607364" cy="2607364"/>
+            </a:xfrm>
+            <a:prstGeom prst="diamond">
+              <a:avLst/>
+            </a:prstGeom>
+            <a:noFill/>
+            <a:ln>
+              <a:solidFill>
+                <a:schemeClr val="accent3"/>
+              </a:solidFill>
+            </a:ln>
+          </p:spPr>
+          <p:style>
+            <a:lnRef idx="2">
+              <a:schemeClr val="accent1">
+                <a:shade val="50000"/>
+              </a:schemeClr>
+            </a:lnRef>
+            <a:fillRef idx="1">
+              <a:schemeClr val="accent1"/>
+            </a:fillRef>
+            <a:effectRef idx="0">
+              <a:schemeClr val="accent1"/>
+            </a:effectRef>
+            <a:fontRef idx="minor">
+              <a:schemeClr val="lt1"/>
+            </a:fontRef>
+          </p:style>
+          <p:txBody>
+            <a:bodyPr rtlCol="0" anchor="ctr"/>
+            <a:lstStyle/>
+            <a:p>
+              <a:pPr algn="ctr"/>
+              <a:endParaRPr lang="en-US" dirty="0"/>
+            </a:p>
+          </p:txBody>
+        </p:sp>
+        <p:sp>
+          <p:nvSpPr>
+            <p:cNvPr id="13" name="Diamond 12">
+              <a:extLst>
+                <a:ext uri="{FF2B5EF4-FFF2-40B4-BE49-F238E27FC236}">
+                  <a16:creationId xmlns:a16="http://schemas.microsoft.com/office/drawing/2014/main" id="{91498E2F-539C-46D3-AF7C-BB1DAE76B114}"/>
+                </a:ext>
+              </a:extLst>
+            </p:cNvPr>
+            <p:cNvSpPr/>
+            <p:nvPr/>
+          </p:nvSpPr>
+          <p:spPr>
+            <a:xfrm>
+              <a:off x="4325258" y="1229517"/>
+              <a:ext cx="3541486" cy="3541486"/>
+            </a:xfrm>
+            <a:prstGeom prst="diamond">
+              <a:avLst/>
+            </a:prstGeom>
+            <a:noFill/>
+            <a:ln>
+              <a:solidFill>
+                <a:schemeClr val="accent4"/>
+              </a:solidFill>
+            </a:ln>
+          </p:spPr>
+          <p:style>
+            <a:lnRef idx="2">
+              <a:schemeClr val="accent1">
+                <a:shade val="50000"/>
+              </a:schemeClr>
+            </a:lnRef>
+            <a:fillRef idx="1">
+              <a:schemeClr val="accent1"/>
+            </a:fillRef>
+            <a:effectRef idx="0">
+              <a:schemeClr val="accent1"/>
+            </a:effectRef>
+            <a:fontRef idx="minor">
+              <a:schemeClr val="lt1"/>
+            </a:fontRef>
+          </p:style>
+          <p:txBody>
+            <a:bodyPr rtlCol="0" anchor="ctr"/>
+            <a:lstStyle/>
+            <a:p>
+              <a:pPr algn="ctr"/>
+              <a:endParaRPr lang="en-US" dirty="0"/>
+            </a:p>
+          </p:txBody>
+        </p:sp>
+      </p:grpSp>
+      <p:sp>
+        <p:nvSpPr>
+          <p:cNvPr id="15" name="Title 1">
+            <a:extLst>
+              <a:ext uri="{FF2B5EF4-FFF2-40B4-BE49-F238E27FC236}">
+                <a16:creationId xmlns:a16="http://schemas.microsoft.com/office/drawing/2014/main" id="{FA061601-468D-486D-B8EE-42BD1BE3ADCC}"/>
+              </a:ext>
+            </a:extLst>
+          </p:cNvPr>
+          <p:cNvSpPr>
+            <a:spLocks noGrp="1"/>
+          </p:cNvSpPr>
+          <p:nvPr>
+            <p:ph type="ctrTitle"/>
+          </p:nvPr>
+        </p:nvSpPr>
+        <p:spPr>
+          <a:xfrm>
+            <a:off x="1524000" y="2930403"/>
+            <a:ext cx="9144000" cy="997196"/>
+          </a:xfrm>
+        </p:spPr>
+        <p:txBody>
+          <a:bodyPr lIns="0" tIns="0" rIns="0" bIns="0" anchor="ctr">
+            <a:spAutoFit/>
+          </a:bodyPr>
+          <a:lstStyle/>
+          <a:p>
+            <a:r>
+              <a:rPr lang="en-US" sz="7200" b="1" dirty="0">
+                <a:solidFill>
+                  <a:schemeClr val="bg1"/>
+                </a:solidFill>
+              </a:rPr>
+              <a:t>Thank You</a:t>
+            </a:r>
+            <a:endParaRPr lang="en-US" sz="7200" dirty="0">
+              <a:solidFill>
+                <a:schemeClr val="accent4"/>
+              </a:solidFill>
+            </a:endParaRPr>
+          </a:p>
+        </p:txBody>
+      </p:sp>
+      <p:pic>
+        <p:nvPicPr>
+          <p:cNvPr id="6" name="Picture 5" descr="This image is an icon that says &quot;24Slides.&quot;">
+            <a:hlinkClick r:id="rId3"/>
+            <a:extLst>
+              <a:ext uri="{FF2B5EF4-FFF2-40B4-BE49-F238E27FC236}">
+                <a16:creationId xmlns:a16="http://schemas.microsoft.com/office/drawing/2014/main" id="{A86744F2-5246-4A0A-B119-35E7FB76A0D8}"/>
+              </a:ext>
+              <a:ext uri="{C183D7F6-B498-43B3-948B-1728B52AA6E4}">
+                <adec:decorative xmlns:adec="http://schemas.microsoft.com/office/drawing/2017/decorative" val="0"/>
+              </a:ext>
+            </a:extLst>
+          </p:cNvPr>
+          <p:cNvPicPr>
+            <a:picLocks noChangeAspect="1"/>
+          </p:cNvPicPr>
+          <p:nvPr/>
+        </p:nvPicPr>
+        <p:blipFill>
+          <a:blip r:embed="rId4"/>
+          <a:stretch>
+            <a:fillRect/>
+          </a:stretch>
+        </p:blipFill>
+        <p:spPr>
+          <a:xfrm>
+            <a:off x="5360332" y="5919419"/>
+            <a:ext cx="1471335" cy="420363"/>
+          </a:xfrm>
+          <a:prstGeom prst="rect">
+            <a:avLst/>
+          </a:prstGeom>
+          <a:effectLst/>
+        </p:spPr>
+      </p:pic>
+    </p:spTree>
+    <p:extLst>
+      <p:ext uri="{BB962C8B-B14F-4D97-AF65-F5344CB8AC3E}">
+        <p14:creationId xmlns:p14="http://schemas.microsoft.com/office/powerpoint/2010/main" val="1923038163"/>
+      </p:ext>
+    </p:extLst>
+  </p:cSld>
+  <p:clrMapOvr>
+    <a:masterClrMapping/>
+  </p:clrMapOvr>
+</p:sld>
+</file>
+
 <file path=ppt/slides/slide2.xml><?xml version="1.0" encoding="utf-8"?>
 <p:sld xmlns:a="http://schemas.openxmlformats.org/drawingml/2006/main" xmlns:r="http://schemas.openxmlformats.org/officeDocument/2006/relationships" xmlns:p="http://schemas.openxmlformats.org/presentationml/2006/main">
   <p:cSld>
@@ -5825,6 +6883,20 @@
             <a:r>
               <a:rPr lang="en-US" dirty="0"/>
               <a:t>s weather data a good predictor of energy consumption?</a:t>
+            </a:r>
+          </a:p>
+          <a:p>
+            <a:r>
+              <a:rPr lang="en-US" dirty="0"/>
+              <a:t>How do different models</a:t>
+            </a:r>
+            <a:r>
+              <a:rPr lang="en-US"/>
+              <a:t>’ compare </a:t>
+            </a:r>
+            <a:r>
+              <a:rPr lang="en-US" dirty="0"/>
+              <a:t>to one another for time-series prediction?</a:t>
             </a:r>
           </a:p>
           <a:p>
@@ -6206,7 +7278,7 @@
     </p:spTree>
     <p:extLst>
       <p:ext uri="{BB962C8B-B14F-4D97-AF65-F5344CB8AC3E}">
-        <p14:creationId xmlns:p14="http://schemas.microsoft.com/office/powerpoint/2010/main" val="1350776444"/>
+        <p14:creationId xmlns:p14="http://schemas.microsoft.com/office/powerpoint/2010/main" val="3745022066"/>
       </p:ext>
     </p:extLst>
   </p:cSld>
@@ -6541,7 +7613,7 @@
         <p:spPr>
           <a:xfrm>
             <a:off x="786962" y="910696"/>
-            <a:ext cx="10618076" cy="3808449"/>
+            <a:ext cx="10618076" cy="5331078"/>
           </a:xfrm>
           <a:prstGeom prst="rect">
             <a:avLst/>
@@ -6730,13 +7802,21 @@
           <a:p>
             <a:r>
               <a:rPr lang="en-US" sz="3200" dirty="0"/>
-              <a:t>Random Forest</a:t>
+              <a:t>Random Forest: MAE of 881.04 and an R² score of 0.47</a:t>
             </a:r>
           </a:p>
           <a:p>
             <a:r>
               <a:rPr lang="en-US" sz="3200" dirty="0"/>
-              <a:t>LSTM</a:t>
+              <a:t>LSTM: MAE of 729.74 and an R</a:t>
+            </a:r>
+            <a:r>
+              <a:rPr lang="en-US" sz="3200" baseline="30000" dirty="0"/>
+              <a:t>2</a:t>
+            </a:r>
+            <a:r>
+              <a:rPr lang="en-US" sz="3200" dirty="0"/>
+              <a:t> score of 0.10</a:t>
             </a:r>
           </a:p>
           <a:p>
@@ -6748,7 +7828,63 @@
               <a:rPr lang="en-US" sz="3200" dirty="0"/>
               <a:t>: 81.18% Accuracy with a RMSE value of 2576.06</a:t>
             </a:r>
-            <a:endParaRPr lang="en-US" sz="3600" dirty="0"/>
+          </a:p>
+          <a:p>
+            <a:pPr marL="0" indent="0">
+              <a:buNone/>
+            </a:pPr>
+            <a:endParaRPr lang="en-US" sz="3200" dirty="0"/>
+          </a:p>
+          <a:p>
+            <a:pPr marL="0" indent="0">
+              <a:buNone/>
+            </a:pPr>
+            <a:r>
+              <a:rPr lang="en-US" dirty="0"/>
+              <a:t>The team used the same features and target to test predictions: </a:t>
+            </a:r>
+          </a:p>
+          <a:p>
+            <a:r>
+              <a:rPr lang="en-US" dirty="0"/>
+              <a:t>Features: </a:t>
+            </a:r>
+            <a:r>
+              <a:rPr lang="en-US" dirty="0" err="1"/>
+              <a:t>tmin</a:t>
+            </a:r>
+            <a:r>
+              <a:rPr lang="en-US" dirty="0"/>
+              <a:t>, </a:t>
+            </a:r>
+            <a:r>
+              <a:rPr lang="en-US" dirty="0" err="1"/>
+              <a:t>tmax</a:t>
+            </a:r>
+            <a:r>
+              <a:rPr lang="en-US" dirty="0"/>
+              <a:t>, </a:t>
+            </a:r>
+            <a:r>
+              <a:rPr lang="en-US" dirty="0" err="1"/>
+              <a:t>tavg</a:t>
+            </a:r>
+            <a:r>
+              <a:rPr lang="en-US" dirty="0"/>
+              <a:t>, year, month, </a:t>
+            </a:r>
+            <a:r>
+              <a:rPr lang="en-US" dirty="0" err="1"/>
+              <a:t>state_Texas</a:t>
+            </a:r>
+            <a:endParaRPr lang="en-US" dirty="0"/>
+          </a:p>
+          <a:p>
+            <a:r>
+              <a:rPr lang="en-US" dirty="0"/>
+              <a:t>Target: coal</a:t>
+            </a:r>
+            <a:endParaRPr lang="en-US" sz="3200" dirty="0"/>
           </a:p>
         </p:txBody>
       </p:sp>
@@ -6923,7 +8059,7 @@
     </p:spTree>
     <p:extLst>
       <p:ext uri="{BB962C8B-B14F-4D97-AF65-F5344CB8AC3E}">
-        <p14:creationId xmlns:p14="http://schemas.microsoft.com/office/powerpoint/2010/main" val="3601402422"/>
+        <p14:creationId xmlns:p14="http://schemas.microsoft.com/office/powerpoint/2010/main" val="1898139124"/>
       </p:ext>
     </p:extLst>
   </p:cSld>
@@ -6934,6 +8070,421 @@
 </file>
 
 <file path=ppt/slides/slide5.xml><?xml version="1.0" encoding="utf-8"?>
+<p:sld xmlns:a="http://schemas.openxmlformats.org/drawingml/2006/main" xmlns:r="http://schemas.openxmlformats.org/officeDocument/2006/relationships" xmlns:p="http://schemas.openxmlformats.org/presentationml/2006/main">
+  <p:cSld>
+    <p:spTree>
+      <p:nvGrpSpPr>
+        <p:cNvPr id="1" name="">
+          <a:extLst>
+            <a:ext uri="{FF2B5EF4-FFF2-40B4-BE49-F238E27FC236}">
+              <a16:creationId xmlns:a16="http://schemas.microsoft.com/office/drawing/2014/main" id="{CB14B920-D003-7F84-014E-269BA8444655}"/>
+            </a:ext>
+          </a:extLst>
+        </p:cNvPr>
+        <p:cNvGrpSpPr/>
+        <p:nvPr/>
+      </p:nvGrpSpPr>
+      <p:grpSpPr>
+        <a:xfrm>
+          <a:off x="0" y="0"/>
+          <a:ext cx="0" cy="0"/>
+          <a:chOff x="0" y="0"/>
+          <a:chExt cx="0" cy="0"/>
+        </a:xfrm>
+      </p:grpSpPr>
+      <p:sp>
+        <p:nvSpPr>
+          <p:cNvPr id="8" name="Content Placeholder 2">
+            <a:extLst>
+              <a:ext uri="{FF2B5EF4-FFF2-40B4-BE49-F238E27FC236}">
+                <a16:creationId xmlns:a16="http://schemas.microsoft.com/office/drawing/2014/main" id="{075DC86B-6171-87DD-4EA8-A05EEFC2063E}"/>
+              </a:ext>
+            </a:extLst>
+          </p:cNvPr>
+          <p:cNvSpPr txBox="1">
+            <a:spLocks/>
+          </p:cNvSpPr>
+          <p:nvPr/>
+        </p:nvSpPr>
+        <p:spPr>
+          <a:xfrm>
+            <a:off x="786962" y="910696"/>
+            <a:ext cx="10618076" cy="5331078"/>
+          </a:xfrm>
+          <a:prstGeom prst="rect">
+            <a:avLst/>
+          </a:prstGeom>
+        </p:spPr>
+        <p:txBody>
+          <a:bodyPr vert="horz" lIns="91440" tIns="45720" rIns="91440" bIns="45720" rtlCol="0">
+            <a:normAutofit/>
+          </a:bodyPr>
+          <a:lstStyle>
+            <a:lvl1pPr marL="228600" indent="-228600" algn="l" defTabSz="914400" rtl="0" eaLnBrk="1" latinLnBrk="0" hangingPunct="1">
+              <a:lnSpc>
+                <a:spcPct val="90000"/>
+              </a:lnSpc>
+              <a:spcBef>
+                <a:spcPts val="1000"/>
+              </a:spcBef>
+              <a:buFont typeface="Arial" panose="020B0604020202020204" pitchFamily="34" charset="0"/>
+              <a:buChar char="•"/>
+              <a:defRPr sz="2800" kern="1200">
+                <a:solidFill>
+                  <a:schemeClr val="tx1"/>
+                </a:solidFill>
+                <a:latin typeface="+mn-lt"/>
+                <a:ea typeface="+mn-ea"/>
+                <a:cs typeface="+mn-cs"/>
+              </a:defRPr>
+            </a:lvl1pPr>
+            <a:lvl2pPr marL="685800" indent="-228600" algn="l" defTabSz="914400" rtl="0" eaLnBrk="1" latinLnBrk="0" hangingPunct="1">
+              <a:lnSpc>
+                <a:spcPct val="90000"/>
+              </a:lnSpc>
+              <a:spcBef>
+                <a:spcPts val="500"/>
+              </a:spcBef>
+              <a:buFont typeface="Arial" panose="020B0604020202020204" pitchFamily="34" charset="0"/>
+              <a:buChar char="•"/>
+              <a:defRPr sz="2400" kern="1200">
+                <a:solidFill>
+                  <a:schemeClr val="tx1"/>
+                </a:solidFill>
+                <a:latin typeface="+mn-lt"/>
+                <a:ea typeface="+mn-ea"/>
+                <a:cs typeface="+mn-cs"/>
+              </a:defRPr>
+            </a:lvl2pPr>
+            <a:lvl3pPr marL="1143000" indent="-228600" algn="l" defTabSz="914400" rtl="0" eaLnBrk="1" latinLnBrk="0" hangingPunct="1">
+              <a:lnSpc>
+                <a:spcPct val="90000"/>
+              </a:lnSpc>
+              <a:spcBef>
+                <a:spcPts val="500"/>
+              </a:spcBef>
+              <a:buFont typeface="Arial" panose="020B0604020202020204" pitchFamily="34" charset="0"/>
+              <a:buChar char="•"/>
+              <a:defRPr sz="2000" kern="1200">
+                <a:solidFill>
+                  <a:schemeClr val="tx1"/>
+                </a:solidFill>
+                <a:latin typeface="+mn-lt"/>
+                <a:ea typeface="+mn-ea"/>
+                <a:cs typeface="+mn-cs"/>
+              </a:defRPr>
+            </a:lvl3pPr>
+            <a:lvl4pPr marL="1600200" indent="-228600" algn="l" defTabSz="914400" rtl="0" eaLnBrk="1" latinLnBrk="0" hangingPunct="1">
+              <a:lnSpc>
+                <a:spcPct val="90000"/>
+              </a:lnSpc>
+              <a:spcBef>
+                <a:spcPts val="500"/>
+              </a:spcBef>
+              <a:buFont typeface="Arial" panose="020B0604020202020204" pitchFamily="34" charset="0"/>
+              <a:buChar char="•"/>
+              <a:defRPr sz="1800" kern="1200">
+                <a:solidFill>
+                  <a:schemeClr val="tx1"/>
+                </a:solidFill>
+                <a:latin typeface="+mn-lt"/>
+                <a:ea typeface="+mn-ea"/>
+                <a:cs typeface="+mn-cs"/>
+              </a:defRPr>
+            </a:lvl4pPr>
+            <a:lvl5pPr marL="2057400" indent="-228600" algn="l" defTabSz="914400" rtl="0" eaLnBrk="1" latinLnBrk="0" hangingPunct="1">
+              <a:lnSpc>
+                <a:spcPct val="90000"/>
+              </a:lnSpc>
+              <a:spcBef>
+                <a:spcPts val="500"/>
+              </a:spcBef>
+              <a:buFont typeface="Arial" panose="020B0604020202020204" pitchFamily="34" charset="0"/>
+              <a:buChar char="•"/>
+              <a:defRPr sz="1800" kern="1200">
+                <a:solidFill>
+                  <a:schemeClr val="tx1"/>
+                </a:solidFill>
+                <a:latin typeface="+mn-lt"/>
+                <a:ea typeface="+mn-ea"/>
+                <a:cs typeface="+mn-cs"/>
+              </a:defRPr>
+            </a:lvl5pPr>
+            <a:lvl6pPr marL="2514600" indent="-228600" algn="l" defTabSz="914400" rtl="0" eaLnBrk="1" latinLnBrk="0" hangingPunct="1">
+              <a:lnSpc>
+                <a:spcPct val="90000"/>
+              </a:lnSpc>
+              <a:spcBef>
+                <a:spcPts val="500"/>
+              </a:spcBef>
+              <a:buFont typeface="Arial" panose="020B0604020202020204" pitchFamily="34" charset="0"/>
+              <a:buChar char="•"/>
+              <a:defRPr sz="1800" kern="1200">
+                <a:solidFill>
+                  <a:schemeClr val="tx1"/>
+                </a:solidFill>
+                <a:latin typeface="+mn-lt"/>
+                <a:ea typeface="+mn-ea"/>
+                <a:cs typeface="+mn-cs"/>
+              </a:defRPr>
+            </a:lvl6pPr>
+            <a:lvl7pPr marL="2971800" indent="-228600" algn="l" defTabSz="914400" rtl="0" eaLnBrk="1" latinLnBrk="0" hangingPunct="1">
+              <a:lnSpc>
+                <a:spcPct val="90000"/>
+              </a:lnSpc>
+              <a:spcBef>
+                <a:spcPts val="500"/>
+              </a:spcBef>
+              <a:buFont typeface="Arial" panose="020B0604020202020204" pitchFamily="34" charset="0"/>
+              <a:buChar char="•"/>
+              <a:defRPr sz="1800" kern="1200">
+                <a:solidFill>
+                  <a:schemeClr val="tx1"/>
+                </a:solidFill>
+                <a:latin typeface="+mn-lt"/>
+                <a:ea typeface="+mn-ea"/>
+                <a:cs typeface="+mn-cs"/>
+              </a:defRPr>
+            </a:lvl7pPr>
+            <a:lvl8pPr marL="3429000" indent="-228600" algn="l" defTabSz="914400" rtl="0" eaLnBrk="1" latinLnBrk="0" hangingPunct="1">
+              <a:lnSpc>
+                <a:spcPct val="90000"/>
+              </a:lnSpc>
+              <a:spcBef>
+                <a:spcPts val="500"/>
+              </a:spcBef>
+              <a:buFont typeface="Arial" panose="020B0604020202020204" pitchFamily="34" charset="0"/>
+              <a:buChar char="•"/>
+              <a:defRPr sz="1800" kern="1200">
+                <a:solidFill>
+                  <a:schemeClr val="tx1"/>
+                </a:solidFill>
+                <a:latin typeface="+mn-lt"/>
+                <a:ea typeface="+mn-ea"/>
+                <a:cs typeface="+mn-cs"/>
+              </a:defRPr>
+            </a:lvl8pPr>
+            <a:lvl9pPr marL="3886200" indent="-228600" algn="l" defTabSz="914400" rtl="0" eaLnBrk="1" latinLnBrk="0" hangingPunct="1">
+              <a:lnSpc>
+                <a:spcPct val="90000"/>
+              </a:lnSpc>
+              <a:spcBef>
+                <a:spcPts val="500"/>
+              </a:spcBef>
+              <a:buFont typeface="Arial" panose="020B0604020202020204" pitchFamily="34" charset="0"/>
+              <a:buChar char="•"/>
+              <a:defRPr sz="1800" kern="1200">
+                <a:solidFill>
+                  <a:schemeClr val="tx1"/>
+                </a:solidFill>
+                <a:latin typeface="+mn-lt"/>
+                <a:ea typeface="+mn-ea"/>
+                <a:cs typeface="+mn-cs"/>
+              </a:defRPr>
+            </a:lvl9pPr>
+          </a:lstStyle>
+          <a:p>
+            <a:r>
+              <a:rPr lang="en-US" sz="3200" dirty="0"/>
+              <a:t>Initial attempts to model with one-hot encoded states resulted in excessive dimensionality, complicating the analysis.</a:t>
+            </a:r>
+          </a:p>
+          <a:p>
+            <a:r>
+              <a:rPr lang="en-US" sz="3200" dirty="0"/>
+              <a:t>Considered adding numeric values for states and regions, but this could cause models to treat categorical variables as continuous.</a:t>
+            </a:r>
+          </a:p>
+          <a:p>
+            <a:r>
+              <a:rPr lang="en-US" sz="3200" dirty="0"/>
+              <a:t>Random Forest: calculated sine and cosine to capture cyclical patterns, but this led to decreased accuracy..</a:t>
+            </a:r>
+          </a:p>
+        </p:txBody>
+      </p:sp>
+      <p:cxnSp>
+        <p:nvCxnSpPr>
+          <p:cNvPr id="6" name="Straight Connector 5">
+            <a:extLst>
+              <a:ext uri="{FF2B5EF4-FFF2-40B4-BE49-F238E27FC236}">
+                <a16:creationId xmlns:a16="http://schemas.microsoft.com/office/drawing/2014/main" id="{ABB835F4-CD91-CC74-777C-A93ABD330E8C}"/>
+              </a:ext>
+              <a:ext uri="{C183D7F6-B498-43B3-948B-1728B52AA6E4}">
+                <adec:decorative xmlns:adec="http://schemas.microsoft.com/office/drawing/2017/decorative" val="1"/>
+              </a:ext>
+            </a:extLst>
+          </p:cNvPr>
+          <p:cNvCxnSpPr>
+            <a:cxnSpLocks/>
+          </p:cNvCxnSpPr>
+          <p:nvPr/>
+        </p:nvCxnSpPr>
+        <p:spPr>
+          <a:xfrm>
+            <a:off x="0" y="522898"/>
+            <a:ext cx="4086225" cy="0"/>
+          </a:xfrm>
+          <a:prstGeom prst="line">
+            <a:avLst/>
+          </a:prstGeom>
+          <a:ln>
+            <a:solidFill>
+              <a:schemeClr val="accent3">
+                <a:lumMod val="50000"/>
+              </a:schemeClr>
+            </a:solidFill>
+            <a:tailEnd type="oval"/>
+          </a:ln>
+        </p:spPr>
+        <p:style>
+          <a:lnRef idx="1">
+            <a:schemeClr val="accent1"/>
+          </a:lnRef>
+          <a:fillRef idx="0">
+            <a:schemeClr val="accent1"/>
+          </a:fillRef>
+          <a:effectRef idx="0">
+            <a:schemeClr val="accent1"/>
+          </a:effectRef>
+          <a:fontRef idx="minor">
+            <a:schemeClr val="tx1"/>
+          </a:fontRef>
+        </p:style>
+      </p:cxnSp>
+      <p:cxnSp>
+        <p:nvCxnSpPr>
+          <p:cNvPr id="7" name="Straight Connector 6">
+            <a:extLst>
+              <a:ext uri="{FF2B5EF4-FFF2-40B4-BE49-F238E27FC236}">
+                <a16:creationId xmlns:a16="http://schemas.microsoft.com/office/drawing/2014/main" id="{248D3671-F913-7CBF-007A-C80BC4DA29E2}"/>
+              </a:ext>
+              <a:ext uri="{C183D7F6-B498-43B3-948B-1728B52AA6E4}">
+                <adec:decorative xmlns:adec="http://schemas.microsoft.com/office/drawing/2017/decorative" val="1"/>
+              </a:ext>
+            </a:extLst>
+          </p:cNvPr>
+          <p:cNvCxnSpPr>
+            <a:cxnSpLocks/>
+          </p:cNvCxnSpPr>
+          <p:nvPr/>
+        </p:nvCxnSpPr>
+        <p:spPr>
+          <a:xfrm>
+            <a:off x="8105775" y="522898"/>
+            <a:ext cx="4086225" cy="0"/>
+          </a:xfrm>
+          <a:prstGeom prst="line">
+            <a:avLst/>
+          </a:prstGeom>
+          <a:ln>
+            <a:solidFill>
+              <a:schemeClr val="accent3">
+                <a:lumMod val="50000"/>
+              </a:schemeClr>
+            </a:solidFill>
+            <a:headEnd type="oval"/>
+          </a:ln>
+        </p:spPr>
+        <p:style>
+          <a:lnRef idx="1">
+            <a:schemeClr val="accent1"/>
+          </a:lnRef>
+          <a:fillRef idx="0">
+            <a:schemeClr val="accent1"/>
+          </a:fillRef>
+          <a:effectRef idx="0">
+            <a:schemeClr val="accent1"/>
+          </a:effectRef>
+          <a:fontRef idx="minor">
+            <a:schemeClr val="tx1"/>
+          </a:fontRef>
+        </p:style>
+      </p:cxnSp>
+      <p:sp>
+        <p:nvSpPr>
+          <p:cNvPr id="9" name="Title 1">
+            <a:extLst>
+              <a:ext uri="{FF2B5EF4-FFF2-40B4-BE49-F238E27FC236}">
+                <a16:creationId xmlns:a16="http://schemas.microsoft.com/office/drawing/2014/main" id="{AEB00E4A-2B14-345E-7322-531F20F6B4FC}"/>
+              </a:ext>
+            </a:extLst>
+          </p:cNvPr>
+          <p:cNvSpPr txBox="1">
+            <a:spLocks/>
+          </p:cNvSpPr>
+          <p:nvPr/>
+        </p:nvSpPr>
+        <p:spPr>
+          <a:xfrm>
+            <a:off x="228600" y="328999"/>
+            <a:ext cx="11734800" cy="387798"/>
+          </a:xfrm>
+          <a:prstGeom prst="rect">
+            <a:avLst/>
+          </a:prstGeom>
+        </p:spPr>
+        <p:txBody>
+          <a:bodyPr vert="horz" wrap="square" lIns="0" tIns="0" rIns="0" bIns="0" rtlCol="0" anchor="t">
+            <a:spAutoFit/>
+          </a:bodyPr>
+          <a:lstStyle>
+            <a:lvl1pPr algn="l" defTabSz="914400" rtl="0" eaLnBrk="1" latinLnBrk="0" hangingPunct="1">
+              <a:lnSpc>
+                <a:spcPct val="90000"/>
+              </a:lnSpc>
+              <a:spcBef>
+                <a:spcPct val="0"/>
+              </a:spcBef>
+              <a:buNone/>
+              <a:defRPr sz="4400" kern="1200">
+                <a:solidFill>
+                  <a:schemeClr val="tx1"/>
+                </a:solidFill>
+                <a:latin typeface="+mj-lt"/>
+                <a:ea typeface="+mj-ea"/>
+                <a:cs typeface="+mj-cs"/>
+              </a:defRPr>
+            </a:lvl1pPr>
+          </a:lstStyle>
+          <a:p>
+            <a:pPr algn="ctr"/>
+            <a:r>
+              <a:rPr lang="en-US" sz="2800" b="1" dirty="0">
+                <a:solidFill>
+                  <a:schemeClr val="tx1">
+                    <a:lumMod val="75000"/>
+                    <a:lumOff val="25000"/>
+                  </a:schemeClr>
+                </a:solidFill>
+              </a:rPr>
+              <a:t>Feature Engineering</a:t>
+            </a:r>
+            <a:endParaRPr lang="en-US" sz="2800" dirty="0">
+              <a:solidFill>
+                <a:schemeClr val="tx1">
+                  <a:lumMod val="75000"/>
+                  <a:lumOff val="25000"/>
+                </a:schemeClr>
+              </a:solidFill>
+            </a:endParaRPr>
+          </a:p>
+        </p:txBody>
+      </p:sp>
+    </p:spTree>
+    <p:extLst>
+      <p:ext uri="{BB962C8B-B14F-4D97-AF65-F5344CB8AC3E}">
+        <p14:creationId xmlns:p14="http://schemas.microsoft.com/office/powerpoint/2010/main" val="3561319816"/>
+      </p:ext>
+    </p:extLst>
+  </p:cSld>
+  <p:clrMapOvr>
+    <a:masterClrMapping/>
+  </p:clrMapOvr>
+</p:sld>
+</file>
+
+<file path=ppt/slides/slide6.xml><?xml version="1.0" encoding="utf-8"?>
 <p:sld xmlns:a="http://schemas.openxmlformats.org/drawingml/2006/main" xmlns:r="http://schemas.openxmlformats.org/officeDocument/2006/relationships" xmlns:p="http://schemas.openxmlformats.org/presentationml/2006/main">
   <p:cSld>
     <p:spTree>
@@ -8064,7 +9615,7 @@
 </p:sld>
 </file>
 
-<file path=ppt/slides/slide6.xml><?xml version="1.0" encoding="utf-8"?>
+<file path=ppt/slides/slide7.xml><?xml version="1.0" encoding="utf-8"?>
 <p:sld xmlns:a="http://schemas.openxmlformats.org/drawingml/2006/main" xmlns:r="http://schemas.openxmlformats.org/officeDocument/2006/relationships" xmlns:p="http://schemas.openxmlformats.org/presentationml/2006/main">
   <p:cSld>
     <p:spTree>
@@ -8673,7 +10224,7 @@
 </p:sld>
 </file>
 
-<file path=ppt/slides/slide7.xml><?xml version="1.0" encoding="utf-8"?>
+<file path=ppt/slides/slide8.xml><?xml version="1.0" encoding="utf-8"?>
 <p:sld xmlns:a="http://schemas.openxmlformats.org/drawingml/2006/main" xmlns:r="http://schemas.openxmlformats.org/officeDocument/2006/relationships" xmlns:p="http://schemas.openxmlformats.org/presentationml/2006/main">
   <p:cSld>
     <p:spTree>
@@ -8681,7 +10232,7 @@
         <p:cNvPr id="1" name="">
           <a:extLst>
             <a:ext uri="{FF2B5EF4-FFF2-40B4-BE49-F238E27FC236}">
-              <a16:creationId xmlns:a16="http://schemas.microsoft.com/office/drawing/2014/main" id="{7CBE612A-E4AC-015A-13E2-D13553C86378}"/>
+              <a16:creationId xmlns:a16="http://schemas.microsoft.com/office/drawing/2014/main" id="{BE331AAE-66A9-D60E-185A-3A7C1684EE5B}"/>
             </a:ext>
           </a:extLst>
         </p:cNvPr>
@@ -8698,45 +10249,10 @@
       </p:grpSpPr>
       <p:sp>
         <p:nvSpPr>
-          <p:cNvPr id="3" name="Content Placeholder 2">
-            <a:extLst>
-              <a:ext uri="{FF2B5EF4-FFF2-40B4-BE49-F238E27FC236}">
-                <a16:creationId xmlns:a16="http://schemas.microsoft.com/office/drawing/2014/main" id="{470DBC21-91AE-5F3D-1186-D11C8F117506}"/>
-              </a:ext>
-            </a:extLst>
-          </p:cNvPr>
-          <p:cNvSpPr>
-            <a:spLocks noGrp="1"/>
-          </p:cNvSpPr>
-          <p:nvPr>
-            <p:ph sz="half" idx="1"/>
-          </p:nvPr>
-        </p:nvSpPr>
-        <p:spPr>
-          <a:xfrm>
-            <a:off x="838200" y="1152939"/>
-            <a:ext cx="10515600" cy="5024024"/>
-          </a:xfrm>
-        </p:spPr>
-        <p:txBody>
-          <a:bodyPr>
-            <a:normAutofit/>
-          </a:bodyPr>
-          <a:lstStyle/>
-          <a:p>
-            <a:r>
-              <a:rPr lang="en-US" sz="2800" dirty="0"/>
-              <a:t>Weather data is a decent predictor or energy consumption based on the models’ predictive capabilities…</a:t>
-            </a:r>
-          </a:p>
-        </p:txBody>
-      </p:sp>
-      <p:sp>
-        <p:nvSpPr>
-          <p:cNvPr id="5" name="Title 1">
-            <a:extLst>
-              <a:ext uri="{FF2B5EF4-FFF2-40B4-BE49-F238E27FC236}">
-                <a16:creationId xmlns:a16="http://schemas.microsoft.com/office/drawing/2014/main" id="{90D7DA9A-9C09-0206-BCEF-47963D865FE1}"/>
+          <p:cNvPr id="8" name="Content Placeholder 2">
+            <a:extLst>
+              <a:ext uri="{FF2B5EF4-FFF2-40B4-BE49-F238E27FC236}">
+                <a16:creationId xmlns:a16="http://schemas.microsoft.com/office/drawing/2014/main" id="{EDAA3EE3-B491-1B52-04CC-C8C562A8DEA3}"/>
               </a:ext>
             </a:extLst>
           </p:cNvPr>
@@ -8747,57 +10263,262 @@
         </p:nvSpPr>
         <p:spPr>
           <a:xfrm>
-            <a:off x="228600" y="328999"/>
-            <a:ext cx="11734800" cy="387798"/>
+            <a:off x="786962" y="910696"/>
+            <a:ext cx="10618076" cy="5311428"/>
           </a:xfrm>
           <a:prstGeom prst="rect">
             <a:avLst/>
           </a:prstGeom>
         </p:spPr>
         <p:txBody>
-          <a:bodyPr vert="horz" wrap="square" lIns="0" tIns="0" rIns="0" bIns="0" rtlCol="0" anchor="t">
-            <a:spAutoFit/>
+          <a:bodyPr vert="horz" lIns="91440" tIns="45720" rIns="91440" bIns="45720" rtlCol="0">
+            <a:noAutofit/>
           </a:bodyPr>
           <a:lstStyle>
-            <a:lvl1pPr algn="l" defTabSz="914400" rtl="0" eaLnBrk="1" latinLnBrk="0" hangingPunct="1">
+            <a:lvl1pPr marL="228600" indent="-228600" algn="l" defTabSz="914400" rtl="0" eaLnBrk="1" latinLnBrk="0" hangingPunct="1">
               <a:lnSpc>
                 <a:spcPct val="90000"/>
               </a:lnSpc>
               <a:spcBef>
-                <a:spcPct val="0"/>
+                <a:spcPts val="1000"/>
               </a:spcBef>
-              <a:buNone/>
-              <a:defRPr sz="4400" kern="1200">
+              <a:buFont typeface="Arial" panose="020B0604020202020204" pitchFamily="34" charset="0"/>
+              <a:buChar char="•"/>
+              <a:defRPr sz="2800" kern="1200">
                 <a:solidFill>
                   <a:schemeClr val="tx1"/>
                 </a:solidFill>
-                <a:latin typeface="+mj-lt"/>
-                <a:ea typeface="+mj-ea"/>
-                <a:cs typeface="+mj-cs"/>
+                <a:latin typeface="+mn-lt"/>
+                <a:ea typeface="+mn-ea"/>
+                <a:cs typeface="+mn-cs"/>
               </a:defRPr>
             </a:lvl1pPr>
+            <a:lvl2pPr marL="685800" indent="-228600" algn="l" defTabSz="914400" rtl="0" eaLnBrk="1" latinLnBrk="0" hangingPunct="1">
+              <a:lnSpc>
+                <a:spcPct val="90000"/>
+              </a:lnSpc>
+              <a:spcBef>
+                <a:spcPts val="500"/>
+              </a:spcBef>
+              <a:buFont typeface="Arial" panose="020B0604020202020204" pitchFamily="34" charset="0"/>
+              <a:buChar char="•"/>
+              <a:defRPr sz="2400" kern="1200">
+                <a:solidFill>
+                  <a:schemeClr val="tx1"/>
+                </a:solidFill>
+                <a:latin typeface="+mn-lt"/>
+                <a:ea typeface="+mn-ea"/>
+                <a:cs typeface="+mn-cs"/>
+              </a:defRPr>
+            </a:lvl2pPr>
+            <a:lvl3pPr marL="1143000" indent="-228600" algn="l" defTabSz="914400" rtl="0" eaLnBrk="1" latinLnBrk="0" hangingPunct="1">
+              <a:lnSpc>
+                <a:spcPct val="90000"/>
+              </a:lnSpc>
+              <a:spcBef>
+                <a:spcPts val="500"/>
+              </a:spcBef>
+              <a:buFont typeface="Arial" panose="020B0604020202020204" pitchFamily="34" charset="0"/>
+              <a:buChar char="•"/>
+              <a:defRPr sz="2000" kern="1200">
+                <a:solidFill>
+                  <a:schemeClr val="tx1"/>
+                </a:solidFill>
+                <a:latin typeface="+mn-lt"/>
+                <a:ea typeface="+mn-ea"/>
+                <a:cs typeface="+mn-cs"/>
+              </a:defRPr>
+            </a:lvl3pPr>
+            <a:lvl4pPr marL="1600200" indent="-228600" algn="l" defTabSz="914400" rtl="0" eaLnBrk="1" latinLnBrk="0" hangingPunct="1">
+              <a:lnSpc>
+                <a:spcPct val="90000"/>
+              </a:lnSpc>
+              <a:spcBef>
+                <a:spcPts val="500"/>
+              </a:spcBef>
+              <a:buFont typeface="Arial" panose="020B0604020202020204" pitchFamily="34" charset="0"/>
+              <a:buChar char="•"/>
+              <a:defRPr sz="1800" kern="1200">
+                <a:solidFill>
+                  <a:schemeClr val="tx1"/>
+                </a:solidFill>
+                <a:latin typeface="+mn-lt"/>
+                <a:ea typeface="+mn-ea"/>
+                <a:cs typeface="+mn-cs"/>
+              </a:defRPr>
+            </a:lvl4pPr>
+            <a:lvl5pPr marL="2057400" indent="-228600" algn="l" defTabSz="914400" rtl="0" eaLnBrk="1" latinLnBrk="0" hangingPunct="1">
+              <a:lnSpc>
+                <a:spcPct val="90000"/>
+              </a:lnSpc>
+              <a:spcBef>
+                <a:spcPts val="500"/>
+              </a:spcBef>
+              <a:buFont typeface="Arial" panose="020B0604020202020204" pitchFamily="34" charset="0"/>
+              <a:buChar char="•"/>
+              <a:defRPr sz="1800" kern="1200">
+                <a:solidFill>
+                  <a:schemeClr val="tx1"/>
+                </a:solidFill>
+                <a:latin typeface="+mn-lt"/>
+                <a:ea typeface="+mn-ea"/>
+                <a:cs typeface="+mn-cs"/>
+              </a:defRPr>
+            </a:lvl5pPr>
+            <a:lvl6pPr marL="2514600" indent="-228600" algn="l" defTabSz="914400" rtl="0" eaLnBrk="1" latinLnBrk="0" hangingPunct="1">
+              <a:lnSpc>
+                <a:spcPct val="90000"/>
+              </a:lnSpc>
+              <a:spcBef>
+                <a:spcPts val="500"/>
+              </a:spcBef>
+              <a:buFont typeface="Arial" panose="020B0604020202020204" pitchFamily="34" charset="0"/>
+              <a:buChar char="•"/>
+              <a:defRPr sz="1800" kern="1200">
+                <a:solidFill>
+                  <a:schemeClr val="tx1"/>
+                </a:solidFill>
+                <a:latin typeface="+mn-lt"/>
+                <a:ea typeface="+mn-ea"/>
+                <a:cs typeface="+mn-cs"/>
+              </a:defRPr>
+            </a:lvl6pPr>
+            <a:lvl7pPr marL="2971800" indent="-228600" algn="l" defTabSz="914400" rtl="0" eaLnBrk="1" latinLnBrk="0" hangingPunct="1">
+              <a:lnSpc>
+                <a:spcPct val="90000"/>
+              </a:lnSpc>
+              <a:spcBef>
+                <a:spcPts val="500"/>
+              </a:spcBef>
+              <a:buFont typeface="Arial" panose="020B0604020202020204" pitchFamily="34" charset="0"/>
+              <a:buChar char="•"/>
+              <a:defRPr sz="1800" kern="1200">
+                <a:solidFill>
+                  <a:schemeClr val="tx1"/>
+                </a:solidFill>
+                <a:latin typeface="+mn-lt"/>
+                <a:ea typeface="+mn-ea"/>
+                <a:cs typeface="+mn-cs"/>
+              </a:defRPr>
+            </a:lvl7pPr>
+            <a:lvl8pPr marL="3429000" indent="-228600" algn="l" defTabSz="914400" rtl="0" eaLnBrk="1" latinLnBrk="0" hangingPunct="1">
+              <a:lnSpc>
+                <a:spcPct val="90000"/>
+              </a:lnSpc>
+              <a:spcBef>
+                <a:spcPts val="500"/>
+              </a:spcBef>
+              <a:buFont typeface="Arial" panose="020B0604020202020204" pitchFamily="34" charset="0"/>
+              <a:buChar char="•"/>
+              <a:defRPr sz="1800" kern="1200">
+                <a:solidFill>
+                  <a:schemeClr val="tx1"/>
+                </a:solidFill>
+                <a:latin typeface="+mn-lt"/>
+                <a:ea typeface="+mn-ea"/>
+                <a:cs typeface="+mn-cs"/>
+              </a:defRPr>
+            </a:lvl8pPr>
+            <a:lvl9pPr marL="3886200" indent="-228600" algn="l" defTabSz="914400" rtl="0" eaLnBrk="1" latinLnBrk="0" hangingPunct="1">
+              <a:lnSpc>
+                <a:spcPct val="90000"/>
+              </a:lnSpc>
+              <a:spcBef>
+                <a:spcPts val="500"/>
+              </a:spcBef>
+              <a:buFont typeface="Arial" panose="020B0604020202020204" pitchFamily="34" charset="0"/>
+              <a:buChar char="•"/>
+              <a:defRPr sz="1800" kern="1200">
+                <a:solidFill>
+                  <a:schemeClr val="tx1"/>
+                </a:solidFill>
+                <a:latin typeface="+mn-lt"/>
+                <a:ea typeface="+mn-ea"/>
+                <a:cs typeface="+mn-cs"/>
+              </a:defRPr>
+            </a:lvl9pPr>
           </a:lstStyle>
           <a:p>
-            <a:pPr algn="ctr"/>
-            <a:r>
-              <a:rPr lang="en-US" sz="2800" b="1" dirty="0">
-                <a:solidFill>
-                  <a:schemeClr val="tx1">
-                    <a:lumMod val="75000"/>
-                    <a:lumOff val="25000"/>
-                  </a:schemeClr>
-                </a:solidFill>
-              </a:rPr>
-              <a:t>Key Observations</a:t>
-            </a:r>
-            <a:endParaRPr lang="en-US" sz="2800" dirty="0">
-              <a:solidFill>
-                <a:schemeClr val="tx1">
-                  <a:lumMod val="75000"/>
-                  <a:lumOff val="25000"/>
-                </a:schemeClr>
-              </a:solidFill>
-            </a:endParaRPr>
+            <a:r>
+              <a:rPr lang="en-US" dirty="0"/>
+              <a:t>Initial </a:t>
+            </a:r>
+            <a:r>
+              <a:rPr lang="en-US" b="1" dirty="0"/>
+              <a:t>MSE of 3,045,606 </a:t>
+            </a:r>
+            <a:r>
+              <a:rPr lang="en-US" dirty="0"/>
+              <a:t>and an </a:t>
+            </a:r>
+            <a:r>
+              <a:rPr lang="en-US" b="1" dirty="0"/>
+              <a:t>R² value of 0.26</a:t>
+            </a:r>
+            <a:r>
+              <a:rPr lang="en-US" dirty="0"/>
+              <a:t>.</a:t>
+            </a:r>
+          </a:p>
+          <a:p>
+            <a:r>
+              <a:rPr lang="en-US" dirty="0" err="1"/>
+              <a:t>RandomizedSearchCV</a:t>
+            </a:r>
+            <a:r>
+              <a:rPr lang="en-US" dirty="0"/>
+              <a:t> improved the </a:t>
+            </a:r>
+            <a:r>
+              <a:rPr lang="en-US" b="1" dirty="0"/>
+              <a:t>MAE to 881 </a:t>
+            </a:r>
+            <a:r>
+              <a:rPr lang="en-US" dirty="0"/>
+              <a:t>and </a:t>
+            </a:r>
+            <a:r>
+              <a:rPr lang="en-US" b="1" dirty="0"/>
+              <a:t>R² score to 0.47, </a:t>
+            </a:r>
+            <a:r>
+              <a:rPr lang="en-US" dirty="0"/>
+              <a:t>indicating only 47% of the variability in energy consumption is captured.</a:t>
+            </a:r>
+          </a:p>
+          <a:p>
+            <a:r>
+              <a:rPr lang="en-US" dirty="0"/>
+              <a:t>Random Forest Time-Series Analysis Challenges:</a:t>
+            </a:r>
+          </a:p>
+          <a:p>
+            <a:pPr lvl="1"/>
+            <a:r>
+              <a:rPr lang="en-US" dirty="0"/>
+              <a:t>The model assumes that observations are independent and non-sequential, which is not the case in time-series data.</a:t>
+            </a:r>
+          </a:p>
+          <a:p>
+            <a:pPr lvl="1"/>
+            <a:r>
+              <a:rPr lang="en-US" dirty="0"/>
+              <a:t>It does not effectively utilize lagged values and seasonal indicators, which are crucial for capturing temporal patterns.</a:t>
+            </a:r>
+          </a:p>
+          <a:p>
+            <a:pPr lvl="1"/>
+            <a:r>
+              <a:rPr lang="en-US" dirty="0"/>
+              <a:t>The decision trees used in the model split the data into homogeneous groups that fail to capture cyclical patterns or trends over time.</a:t>
+            </a:r>
+          </a:p>
+          <a:p>
+            <a:pPr lvl="1"/>
+            <a:r>
+              <a:rPr lang="en-US" dirty="0"/>
+              <a:t>Random forest is prone to overfitting, which can lead to poor performance when applied to time-series data.</a:t>
+            </a:r>
           </a:p>
         </p:txBody>
       </p:sp>
@@ -8806,7 +10527,7 @@
           <p:cNvPr id="6" name="Straight Connector 5">
             <a:extLst>
               <a:ext uri="{FF2B5EF4-FFF2-40B4-BE49-F238E27FC236}">
-                <a16:creationId xmlns:a16="http://schemas.microsoft.com/office/drawing/2014/main" id="{EC617CF1-9E0F-B4F7-3E56-96E4B43D7643}"/>
+                <a16:creationId xmlns:a16="http://schemas.microsoft.com/office/drawing/2014/main" id="{6551980A-DCE4-64BB-F097-F77AA617E9A9}"/>
               </a:ext>
               <a:ext uri="{C183D7F6-B498-43B3-948B-1728B52AA6E4}">
                 <adec:decorative xmlns:adec="http://schemas.microsoft.com/office/drawing/2017/decorative" val="1"/>
@@ -8855,7 +10576,7 @@
           <p:cNvPr id="7" name="Straight Connector 6">
             <a:extLst>
               <a:ext uri="{FF2B5EF4-FFF2-40B4-BE49-F238E27FC236}">
-                <a16:creationId xmlns:a16="http://schemas.microsoft.com/office/drawing/2014/main" id="{9CEC58E1-F5EB-93B5-D3DF-DE399906FBC7}"/>
+                <a16:creationId xmlns:a16="http://schemas.microsoft.com/office/drawing/2014/main" id="{4EA6A1DE-D35C-DBF3-BA9B-0159CF5C43AC}"/>
               </a:ext>
               <a:ext uri="{C183D7F6-B498-43B3-948B-1728B52AA6E4}">
                 <adec:decorative xmlns:adec="http://schemas.microsoft.com/office/drawing/2017/decorative" val="1"/>
@@ -8899,10 +10620,80 @@
           </a:fontRef>
         </p:style>
       </p:cxnSp>
+      <p:sp>
+        <p:nvSpPr>
+          <p:cNvPr id="9" name="Title 1">
+            <a:extLst>
+              <a:ext uri="{FF2B5EF4-FFF2-40B4-BE49-F238E27FC236}">
+                <a16:creationId xmlns:a16="http://schemas.microsoft.com/office/drawing/2014/main" id="{576EAB3D-FBA7-A0BA-975D-7BC52FB76C8D}"/>
+              </a:ext>
+            </a:extLst>
+          </p:cNvPr>
+          <p:cNvSpPr txBox="1">
+            <a:spLocks/>
+          </p:cNvSpPr>
+          <p:nvPr/>
+        </p:nvSpPr>
+        <p:spPr>
+          <a:xfrm>
+            <a:off x="228600" y="328999"/>
+            <a:ext cx="11734800" cy="387798"/>
+          </a:xfrm>
+          <a:prstGeom prst="rect">
+            <a:avLst/>
+          </a:prstGeom>
+        </p:spPr>
+        <p:txBody>
+          <a:bodyPr vert="horz" wrap="square" lIns="0" tIns="0" rIns="0" bIns="0" rtlCol="0" anchor="t">
+            <a:spAutoFit/>
+          </a:bodyPr>
+          <a:lstStyle>
+            <a:lvl1pPr algn="l" defTabSz="914400" rtl="0" eaLnBrk="1" latinLnBrk="0" hangingPunct="1">
+              <a:lnSpc>
+                <a:spcPct val="90000"/>
+              </a:lnSpc>
+              <a:spcBef>
+                <a:spcPct val="0"/>
+              </a:spcBef>
+              <a:buNone/>
+              <a:defRPr sz="4400" kern="1200">
+                <a:solidFill>
+                  <a:schemeClr val="tx1"/>
+                </a:solidFill>
+                <a:latin typeface="+mj-lt"/>
+                <a:ea typeface="+mj-ea"/>
+                <a:cs typeface="+mj-cs"/>
+              </a:defRPr>
+            </a:lvl1pPr>
+          </a:lstStyle>
+          <a:p>
+            <a:pPr algn="ctr"/>
+            <a:r>
+              <a:rPr lang="en-US" sz="2800" b="1" dirty="0">
+                <a:solidFill>
+                  <a:schemeClr val="tx1">
+                    <a:lumMod val="75000"/>
+                    <a:lumOff val="25000"/>
+                  </a:schemeClr>
+                </a:solidFill>
+              </a:rPr>
+              <a:t>Model: Random Forest</a:t>
+            </a:r>
+            <a:endParaRPr lang="en-US" sz="2800" dirty="0">
+              <a:solidFill>
+                <a:schemeClr val="tx1">
+                  <a:lumMod val="75000"/>
+                  <a:lumOff val="25000"/>
+                </a:schemeClr>
+              </a:solidFill>
+            </a:endParaRPr>
+          </a:p>
+        </p:txBody>
+      </p:sp>
     </p:spTree>
     <p:extLst>
       <p:ext uri="{BB962C8B-B14F-4D97-AF65-F5344CB8AC3E}">
-        <p14:creationId xmlns:p14="http://schemas.microsoft.com/office/powerpoint/2010/main" val="646184104"/>
+        <p14:creationId xmlns:p14="http://schemas.microsoft.com/office/powerpoint/2010/main" val="1236600688"/>
       </p:ext>
     </p:extLst>
   </p:cSld>
@@ -8912,29 +10703,18 @@
 </p:sld>
 </file>
 
-<file path=ppt/slides/slide8.xml><?xml version="1.0" encoding="utf-8"?>
+<file path=ppt/slides/slide9.xml><?xml version="1.0" encoding="utf-8"?>
 <p:sld xmlns:a="http://schemas.openxmlformats.org/drawingml/2006/main" xmlns:r="http://schemas.openxmlformats.org/officeDocument/2006/relationships" xmlns:p="http://schemas.openxmlformats.org/presentationml/2006/main">
   <p:cSld>
-    <p:bg>
-      <p:bgPr>
-        <a:pattFill prst="zigZag">
-          <a:fgClr>
-            <a:schemeClr val="accent3">
-              <a:lumMod val="75000"/>
-            </a:schemeClr>
-          </a:fgClr>
-          <a:bgClr>
-            <a:schemeClr val="accent3">
-              <a:lumMod val="50000"/>
-            </a:schemeClr>
-          </a:bgClr>
-        </a:pattFill>
-        <a:effectLst/>
-      </p:bgPr>
-    </p:bg>
     <p:spTree>
       <p:nvGrpSpPr>
-        <p:cNvPr id="1" name=""/>
+        <p:cNvPr id="1" name="">
+          <a:extLst>
+            <a:ext uri="{FF2B5EF4-FFF2-40B4-BE49-F238E27FC236}">
+              <a16:creationId xmlns:a16="http://schemas.microsoft.com/office/drawing/2014/main" id="{4DB20495-DA16-66BE-3CB7-D2F4EF0C20C9}"/>
+            </a:ext>
+          </a:extLst>
+        </p:cNvPr>
         <p:cNvGrpSpPr/>
         <p:nvPr/>
       </p:nvGrpSpPr>
@@ -8946,173 +10726,169 @@
           <a:chExt cx="0" cy="0"/>
         </a:xfrm>
       </p:grpSpPr>
-      <p:grpSp>
-        <p:nvGrpSpPr>
-          <p:cNvPr id="11" name="Group 10">
-            <a:extLst>
-              <a:ext uri="{FF2B5EF4-FFF2-40B4-BE49-F238E27FC236}">
-                <a16:creationId xmlns:a16="http://schemas.microsoft.com/office/drawing/2014/main" id="{62A21665-C64F-4BDA-B2DE-442D70605718}"/>
+      <p:cxnSp>
+        <p:nvCxnSpPr>
+          <p:cNvPr id="6" name="Straight Connector 5">
+            <a:extLst>
+              <a:ext uri="{FF2B5EF4-FFF2-40B4-BE49-F238E27FC236}">
+                <a16:creationId xmlns:a16="http://schemas.microsoft.com/office/drawing/2014/main" id="{7CBB2BB3-6A6B-032A-EB7E-1CFCAFE03D67}"/>
               </a:ext>
               <a:ext uri="{C183D7F6-B498-43B3-948B-1728B52AA6E4}">
                 <adec:decorative xmlns:adec="http://schemas.microsoft.com/office/drawing/2017/decorative" val="1"/>
               </a:ext>
             </a:extLst>
           </p:cNvPr>
-          <p:cNvGrpSpPr/>
+          <p:cNvCxnSpPr>
+            <a:cxnSpLocks/>
+          </p:cNvCxnSpPr>
           <p:nvPr/>
-        </p:nvGrpSpPr>
-        <p:grpSpPr>
+        </p:nvCxnSpPr>
+        <p:spPr>
           <a:xfrm>
-            <a:off x="4325258" y="1544068"/>
-            <a:ext cx="3541486" cy="3769865"/>
-            <a:chOff x="4325258" y="1229517"/>
-            <a:chExt cx="3541486" cy="3769865"/>
+            <a:off x="0" y="522898"/>
+            <a:ext cx="4086225" cy="0"/>
           </a:xfrm>
-        </p:grpSpPr>
-        <p:sp>
-          <p:nvSpPr>
-            <p:cNvPr id="12" name="Diamond 11">
-              <a:extLst>
-                <a:ext uri="{FF2B5EF4-FFF2-40B4-BE49-F238E27FC236}">
-                  <a16:creationId xmlns:a16="http://schemas.microsoft.com/office/drawing/2014/main" id="{7DC8B409-5FAC-4539-B25A-26BE925A48AF}"/>
-                </a:ext>
-              </a:extLst>
-            </p:cNvPr>
-            <p:cNvSpPr/>
-            <p:nvPr/>
-          </p:nvSpPr>
-          <p:spPr>
-            <a:xfrm>
-              <a:off x="4792319" y="2392018"/>
-              <a:ext cx="2607364" cy="2607364"/>
-            </a:xfrm>
-            <a:prstGeom prst="diamond">
-              <a:avLst/>
-            </a:prstGeom>
-            <a:noFill/>
-            <a:ln>
-              <a:solidFill>
-                <a:schemeClr val="accent3"/>
-              </a:solidFill>
-            </a:ln>
-          </p:spPr>
-          <p:style>
-            <a:lnRef idx="2">
-              <a:schemeClr val="accent1">
-                <a:shade val="50000"/>
+          <a:prstGeom prst="line">
+            <a:avLst/>
+          </a:prstGeom>
+          <a:ln>
+            <a:solidFill>
+              <a:schemeClr val="accent3">
+                <a:lumMod val="50000"/>
               </a:schemeClr>
-            </a:lnRef>
-            <a:fillRef idx="1">
-              <a:schemeClr val="accent1"/>
-            </a:fillRef>
-            <a:effectRef idx="0">
-              <a:schemeClr val="accent1"/>
-            </a:effectRef>
-            <a:fontRef idx="minor">
-              <a:schemeClr val="lt1"/>
-            </a:fontRef>
-          </p:style>
-          <p:txBody>
-            <a:bodyPr rtlCol="0" anchor="ctr"/>
-            <a:lstStyle/>
-            <a:p>
-              <a:pPr algn="ctr"/>
-              <a:endParaRPr lang="en-US" dirty="0"/>
-            </a:p>
-          </p:txBody>
-        </p:sp>
-        <p:sp>
-          <p:nvSpPr>
-            <p:cNvPr id="13" name="Diamond 12">
-              <a:extLst>
-                <a:ext uri="{FF2B5EF4-FFF2-40B4-BE49-F238E27FC236}">
-                  <a16:creationId xmlns:a16="http://schemas.microsoft.com/office/drawing/2014/main" id="{91498E2F-539C-46D3-AF7C-BB1DAE76B114}"/>
-                </a:ext>
-              </a:extLst>
-            </p:cNvPr>
-            <p:cNvSpPr/>
-            <p:nvPr/>
-          </p:nvSpPr>
-          <p:spPr>
-            <a:xfrm>
-              <a:off x="4325258" y="1229517"/>
-              <a:ext cx="3541486" cy="3541486"/>
-            </a:xfrm>
-            <a:prstGeom prst="diamond">
-              <a:avLst/>
-            </a:prstGeom>
-            <a:noFill/>
-            <a:ln>
-              <a:solidFill>
-                <a:schemeClr val="accent4"/>
-              </a:solidFill>
-            </a:ln>
-          </p:spPr>
-          <p:style>
-            <a:lnRef idx="2">
-              <a:schemeClr val="accent1">
-                <a:shade val="50000"/>
+            </a:solidFill>
+            <a:tailEnd type="oval"/>
+          </a:ln>
+        </p:spPr>
+        <p:style>
+          <a:lnRef idx="1">
+            <a:schemeClr val="accent1"/>
+          </a:lnRef>
+          <a:fillRef idx="0">
+            <a:schemeClr val="accent1"/>
+          </a:fillRef>
+          <a:effectRef idx="0">
+            <a:schemeClr val="accent1"/>
+          </a:effectRef>
+          <a:fontRef idx="minor">
+            <a:schemeClr val="tx1"/>
+          </a:fontRef>
+        </p:style>
+      </p:cxnSp>
+      <p:cxnSp>
+        <p:nvCxnSpPr>
+          <p:cNvPr id="7" name="Straight Connector 6">
+            <a:extLst>
+              <a:ext uri="{FF2B5EF4-FFF2-40B4-BE49-F238E27FC236}">
+                <a16:creationId xmlns:a16="http://schemas.microsoft.com/office/drawing/2014/main" id="{568C6EF8-BB1A-AEE6-10FF-DA860D55A164}"/>
+              </a:ext>
+              <a:ext uri="{C183D7F6-B498-43B3-948B-1728B52AA6E4}">
+                <adec:decorative xmlns:adec="http://schemas.microsoft.com/office/drawing/2017/decorative" val="1"/>
+              </a:ext>
+            </a:extLst>
+          </p:cNvPr>
+          <p:cNvCxnSpPr>
+            <a:cxnSpLocks/>
+          </p:cNvCxnSpPr>
+          <p:nvPr/>
+        </p:nvCxnSpPr>
+        <p:spPr>
+          <a:xfrm>
+            <a:off x="8105775" y="522898"/>
+            <a:ext cx="4086225" cy="0"/>
+          </a:xfrm>
+          <a:prstGeom prst="line">
+            <a:avLst/>
+          </a:prstGeom>
+          <a:ln>
+            <a:solidFill>
+              <a:schemeClr val="accent3">
+                <a:lumMod val="50000"/>
               </a:schemeClr>
-            </a:lnRef>
-            <a:fillRef idx="1">
-              <a:schemeClr val="accent1"/>
-            </a:fillRef>
-            <a:effectRef idx="0">
-              <a:schemeClr val="accent1"/>
-            </a:effectRef>
-            <a:fontRef idx="minor">
-              <a:schemeClr val="lt1"/>
-            </a:fontRef>
-          </p:style>
-          <p:txBody>
-            <a:bodyPr rtlCol="0" anchor="ctr"/>
-            <a:lstStyle/>
-            <a:p>
-              <a:pPr algn="ctr"/>
-              <a:endParaRPr lang="en-US" dirty="0"/>
-            </a:p>
-          </p:txBody>
-        </p:sp>
-      </p:grpSp>
+            </a:solidFill>
+            <a:headEnd type="oval"/>
+          </a:ln>
+        </p:spPr>
+        <p:style>
+          <a:lnRef idx="1">
+            <a:schemeClr val="accent1"/>
+          </a:lnRef>
+          <a:fillRef idx="0">
+            <a:schemeClr val="accent1"/>
+          </a:fillRef>
+          <a:effectRef idx="0">
+            <a:schemeClr val="accent1"/>
+          </a:effectRef>
+          <a:fontRef idx="minor">
+            <a:schemeClr val="tx1"/>
+          </a:fontRef>
+        </p:style>
+      </p:cxnSp>
       <p:sp>
         <p:nvSpPr>
-          <p:cNvPr id="15" name="Title 1">
-            <a:extLst>
-              <a:ext uri="{FF2B5EF4-FFF2-40B4-BE49-F238E27FC236}">
-                <a16:creationId xmlns:a16="http://schemas.microsoft.com/office/drawing/2014/main" id="{FA061601-468D-486D-B8EE-42BD1BE3ADCC}"/>
-              </a:ext>
-            </a:extLst>
-          </p:cNvPr>
-          <p:cNvSpPr>
-            <a:spLocks noGrp="1"/>
+          <p:cNvPr id="9" name="Title 1">
+            <a:extLst>
+              <a:ext uri="{FF2B5EF4-FFF2-40B4-BE49-F238E27FC236}">
+                <a16:creationId xmlns:a16="http://schemas.microsoft.com/office/drawing/2014/main" id="{4975CF20-3CD7-FDBD-319D-2A2B8C1ED733}"/>
+              </a:ext>
+            </a:extLst>
+          </p:cNvPr>
+          <p:cNvSpPr txBox="1">
+            <a:spLocks/>
           </p:cNvSpPr>
-          <p:nvPr>
-            <p:ph type="ctrTitle"/>
-          </p:nvPr>
+          <p:nvPr/>
         </p:nvSpPr>
         <p:spPr>
           <a:xfrm>
-            <a:off x="1524000" y="2930403"/>
-            <a:ext cx="9144000" cy="997196"/>
+            <a:off x="228600" y="328999"/>
+            <a:ext cx="11734800" cy="387798"/>
           </a:xfrm>
+          <a:prstGeom prst="rect">
+            <a:avLst/>
+          </a:prstGeom>
         </p:spPr>
         <p:txBody>
-          <a:bodyPr lIns="0" tIns="0" rIns="0" bIns="0" anchor="ctr">
+          <a:bodyPr vert="horz" wrap="square" lIns="0" tIns="0" rIns="0" bIns="0" rtlCol="0" anchor="t">
             <a:spAutoFit/>
           </a:bodyPr>
-          <a:lstStyle/>
-          <a:p>
-            <a:r>
-              <a:rPr lang="en-US" sz="7200" b="1" dirty="0">
+          <a:lstStyle>
+            <a:lvl1pPr algn="l" defTabSz="914400" rtl="0" eaLnBrk="1" latinLnBrk="0" hangingPunct="1">
+              <a:lnSpc>
+                <a:spcPct val="90000"/>
+              </a:lnSpc>
+              <a:spcBef>
+                <a:spcPct val="0"/>
+              </a:spcBef>
+              <a:buNone/>
+              <a:defRPr sz="4400" kern="1200">
                 <a:solidFill>
-                  <a:schemeClr val="bg1"/>
+                  <a:schemeClr val="tx1"/>
+                </a:solidFill>
+                <a:latin typeface="+mj-lt"/>
+                <a:ea typeface="+mj-ea"/>
+                <a:cs typeface="+mj-cs"/>
+              </a:defRPr>
+            </a:lvl1pPr>
+          </a:lstStyle>
+          <a:p>
+            <a:pPr algn="ctr"/>
+            <a:r>
+              <a:rPr lang="en-US" sz="2800" b="1" dirty="0">
+                <a:solidFill>
+                  <a:schemeClr val="tx1">
+                    <a:lumMod val="75000"/>
+                    <a:lumOff val="25000"/>
+                  </a:schemeClr>
                 </a:solidFill>
               </a:rPr>
-              <a:t>Thank You</a:t>
-            </a:r>
-            <a:endParaRPr lang="en-US" sz="7200" dirty="0">
+              <a:t>Model: Random Forest</a:t>
+            </a:r>
+            <a:endParaRPr lang="en-US" sz="2800" dirty="0">
               <a:solidFill>
-                <a:schemeClr val="accent4"/>
+                <a:schemeClr val="tx1">
+                  <a:lumMod val="75000"/>
+                  <a:lumOff val="25000"/>
+                </a:schemeClr>
               </a:solidFill>
             </a:endParaRPr>
           </a:p>
@@ -9120,14 +10896,10 @@
       </p:sp>
       <p:pic>
         <p:nvPicPr>
-          <p:cNvPr id="6" name="Picture 5" descr="This image is an icon that says &quot;24Slides.&quot;">
-            <a:hlinkClick r:id="rId3"/>
-            <a:extLst>
-              <a:ext uri="{FF2B5EF4-FFF2-40B4-BE49-F238E27FC236}">
-                <a16:creationId xmlns:a16="http://schemas.microsoft.com/office/drawing/2014/main" id="{A86744F2-5246-4A0A-B119-35E7FB76A0D8}"/>
-              </a:ext>
-              <a:ext uri="{C183D7F6-B498-43B3-948B-1728B52AA6E4}">
-                <adec:decorative xmlns:adec="http://schemas.microsoft.com/office/drawing/2017/decorative" val="0"/>
+          <p:cNvPr id="10" name="Picture 9">
+            <a:extLst>
+              <a:ext uri="{FF2B5EF4-FFF2-40B4-BE49-F238E27FC236}">
+                <a16:creationId xmlns:a16="http://schemas.microsoft.com/office/drawing/2014/main" id="{7A66D3F4-7926-04D1-DB77-10E258842D57}"/>
               </a:ext>
             </a:extLst>
           </p:cNvPr>
@@ -9137,26 +10909,25 @@
           <p:nvPr/>
         </p:nvPicPr>
         <p:blipFill>
-          <a:blip r:embed="rId4"/>
+          <a:blip r:embed="rId2"/>
           <a:stretch>
             <a:fillRect/>
           </a:stretch>
         </p:blipFill>
         <p:spPr>
           <a:xfrm>
-            <a:off x="5360332" y="5919419"/>
-            <a:ext cx="1471335" cy="420363"/>
+            <a:off x="361592" y="786370"/>
+            <a:ext cx="11406338" cy="5709066"/>
           </a:xfrm>
           <a:prstGeom prst="rect">
             <a:avLst/>
           </a:prstGeom>
-          <a:effectLst/>
         </p:spPr>
       </p:pic>
     </p:spTree>
     <p:extLst>
       <p:ext uri="{BB962C8B-B14F-4D97-AF65-F5344CB8AC3E}">
-        <p14:creationId xmlns:p14="http://schemas.microsoft.com/office/powerpoint/2010/main" val="1923038163"/>
+        <p14:creationId xmlns:p14="http://schemas.microsoft.com/office/powerpoint/2010/main" val="1866327242"/>
       </p:ext>
     </p:extLst>
   </p:cSld>
@@ -9958,20 +11729,20 @@
 </file>
 
 <file path=customXml/item1.xml><?xml version="1.0" encoding="utf-8"?>
+<p:properties xmlns:p="http://schemas.microsoft.com/office/2006/metadata/properties" xmlns:xsi="http://www.w3.org/2001/XMLSchema-instance" xmlns:pc="http://schemas.microsoft.com/office/infopath/2007/PartnerControls">
+  <documentManagement>
+    <MediaServiceKeyPoints xmlns="71af3243-3dd4-4a8d-8c0d-dd76da1f02a5" xsi:nil="true"/>
+  </documentManagement>
+</p:properties>
+</file>
+
+<file path=customXml/item2.xml><?xml version="1.0" encoding="utf-8"?>
 <?mso-contentType ?>
 <FormTemplates xmlns="http://schemas.microsoft.com/sharepoint/v3/contenttype/forms">
   <Display>DocumentLibraryForm</Display>
   <Edit>DocumentLibraryForm</Edit>
   <New>DocumentLibraryForm</New>
 </FormTemplates>
-</file>
-
-<file path=customXml/item2.xml><?xml version="1.0" encoding="utf-8"?>
-<p:properties xmlns:p="http://schemas.microsoft.com/office/2006/metadata/properties" xmlns:xsi="http://www.w3.org/2001/XMLSchema-instance" xmlns:pc="http://schemas.microsoft.com/office/infopath/2007/PartnerControls">
-  <documentManagement>
-    <MediaServiceKeyPoints xmlns="71af3243-3dd4-4a8d-8c0d-dd76da1f02a5" xsi:nil="true"/>
-  </documentManagement>
-</p:properties>
 </file>
 
 <file path=customXml/item3.xml><?xml version="1.0" encoding="utf-8"?>
@@ -10186,19 +11957,19 @@
 </file>
 
 <file path=customXml/itemProps1.xml><?xml version="1.0" encoding="utf-8"?>
-<ds:datastoreItem xmlns:ds="http://schemas.openxmlformats.org/officeDocument/2006/customXml" ds:itemID="{2FD05317-60D6-4B3A-8545-888496D1A8EC}">
+<ds:datastoreItem xmlns:ds="http://schemas.openxmlformats.org/officeDocument/2006/customXml" ds:itemID="{EF609EDA-869E-4BE5-AE5D-B898C584B6FF}">
   <ds:schemaRefs>
-    <ds:schemaRef ds:uri="http://schemas.microsoft.com/sharepoint/v3/contenttype/forms"/>
+    <ds:schemaRef ds:uri="http://schemas.microsoft.com/office/2006/metadata/properties"/>
+    <ds:schemaRef ds:uri="http://schemas.microsoft.com/office/infopath/2007/PartnerControls"/>
+    <ds:schemaRef ds:uri="71af3243-3dd4-4a8d-8c0d-dd76da1f02a5"/>
   </ds:schemaRefs>
 </ds:datastoreItem>
 </file>
 
 <file path=customXml/itemProps2.xml><?xml version="1.0" encoding="utf-8"?>
-<ds:datastoreItem xmlns:ds="http://schemas.openxmlformats.org/officeDocument/2006/customXml" ds:itemID="{EF609EDA-869E-4BE5-AE5D-B898C584B6FF}">
+<ds:datastoreItem xmlns:ds="http://schemas.openxmlformats.org/officeDocument/2006/customXml" ds:itemID="{2FD05317-60D6-4B3A-8545-888496D1A8EC}">
   <ds:schemaRefs>
-    <ds:schemaRef ds:uri="http://schemas.microsoft.com/office/2006/metadata/properties"/>
-    <ds:schemaRef ds:uri="http://schemas.microsoft.com/office/infopath/2007/PartnerControls"/>
-    <ds:schemaRef ds:uri="71af3243-3dd4-4a8d-8c0d-dd76da1f02a5"/>
+    <ds:schemaRef ds:uri="http://schemas.microsoft.com/sharepoint/v3/contenttype/forms"/>
   </ds:schemaRefs>
 </ds:datastoreItem>
 </file>

</xml_diff>